<commit_message>
fix #43: refine read-write query (#51)
</commit_message>
<xml_diff>
--- a/patterns/transaction-simple-read.pptx
+++ b/patterns/transaction-simple-read.pptx
@@ -205,7 +205,7 @@
           <a:p>
             <a:fld id="{CAD4BD24-A097-4F9D-85E9-6A2A24CA2D98}" type="datetimeFigureOut">
               <a:rPr lang="zh-CN" altLang="en-US" smtClean="0"/>
-              <a:t>2023/1/12</a:t>
+              <a:t>2023/1/13</a:t>
             </a:fld>
             <a:endParaRPr lang="zh-CN" altLang="en-US"/>
           </a:p>
@@ -2494,306 +2494,768 @@
           <a:chExt cx="0" cy="0"/>
         </a:xfrm>
       </p:grpSpPr>
-      <p:sp>
-        <p:nvSpPr>
-          <p:cNvPr id="2" name="矩形 1">
+      <p:grpSp>
+        <p:nvGrpSpPr>
+          <p:cNvPr id="13" name="Group 12">
             <a:extLst>
               <a:ext uri="{FF2B5EF4-FFF2-40B4-BE49-F238E27FC236}">
-                <a16:creationId xmlns:a16="http://schemas.microsoft.com/office/drawing/2014/main" id="{B72C642D-A526-CE45-ADFB-CA4FB6B38A11}"/>
+                <a16:creationId xmlns:a16="http://schemas.microsoft.com/office/drawing/2014/main" id="{5C8602AD-DA4E-8373-A4A1-319A52DFC519}"/>
               </a:ext>
             </a:extLst>
           </p:cNvPr>
-          <p:cNvSpPr/>
+          <p:cNvGrpSpPr/>
           <p:nvPr/>
-        </p:nvSpPr>
-        <p:spPr>
+        </p:nvGrpSpPr>
+        <p:grpSpPr>
           <a:xfrm>
-            <a:off x="4885466" y="2786061"/>
-            <a:ext cx="2421068" cy="505147"/>
+            <a:off x="2292625" y="2640495"/>
+            <a:ext cx="7610060" cy="1577009"/>
+            <a:chOff x="2292625" y="2640495"/>
+            <a:chExt cx="7610060" cy="1577009"/>
           </a:xfrm>
-          <a:prstGeom prst="rect">
-            <a:avLst/>
-          </a:prstGeom>
-          <a:solidFill>
-            <a:schemeClr val="accent5">
-              <a:lumMod val="60000"/>
-              <a:lumOff val="40000"/>
-            </a:schemeClr>
-          </a:solidFill>
-          <a:ln w="25400">
-            <a:solidFill>
-              <a:schemeClr val="tx1"/>
-            </a:solidFill>
-          </a:ln>
-        </p:spPr>
-        <p:style>
-          <a:lnRef idx="2">
-            <a:schemeClr val="accent2">
-              <a:shade val="50000"/>
-            </a:schemeClr>
-          </a:lnRef>
-          <a:fillRef idx="1">
-            <a:schemeClr val="accent2"/>
-          </a:fillRef>
-          <a:effectRef idx="0">
-            <a:schemeClr val="accent2"/>
-          </a:effectRef>
-          <a:fontRef idx="minor">
-            <a:schemeClr val="lt1"/>
-          </a:fontRef>
-        </p:style>
-        <p:txBody>
-          <a:bodyPr rtlCol="0" anchor="ctr"/>
-          <a:lstStyle/>
-          <a:p>
-            <a:r>
-              <a:rPr kumimoji="1" lang="en-US" altLang="zh-CN" sz="1200" b="1" dirty="0">
+        </p:grpSpPr>
+        <p:grpSp>
+          <p:nvGrpSpPr>
+            <p:cNvPr id="11" name="Group 10">
+              <a:extLst>
+                <a:ext uri="{FF2B5EF4-FFF2-40B4-BE49-F238E27FC236}">
+                  <a16:creationId xmlns:a16="http://schemas.microsoft.com/office/drawing/2014/main" id="{5168FCA5-A509-D54C-EC9F-42AEB9B2CE83}"/>
+                </a:ext>
+              </a:extLst>
+            </p:cNvPr>
+            <p:cNvGrpSpPr/>
+            <p:nvPr/>
+          </p:nvGrpSpPr>
+          <p:grpSpPr>
+            <a:xfrm>
+              <a:off x="2292625" y="2640495"/>
+              <a:ext cx="2716695" cy="1577009"/>
+              <a:chOff x="1606827" y="2640495"/>
+              <a:chExt cx="2716695" cy="1577009"/>
+            </a:xfrm>
+          </p:grpSpPr>
+          <p:sp>
+            <p:nvSpPr>
+              <p:cNvPr id="3" name="矩形 2">
+                <a:extLst>
+                  <a:ext uri="{FF2B5EF4-FFF2-40B4-BE49-F238E27FC236}">
+                    <a16:creationId xmlns:a16="http://schemas.microsoft.com/office/drawing/2014/main" id="{22DC280B-9C65-A140-A46D-687EE8B9A3F0}"/>
+                  </a:ext>
+                </a:extLst>
+              </p:cNvPr>
+              <p:cNvSpPr/>
+              <p:nvPr/>
+            </p:nvSpPr>
+            <p:spPr>
+              <a:xfrm>
+                <a:off x="1606827" y="2640495"/>
+                <a:ext cx="2716695" cy="1577009"/>
+              </a:xfrm>
+              <a:prstGeom prst="rect">
+                <a:avLst/>
+              </a:prstGeom>
+              <a:noFill/>
+              <a:ln w="25400">
                 <a:solidFill>
-                  <a:sysClr val="windowText" lastClr="000000"/>
+                  <a:schemeClr val="tx1"/>
                 </a:solidFill>
-              </a:rPr>
-              <a:t>account</a:t>
-            </a:r>
-            <a:r>
-              <a:rPr kumimoji="1" lang="en-US" altLang="zh-CN" sz="1200" dirty="0">
+                <a:prstDash val="dash"/>
+              </a:ln>
+            </p:spPr>
+            <p:style>
+              <a:lnRef idx="2">
+                <a:schemeClr val="accent2">
+                  <a:shade val="50000"/>
+                </a:schemeClr>
+              </a:lnRef>
+              <a:fillRef idx="1">
+                <a:schemeClr val="accent2"/>
+              </a:fillRef>
+              <a:effectRef idx="0">
+                <a:schemeClr val="accent2"/>
+              </a:effectRef>
+              <a:fontRef idx="minor">
+                <a:schemeClr val="lt1"/>
+              </a:fontRef>
+            </p:style>
+            <p:txBody>
+              <a:bodyPr rtlCol="0" anchor="b"/>
+              <a:lstStyle/>
+              <a:p>
+                <a:pPr algn="ctr"/>
+                <a:r>
+                  <a:rPr kumimoji="1" lang="en-US" altLang="zh-CN" sz="1200" b="1" dirty="0">
+                    <a:solidFill>
+                      <a:srgbClr val="FF0000"/>
+                    </a:solidFill>
+                    <a:latin typeface="DengXian" panose="02010600030101010101" pitchFamily="2" charset="-122"/>
+                    <a:ea typeface="DengXian" panose="02010600030101010101" pitchFamily="2" charset="-122"/>
+                  </a:rPr>
+                  <a:t>RESULT</a:t>
+                </a:r>
+                <a:r>
+                  <a:rPr kumimoji="1" lang="zh-CN" altLang="en-US" sz="1200" b="1" dirty="0">
+                    <a:solidFill>
+                      <a:srgbClr val="FF0000"/>
+                    </a:solidFill>
+                    <a:latin typeface="DengXian" panose="02010600030101010101" pitchFamily="2" charset="-122"/>
+                    <a:ea typeface="DengXian" panose="02010600030101010101" pitchFamily="2" charset="-122"/>
+                  </a:rPr>
+                  <a:t> </a:t>
+                </a:r>
+                <a:r>
+                  <a:rPr kumimoji="1" lang="en-US" altLang="zh-CN" sz="1200" dirty="0">
+                    <a:solidFill>
+                      <a:sysClr val="windowText" lastClr="000000"/>
+                    </a:solidFill>
+                    <a:latin typeface="DengXian" panose="02010600030101010101" pitchFamily="2" charset="-122"/>
+                    <a:ea typeface="DengXian" panose="02010600030101010101" pitchFamily="2" charset="-122"/>
+                  </a:rPr>
+                  <a:t>properties(</a:t>
+                </a:r>
+                <a:r>
+                  <a:rPr kumimoji="1" lang="en-US" altLang="zh-CN" sz="1200" b="1" dirty="0">
+                    <a:solidFill>
+                      <a:sysClr val="windowText" lastClr="000000"/>
+                    </a:solidFill>
+                    <a:latin typeface="DengXian" panose="02010600030101010101" pitchFamily="2" charset="-122"/>
+                    <a:ea typeface="DengXian" panose="02010600030101010101" pitchFamily="2" charset="-122"/>
+                  </a:rPr>
+                  <a:t>account</a:t>
+                </a:r>
+                <a:r>
+                  <a:rPr kumimoji="1" lang="en-US" altLang="zh-CN" sz="1200" dirty="0">
+                    <a:solidFill>
+                      <a:sysClr val="windowText" lastClr="000000"/>
+                    </a:solidFill>
+                    <a:latin typeface="DengXian" panose="02010600030101010101" pitchFamily="2" charset="-122"/>
+                    <a:ea typeface="DengXian" panose="02010600030101010101" pitchFamily="2" charset="-122"/>
+                  </a:rPr>
+                  <a:t>)</a:t>
+                </a:r>
+              </a:p>
+            </p:txBody>
+          </p:sp>
+          <p:grpSp>
+            <p:nvGrpSpPr>
+              <p:cNvPr id="9" name="Group 8">
+                <a:extLst>
+                  <a:ext uri="{FF2B5EF4-FFF2-40B4-BE49-F238E27FC236}">
+                    <a16:creationId xmlns:a16="http://schemas.microsoft.com/office/drawing/2014/main" id="{52A08965-7938-02E8-7A5E-CD3A10264DA7}"/>
+                  </a:ext>
+                </a:extLst>
+              </p:cNvPr>
+              <p:cNvGrpSpPr/>
+              <p:nvPr/>
+            </p:nvGrpSpPr>
+            <p:grpSpPr>
+              <a:xfrm>
+                <a:off x="1906774" y="2815878"/>
+                <a:ext cx="2116800" cy="1010292"/>
+                <a:chOff x="1814274" y="2815878"/>
+                <a:chExt cx="2116800" cy="1010292"/>
+              </a:xfrm>
+            </p:grpSpPr>
+            <p:sp>
+              <p:nvSpPr>
+                <p:cNvPr id="2" name="矩形 1">
+                  <a:extLst>
+                    <a:ext uri="{FF2B5EF4-FFF2-40B4-BE49-F238E27FC236}">
+                      <a16:creationId xmlns:a16="http://schemas.microsoft.com/office/drawing/2014/main" id="{B72C642D-A526-CE45-ADFB-CA4FB6B38A11}"/>
+                    </a:ext>
+                  </a:extLst>
+                </p:cNvPr>
+                <p:cNvSpPr/>
+                <p:nvPr/>
+              </p:nvSpPr>
+              <p:spPr>
+                <a:xfrm>
+                  <a:off x="1814274" y="2815878"/>
+                  <a:ext cx="2116800" cy="505147"/>
+                </a:xfrm>
+                <a:prstGeom prst="rect">
+                  <a:avLst/>
+                </a:prstGeom>
                 <a:solidFill>
-                  <a:sysClr val="windowText" lastClr="000000"/>
+                  <a:schemeClr val="accent5">
+                    <a:lumMod val="60000"/>
+                    <a:lumOff val="40000"/>
+                  </a:schemeClr>
                 </a:solidFill>
-              </a:rPr>
-              <a:t>:</a:t>
-            </a:r>
-            <a:r>
-              <a:rPr kumimoji="1" lang="zh-CN" altLang="en-US" sz="1200" dirty="0">
+                <a:ln w="25400">
+                  <a:solidFill>
+                    <a:schemeClr val="tx1"/>
+                  </a:solidFill>
+                </a:ln>
+              </p:spPr>
+              <p:style>
+                <a:lnRef idx="2">
+                  <a:schemeClr val="accent2">
+                    <a:shade val="50000"/>
+                  </a:schemeClr>
+                </a:lnRef>
+                <a:fillRef idx="1">
+                  <a:schemeClr val="accent2"/>
+                </a:fillRef>
+                <a:effectRef idx="0">
+                  <a:schemeClr val="accent2"/>
+                </a:effectRef>
+                <a:fontRef idx="minor">
+                  <a:schemeClr val="lt1"/>
+                </a:fontRef>
+              </p:style>
+              <p:txBody>
+                <a:bodyPr rtlCol="0" anchor="ctr"/>
+                <a:lstStyle/>
+                <a:p>
+                  <a:pPr algn="ctr"/>
+                  <a:r>
+                    <a:rPr kumimoji="1" lang="en-US" altLang="zh-CN" sz="1200" b="1" dirty="0">
+                      <a:solidFill>
+                        <a:sysClr val="windowText" lastClr="000000"/>
+                      </a:solidFill>
+                    </a:rPr>
+                    <a:t>account</a:t>
+                  </a:r>
+                  <a:r>
+                    <a:rPr kumimoji="1" lang="en-US" altLang="zh-CN" sz="1200" dirty="0">
+                      <a:solidFill>
+                        <a:sysClr val="windowText" lastClr="000000"/>
+                      </a:solidFill>
+                    </a:rPr>
+                    <a:t>:</a:t>
+                  </a:r>
+                  <a:r>
+                    <a:rPr kumimoji="1" lang="zh-CN" altLang="en-US" sz="1200" dirty="0">
+                      <a:solidFill>
+                        <a:sysClr val="windowText" lastClr="000000"/>
+                      </a:solidFill>
+                    </a:rPr>
+                    <a:t> </a:t>
+                  </a:r>
+                  <a:r>
+                    <a:rPr kumimoji="1" lang="en-US" altLang="zh-CN" sz="1200" dirty="0">
+                      <a:solidFill>
+                        <a:sysClr val="windowText" lastClr="000000"/>
+                      </a:solidFill>
+                    </a:rPr>
+                    <a:t>Account</a:t>
+                  </a:r>
+                  <a:endParaRPr kumimoji="1" lang="zh-CN" altLang="en-US" sz="1200" dirty="0">
+                    <a:solidFill>
+                      <a:sysClr val="windowText" lastClr="000000"/>
+                    </a:solidFill>
+                  </a:endParaRPr>
+                </a:p>
+              </p:txBody>
+            </p:sp>
+            <p:sp>
+              <p:nvSpPr>
+                <p:cNvPr id="6" name="矩形 3">
+                  <a:extLst>
+                    <a:ext uri="{FF2B5EF4-FFF2-40B4-BE49-F238E27FC236}">
+                      <a16:creationId xmlns:a16="http://schemas.microsoft.com/office/drawing/2014/main" id="{BD3A2398-8C0D-7E74-5100-BA996C38E61A}"/>
+                    </a:ext>
+                  </a:extLst>
+                </p:cNvPr>
+                <p:cNvSpPr/>
+                <p:nvPr/>
+              </p:nvSpPr>
+              <p:spPr>
+                <a:xfrm>
+                  <a:off x="1814274" y="3321023"/>
+                  <a:ext cx="2116800" cy="505147"/>
+                </a:xfrm>
+                <a:prstGeom prst="rect">
+                  <a:avLst/>
+                </a:prstGeom>
+                <a:noFill/>
+                <a:ln w="25400">
+                  <a:solidFill>
+                    <a:schemeClr val="tx1"/>
+                  </a:solidFill>
+                </a:ln>
+              </p:spPr>
+              <p:style>
+                <a:lnRef idx="2">
+                  <a:schemeClr val="accent2">
+                    <a:shade val="50000"/>
+                  </a:schemeClr>
+                </a:lnRef>
+                <a:fillRef idx="1">
+                  <a:schemeClr val="accent2"/>
+                </a:fillRef>
+                <a:effectRef idx="0">
+                  <a:schemeClr val="accent2"/>
+                </a:effectRef>
+                <a:fontRef idx="minor">
+                  <a:schemeClr val="lt1"/>
+                </a:fontRef>
+              </p:style>
+              <p:txBody>
+                <a:bodyPr rtlCol="0" anchor="ctr"/>
+                <a:lstStyle/>
+                <a:p>
+                  <a:pPr algn="ctr"/>
+                  <a:r>
+                    <a:rPr kumimoji="1" lang="en-US" altLang="zh-CN" sz="1200" b="1" dirty="0" err="1">
+                      <a:solidFill>
+                        <a:sysClr val="windowText" lastClr="000000"/>
+                      </a:solidFill>
+                      <a:latin typeface="DengXian" panose="02010600030101010101" pitchFamily="2" charset="-122"/>
+                      <a:ea typeface="DengXian" panose="02010600030101010101" pitchFamily="2" charset="-122"/>
+                    </a:rPr>
+                    <a:t>account</a:t>
+                  </a:r>
+                  <a:r>
+                    <a:rPr kumimoji="1" lang="en-US" altLang="zh-CN" sz="1200" dirty="0" err="1">
+                      <a:solidFill>
+                        <a:sysClr val="windowText" lastClr="000000"/>
+                      </a:solidFill>
+                      <a:latin typeface="DengXian" panose="02010600030101010101" pitchFamily="2" charset="-122"/>
+                      <a:ea typeface="DengXian" panose="02010600030101010101" pitchFamily="2" charset="-122"/>
+                    </a:rPr>
+                    <a:t>.id</a:t>
+                  </a:r>
+                  <a:r>
+                    <a:rPr kumimoji="1" lang="en-US" altLang="zh-CN" sz="1200" dirty="0">
+                      <a:solidFill>
+                        <a:sysClr val="windowText" lastClr="000000"/>
+                      </a:solidFill>
+                      <a:latin typeface="DengXian" panose="02010600030101010101" pitchFamily="2" charset="-122"/>
+                      <a:ea typeface="DengXian" panose="02010600030101010101" pitchFamily="2" charset="-122"/>
+                    </a:rPr>
+                    <a:t>:</a:t>
+                  </a:r>
+                  <a:r>
+                    <a:rPr kumimoji="1" lang="zh-CN" altLang="en-US" sz="1200" dirty="0">
+                      <a:solidFill>
+                        <a:sysClr val="windowText" lastClr="000000"/>
+                      </a:solidFill>
+                      <a:latin typeface="DengXian" panose="02010600030101010101" pitchFamily="2" charset="-122"/>
+                      <a:ea typeface="DengXian" panose="02010600030101010101" pitchFamily="2" charset="-122"/>
+                    </a:rPr>
+                    <a:t> </a:t>
+                  </a:r>
+                  <a:r>
+                    <a:rPr kumimoji="1" lang="en-US" altLang="zh-CN" sz="1200" dirty="0">
+                      <a:solidFill>
+                        <a:sysClr val="windowText" lastClr="000000"/>
+                      </a:solidFill>
+                      <a:latin typeface="DengXian" panose="02010600030101010101" pitchFamily="2" charset="-122"/>
+                      <a:ea typeface="DengXian" panose="02010600030101010101" pitchFamily="2" charset="-122"/>
+                    </a:rPr>
+                    <a:t>${id}</a:t>
+                  </a:r>
+                  <a:endParaRPr kumimoji="1" lang="zh-CN" altLang="en-US" sz="1200" dirty="0">
+                    <a:solidFill>
+                      <a:sysClr val="windowText" lastClr="000000"/>
+                    </a:solidFill>
+                    <a:latin typeface="DengXian" panose="02010600030101010101" pitchFamily="2" charset="-122"/>
+                    <a:ea typeface="DengXian" panose="02010600030101010101" pitchFamily="2" charset="-122"/>
+                  </a:endParaRPr>
+                </a:p>
+              </p:txBody>
+            </p:sp>
+          </p:grpSp>
+        </p:grpSp>
+        <p:grpSp>
+          <p:nvGrpSpPr>
+            <p:cNvPr id="10" name="Group 9">
+              <a:extLst>
+                <a:ext uri="{FF2B5EF4-FFF2-40B4-BE49-F238E27FC236}">
+                  <a16:creationId xmlns:a16="http://schemas.microsoft.com/office/drawing/2014/main" id="{A43BD305-30B1-E286-02CD-0C8134774423}"/>
+                </a:ext>
+              </a:extLst>
+            </p:cNvPr>
+            <p:cNvGrpSpPr/>
+            <p:nvPr/>
+          </p:nvGrpSpPr>
+          <p:grpSpPr>
+            <a:xfrm>
+              <a:off x="7185990" y="2640495"/>
+              <a:ext cx="2716695" cy="1577009"/>
+              <a:chOff x="6500192" y="2640495"/>
+              <a:chExt cx="2716695" cy="1577009"/>
+            </a:xfrm>
+          </p:grpSpPr>
+          <p:grpSp>
+            <p:nvGrpSpPr>
+              <p:cNvPr id="8" name="Group 7">
+                <a:extLst>
+                  <a:ext uri="{FF2B5EF4-FFF2-40B4-BE49-F238E27FC236}">
+                    <a16:creationId xmlns:a16="http://schemas.microsoft.com/office/drawing/2014/main" id="{7CE25A49-AE87-2B55-03D7-B1DC81E8A317}"/>
+                  </a:ext>
+                </a:extLst>
+              </p:cNvPr>
+              <p:cNvGrpSpPr/>
+              <p:nvPr/>
+            </p:nvGrpSpPr>
+            <p:grpSpPr>
+              <a:xfrm>
+                <a:off x="6800300" y="2815877"/>
+                <a:ext cx="2116478" cy="1010294"/>
+                <a:chOff x="6743980" y="2815877"/>
+                <a:chExt cx="2116478" cy="1010294"/>
+              </a:xfrm>
+            </p:grpSpPr>
+            <p:sp>
+              <p:nvSpPr>
+                <p:cNvPr id="4" name="矩形 3">
+                  <a:extLst>
+                    <a:ext uri="{FF2B5EF4-FFF2-40B4-BE49-F238E27FC236}">
+                      <a16:creationId xmlns:a16="http://schemas.microsoft.com/office/drawing/2014/main" id="{68924B86-E5E9-2247-A385-17C2F6B27826}"/>
+                    </a:ext>
+                  </a:extLst>
+                </p:cNvPr>
+                <p:cNvSpPr/>
+                <p:nvPr/>
+              </p:nvSpPr>
+              <p:spPr>
+                <a:xfrm>
+                  <a:off x="6743980" y="3321024"/>
+                  <a:ext cx="2116478" cy="505147"/>
+                </a:xfrm>
+                <a:prstGeom prst="rect">
+                  <a:avLst/>
+                </a:prstGeom>
+                <a:noFill/>
+                <a:ln w="25400">
+                  <a:solidFill>
+                    <a:schemeClr val="tx1"/>
+                  </a:solidFill>
+                </a:ln>
+              </p:spPr>
+              <p:style>
+                <a:lnRef idx="2">
+                  <a:schemeClr val="accent2">
+                    <a:shade val="50000"/>
+                  </a:schemeClr>
+                </a:lnRef>
+                <a:fillRef idx="1">
+                  <a:schemeClr val="accent2"/>
+                </a:fillRef>
+                <a:effectRef idx="0">
+                  <a:schemeClr val="accent2"/>
+                </a:effectRef>
+                <a:fontRef idx="minor">
+                  <a:schemeClr val="lt1"/>
+                </a:fontRef>
+              </p:style>
+              <p:txBody>
+                <a:bodyPr rtlCol="0" anchor="ctr"/>
+                <a:lstStyle/>
+                <a:p>
+                  <a:pPr algn="ctr"/>
+                  <a:r>
+                    <a:rPr kumimoji="1" lang="en-US" altLang="zh-CN" sz="1200" b="1" dirty="0" err="1">
+                      <a:solidFill>
+                        <a:sysClr val="windowText" lastClr="000000"/>
+                      </a:solidFill>
+                      <a:latin typeface="DengXian" panose="02010600030101010101" pitchFamily="2" charset="-122"/>
+                      <a:ea typeface="DengXian" panose="02010600030101010101" pitchFamily="2" charset="-122"/>
+                    </a:rPr>
+                    <a:t>person</a:t>
+                  </a:r>
+                  <a:r>
+                    <a:rPr kumimoji="1" lang="en-US" altLang="zh-CN" sz="1200" dirty="0" err="1">
+                      <a:solidFill>
+                        <a:sysClr val="windowText" lastClr="000000"/>
+                      </a:solidFill>
+                      <a:latin typeface="DengXian" panose="02010600030101010101" pitchFamily="2" charset="-122"/>
+                      <a:ea typeface="DengXian" panose="02010600030101010101" pitchFamily="2" charset="-122"/>
+                    </a:rPr>
+                    <a:t>.id</a:t>
+                  </a:r>
+                  <a:r>
+                    <a:rPr kumimoji="1" lang="en-US" altLang="zh-CN" sz="1200" dirty="0">
+                      <a:solidFill>
+                        <a:sysClr val="windowText" lastClr="000000"/>
+                      </a:solidFill>
+                      <a:latin typeface="DengXian" panose="02010600030101010101" pitchFamily="2" charset="-122"/>
+                      <a:ea typeface="DengXian" panose="02010600030101010101" pitchFamily="2" charset="-122"/>
+                    </a:rPr>
+                    <a:t>:</a:t>
+                  </a:r>
+                  <a:r>
+                    <a:rPr kumimoji="1" lang="zh-CN" altLang="en-US" sz="1200" dirty="0">
+                      <a:solidFill>
+                        <a:sysClr val="windowText" lastClr="000000"/>
+                      </a:solidFill>
+                      <a:latin typeface="DengXian" panose="02010600030101010101" pitchFamily="2" charset="-122"/>
+                      <a:ea typeface="DengXian" panose="02010600030101010101" pitchFamily="2" charset="-122"/>
+                    </a:rPr>
+                    <a:t> </a:t>
+                  </a:r>
+                  <a:r>
+                    <a:rPr kumimoji="1" lang="en-US" altLang="zh-CN" sz="1200" dirty="0">
+                      <a:solidFill>
+                        <a:sysClr val="windowText" lastClr="000000"/>
+                      </a:solidFill>
+                      <a:latin typeface="DengXian" panose="02010600030101010101" pitchFamily="2" charset="-122"/>
+                      <a:ea typeface="DengXian" panose="02010600030101010101" pitchFamily="2" charset="-122"/>
+                    </a:rPr>
+                    <a:t>${id}</a:t>
+                  </a:r>
+                  <a:endParaRPr kumimoji="1" lang="zh-CN" altLang="en-US" sz="1200" dirty="0">
+                    <a:solidFill>
+                      <a:sysClr val="windowText" lastClr="000000"/>
+                    </a:solidFill>
+                    <a:latin typeface="DengXian" panose="02010600030101010101" pitchFamily="2" charset="-122"/>
+                    <a:ea typeface="DengXian" panose="02010600030101010101" pitchFamily="2" charset="-122"/>
+                  </a:endParaRPr>
+                </a:p>
+              </p:txBody>
+            </p:sp>
+            <p:sp>
+              <p:nvSpPr>
+                <p:cNvPr id="5" name="矩形 9">
+                  <a:extLst>
+                    <a:ext uri="{FF2B5EF4-FFF2-40B4-BE49-F238E27FC236}">
+                      <a16:creationId xmlns:a16="http://schemas.microsoft.com/office/drawing/2014/main" id="{6641C98C-130F-B917-6069-671A355C0494}"/>
+                    </a:ext>
+                  </a:extLst>
+                </p:cNvPr>
+                <p:cNvSpPr/>
+                <p:nvPr/>
+              </p:nvSpPr>
+              <p:spPr>
+                <a:xfrm>
+                  <a:off x="6743980" y="2815877"/>
+                  <a:ext cx="2116478" cy="505147"/>
+                </a:xfrm>
+                <a:prstGeom prst="rect">
+                  <a:avLst/>
+                </a:prstGeom>
                 <a:solidFill>
-                  <a:sysClr val="windowText" lastClr="000000"/>
+                  <a:schemeClr val="accent6">
+                    <a:lumMod val="60000"/>
+                    <a:lumOff val="40000"/>
+                  </a:schemeClr>
                 </a:solidFill>
-              </a:rPr>
-              <a:t> </a:t>
-            </a:r>
-            <a:r>
-              <a:rPr kumimoji="1" lang="en-US" altLang="zh-CN" sz="1200" dirty="0">
+                <a:ln w="25400">
+                  <a:solidFill>
+                    <a:schemeClr val="tx1"/>
+                  </a:solidFill>
+                </a:ln>
+              </p:spPr>
+              <p:style>
+                <a:lnRef idx="2">
+                  <a:schemeClr val="accent2">
+                    <a:shade val="50000"/>
+                  </a:schemeClr>
+                </a:lnRef>
+                <a:fillRef idx="1">
+                  <a:schemeClr val="accent2"/>
+                </a:fillRef>
+                <a:effectRef idx="0">
+                  <a:schemeClr val="accent2"/>
+                </a:effectRef>
+                <a:fontRef idx="minor">
+                  <a:schemeClr val="lt1"/>
+                </a:fontRef>
+              </p:style>
+              <p:txBody>
+                <a:bodyPr rtlCol="0" anchor="ctr"/>
+                <a:lstStyle/>
+                <a:p>
+                  <a:pPr algn="ctr"/>
+                  <a:r>
+                    <a:rPr kumimoji="1" lang="en-US" altLang="zh-CN" sz="1200" b="1" dirty="0">
+                      <a:solidFill>
+                        <a:sysClr val="windowText" lastClr="000000"/>
+                      </a:solidFill>
+                    </a:rPr>
+                    <a:t>person</a:t>
+                  </a:r>
+                  <a:r>
+                    <a:rPr kumimoji="1" lang="zh-CN" altLang="en-US" sz="1200" dirty="0">
+                      <a:solidFill>
+                        <a:sysClr val="windowText" lastClr="000000"/>
+                      </a:solidFill>
+                    </a:rPr>
+                    <a:t> </a:t>
+                  </a:r>
+                  <a:r>
+                    <a:rPr kumimoji="1" lang="en-US" altLang="zh-CN" sz="1200" dirty="0">
+                      <a:solidFill>
+                        <a:sysClr val="windowText" lastClr="000000"/>
+                      </a:solidFill>
+                    </a:rPr>
+                    <a:t>:</a:t>
+                  </a:r>
+                  <a:r>
+                    <a:rPr kumimoji="1" lang="zh-CN" altLang="en-US" sz="1200" dirty="0">
+                      <a:solidFill>
+                        <a:sysClr val="windowText" lastClr="000000"/>
+                      </a:solidFill>
+                    </a:rPr>
+                    <a:t> </a:t>
+                  </a:r>
+                  <a:r>
+                    <a:rPr kumimoji="1" lang="en-US" altLang="zh-CN" sz="1200" dirty="0">
+                      <a:solidFill>
+                        <a:sysClr val="windowText" lastClr="000000"/>
+                      </a:solidFill>
+                    </a:rPr>
+                    <a:t>Person</a:t>
+                  </a:r>
+                  <a:endParaRPr kumimoji="1" lang="zh-CN" altLang="en-US" sz="1200" dirty="0">
+                    <a:solidFill>
+                      <a:sysClr val="windowText" lastClr="000000"/>
+                    </a:solidFill>
+                  </a:endParaRPr>
+                </a:p>
+              </p:txBody>
+            </p:sp>
+          </p:grpSp>
+          <p:sp>
+            <p:nvSpPr>
+              <p:cNvPr id="7" name="矩形 2">
+                <a:extLst>
+                  <a:ext uri="{FF2B5EF4-FFF2-40B4-BE49-F238E27FC236}">
+                    <a16:creationId xmlns:a16="http://schemas.microsoft.com/office/drawing/2014/main" id="{796335C9-7FF2-C371-B888-EBFB3C3FDC46}"/>
+                  </a:ext>
+                </a:extLst>
+              </p:cNvPr>
+              <p:cNvSpPr/>
+              <p:nvPr/>
+            </p:nvSpPr>
+            <p:spPr>
+              <a:xfrm>
+                <a:off x="6500192" y="2640495"/>
+                <a:ext cx="2716695" cy="1577009"/>
+              </a:xfrm>
+              <a:prstGeom prst="rect">
+                <a:avLst/>
+              </a:prstGeom>
+              <a:noFill/>
+              <a:ln w="25400">
                 <a:solidFill>
-                  <a:sysClr val="windowText" lastClr="000000"/>
+                  <a:schemeClr val="tx1"/>
                 </a:solidFill>
-              </a:rPr>
-              <a:t>Account</a:t>
-            </a:r>
-            <a:endParaRPr kumimoji="1" lang="zh-CN" altLang="en-US" sz="1200" dirty="0">
-              <a:solidFill>
-                <a:sysClr val="windowText" lastClr="000000"/>
-              </a:solidFill>
-            </a:endParaRPr>
-          </a:p>
-        </p:txBody>
-      </p:sp>
-      <p:sp>
-        <p:nvSpPr>
-          <p:cNvPr id="3" name="矩形 2">
-            <a:extLst>
-              <a:ext uri="{FF2B5EF4-FFF2-40B4-BE49-F238E27FC236}">
-                <a16:creationId xmlns:a16="http://schemas.microsoft.com/office/drawing/2014/main" id="{22DC280B-9C65-A140-A46D-687EE8B9A3F0}"/>
-              </a:ext>
-            </a:extLst>
-          </p:cNvPr>
-          <p:cNvSpPr/>
-          <p:nvPr/>
-        </p:nvSpPr>
-        <p:spPr>
-          <a:xfrm>
-            <a:off x="4757531" y="2610678"/>
-            <a:ext cx="2782956" cy="1577009"/>
-          </a:xfrm>
-          <a:prstGeom prst="rect">
-            <a:avLst/>
-          </a:prstGeom>
-          <a:noFill/>
-          <a:ln w="25400">
-            <a:solidFill>
-              <a:schemeClr val="tx1"/>
-            </a:solidFill>
-            <a:prstDash val="dash"/>
-          </a:ln>
-        </p:spPr>
-        <p:style>
-          <a:lnRef idx="2">
-            <a:schemeClr val="accent2">
-              <a:shade val="50000"/>
-            </a:schemeClr>
-          </a:lnRef>
-          <a:fillRef idx="1">
-            <a:schemeClr val="accent2"/>
-          </a:fillRef>
-          <a:effectRef idx="0">
-            <a:schemeClr val="accent2"/>
-          </a:effectRef>
-          <a:fontRef idx="minor">
-            <a:schemeClr val="lt1"/>
-          </a:fontRef>
-        </p:style>
-        <p:txBody>
-          <a:bodyPr rtlCol="0" anchor="b"/>
-          <a:lstStyle/>
-          <a:p>
-            <a:r>
-              <a:rPr kumimoji="1" lang="en-US" altLang="zh-CN" sz="1200" b="1" dirty="0">
-                <a:solidFill>
-                  <a:srgbClr val="FF0000"/>
-                </a:solidFill>
+                <a:prstDash val="dash"/>
+              </a:ln>
+            </p:spPr>
+            <p:style>
+              <a:lnRef idx="2">
+                <a:schemeClr val="accent2">
+                  <a:shade val="50000"/>
+                </a:schemeClr>
+              </a:lnRef>
+              <a:fillRef idx="1">
+                <a:schemeClr val="accent2"/>
+              </a:fillRef>
+              <a:effectRef idx="0">
+                <a:schemeClr val="accent2"/>
+              </a:effectRef>
+              <a:fontRef idx="minor">
+                <a:schemeClr val="lt1"/>
+              </a:fontRef>
+            </p:style>
+            <p:txBody>
+              <a:bodyPr rtlCol="0" anchor="b"/>
+              <a:lstStyle/>
+              <a:p>
+                <a:pPr algn="ctr"/>
+                <a:r>
+                  <a:rPr kumimoji="1" lang="en-US" altLang="zh-CN" sz="1200" b="1" dirty="0">
+                    <a:solidFill>
+                      <a:srgbClr val="FF0000"/>
+                    </a:solidFill>
+                    <a:latin typeface="DengXian" panose="02010600030101010101" pitchFamily="2" charset="-122"/>
+                    <a:ea typeface="DengXian" panose="02010600030101010101" pitchFamily="2" charset="-122"/>
+                  </a:rPr>
+                  <a:t>RESULT</a:t>
+                </a:r>
+                <a:r>
+                  <a:rPr kumimoji="1" lang="zh-CN" altLang="en-US" sz="1200" b="1" dirty="0">
+                    <a:solidFill>
+                      <a:srgbClr val="FF0000"/>
+                    </a:solidFill>
+                    <a:latin typeface="DengXian" panose="02010600030101010101" pitchFamily="2" charset="-122"/>
+                    <a:ea typeface="DengXian" panose="02010600030101010101" pitchFamily="2" charset="-122"/>
+                  </a:rPr>
+                  <a:t> </a:t>
+                </a:r>
+                <a:r>
+                  <a:rPr kumimoji="1" lang="en-US" altLang="zh-CN" sz="1200" dirty="0">
+                    <a:solidFill>
+                      <a:sysClr val="windowText" lastClr="000000"/>
+                    </a:solidFill>
+                    <a:latin typeface="DengXian" panose="02010600030101010101" pitchFamily="2" charset="-122"/>
+                    <a:ea typeface="DengXian" panose="02010600030101010101" pitchFamily="2" charset="-122"/>
+                  </a:rPr>
+                  <a:t>properties(</a:t>
+                </a:r>
+                <a:r>
+                  <a:rPr kumimoji="1" lang="en-US" altLang="zh-CN" sz="1200" b="1" dirty="0">
+                    <a:solidFill>
+                      <a:sysClr val="windowText" lastClr="000000"/>
+                    </a:solidFill>
+                    <a:latin typeface="DengXian" panose="02010600030101010101" pitchFamily="2" charset="-122"/>
+                    <a:ea typeface="DengXian" panose="02010600030101010101" pitchFamily="2" charset="-122"/>
+                  </a:rPr>
+                  <a:t>account</a:t>
+                </a:r>
+                <a:r>
+                  <a:rPr kumimoji="1" lang="en-US" altLang="zh-CN" sz="1200" dirty="0">
+                    <a:solidFill>
+                      <a:sysClr val="windowText" lastClr="000000"/>
+                    </a:solidFill>
+                    <a:latin typeface="DengXian" panose="02010600030101010101" pitchFamily="2" charset="-122"/>
+                    <a:ea typeface="DengXian" panose="02010600030101010101" pitchFamily="2" charset="-122"/>
+                  </a:rPr>
+                  <a:t>)</a:t>
+                </a:r>
+              </a:p>
+            </p:txBody>
+          </p:sp>
+        </p:grpSp>
+        <p:sp>
+          <p:nvSpPr>
+            <p:cNvPr id="12" name="文本框 7">
+              <a:extLst>
+                <a:ext uri="{FF2B5EF4-FFF2-40B4-BE49-F238E27FC236}">
+                  <a16:creationId xmlns:a16="http://schemas.microsoft.com/office/drawing/2014/main" id="{AD01137A-7769-D5E3-C126-DE166D6BD9DD}"/>
+                </a:ext>
+              </a:extLst>
+            </p:cNvPr>
+            <p:cNvSpPr txBox="1"/>
+            <p:nvPr/>
+          </p:nvSpPr>
+          <p:spPr>
+            <a:xfrm>
+              <a:off x="5768906" y="3228945"/>
+              <a:ext cx="654188" cy="400110"/>
+            </a:xfrm>
+            <a:prstGeom prst="rect">
+              <a:avLst/>
+            </a:prstGeom>
+            <a:noFill/>
+          </p:spPr>
+          <p:txBody>
+            <a:bodyPr wrap="square" rtlCol="0">
+              <a:spAutoFit/>
+            </a:bodyPr>
+            <a:lstStyle/>
+            <a:p>
+              <a:pPr algn="ctr"/>
+              <a:r>
+                <a:rPr kumimoji="1" lang="en-US" altLang="zh-CN" sz="2000" b="1" dirty="0">
+                  <a:latin typeface="DengXian" panose="02010600030101010101" pitchFamily="2" charset="-122"/>
+                  <a:ea typeface="DengXian" panose="02010600030101010101" pitchFamily="2" charset="-122"/>
+                </a:rPr>
+                <a:t>or</a:t>
+              </a:r>
+              <a:endParaRPr kumimoji="1" lang="en-US" altLang="zh-CN" sz="2000" dirty="0">
                 <a:latin typeface="DengXian" panose="02010600030101010101" pitchFamily="2" charset="-122"/>
                 <a:ea typeface="DengXian" panose="02010600030101010101" pitchFamily="2" charset="-122"/>
-              </a:rPr>
-              <a:t>RESULT</a:t>
-            </a:r>
-            <a:r>
-              <a:rPr kumimoji="1" lang="zh-CN" altLang="en-US" sz="1200" b="1" dirty="0">
-                <a:solidFill>
-                  <a:srgbClr val="FF0000"/>
-                </a:solidFill>
-                <a:latin typeface="DengXian" panose="02010600030101010101" pitchFamily="2" charset="-122"/>
-                <a:ea typeface="DengXian" panose="02010600030101010101" pitchFamily="2" charset="-122"/>
-              </a:rPr>
-              <a:t> </a:t>
-            </a:r>
-            <a:r>
-              <a:rPr kumimoji="1" lang="en-US" altLang="zh-CN" sz="1200" dirty="0">
-                <a:solidFill>
-                  <a:sysClr val="windowText" lastClr="000000"/>
-                </a:solidFill>
-                <a:latin typeface="DengXian" panose="02010600030101010101" pitchFamily="2" charset="-122"/>
-                <a:ea typeface="DengXian" panose="02010600030101010101" pitchFamily="2" charset="-122"/>
-              </a:rPr>
-              <a:t>properties(</a:t>
-            </a:r>
-            <a:r>
-              <a:rPr kumimoji="1" lang="en-US" altLang="zh-CN" sz="1200" b="1" dirty="0">
-                <a:solidFill>
-                  <a:sysClr val="windowText" lastClr="000000"/>
-                </a:solidFill>
-                <a:latin typeface="DengXian" panose="02010600030101010101" pitchFamily="2" charset="-122"/>
-                <a:ea typeface="DengXian" panose="02010600030101010101" pitchFamily="2" charset="-122"/>
-              </a:rPr>
-              <a:t>account</a:t>
-            </a:r>
-            <a:r>
-              <a:rPr kumimoji="1" lang="en-US" altLang="zh-CN" sz="1200" dirty="0">
-                <a:solidFill>
-                  <a:sysClr val="windowText" lastClr="000000"/>
-                </a:solidFill>
-                <a:latin typeface="DengXian" panose="02010600030101010101" pitchFamily="2" charset="-122"/>
-                <a:ea typeface="DengXian" panose="02010600030101010101" pitchFamily="2" charset="-122"/>
-              </a:rPr>
-              <a:t>)</a:t>
-            </a:r>
-          </a:p>
-        </p:txBody>
-      </p:sp>
-      <p:sp>
-        <p:nvSpPr>
-          <p:cNvPr id="4" name="矩形 3">
-            <a:extLst>
-              <a:ext uri="{FF2B5EF4-FFF2-40B4-BE49-F238E27FC236}">
-                <a16:creationId xmlns:a16="http://schemas.microsoft.com/office/drawing/2014/main" id="{68924B86-E5E9-2247-A385-17C2F6B27826}"/>
-              </a:ext>
-            </a:extLst>
-          </p:cNvPr>
-          <p:cNvSpPr/>
-          <p:nvPr/>
-        </p:nvSpPr>
-        <p:spPr>
-          <a:xfrm>
-            <a:off x="4885466" y="3291208"/>
-            <a:ext cx="2421068" cy="505147"/>
-          </a:xfrm>
-          <a:prstGeom prst="rect">
-            <a:avLst/>
-          </a:prstGeom>
-          <a:noFill/>
-          <a:ln w="25400">
-            <a:solidFill>
-              <a:schemeClr val="tx1"/>
-            </a:solidFill>
-          </a:ln>
-        </p:spPr>
-        <p:style>
-          <a:lnRef idx="2">
-            <a:schemeClr val="accent2">
-              <a:shade val="50000"/>
-            </a:schemeClr>
-          </a:lnRef>
-          <a:fillRef idx="1">
-            <a:schemeClr val="accent2"/>
-          </a:fillRef>
-          <a:effectRef idx="0">
-            <a:schemeClr val="accent2"/>
-          </a:effectRef>
-          <a:fontRef idx="minor">
-            <a:schemeClr val="lt1"/>
-          </a:fontRef>
-        </p:style>
-        <p:txBody>
-          <a:bodyPr rtlCol="0" anchor="ctr"/>
-          <a:lstStyle/>
-          <a:p>
-            <a:r>
-              <a:rPr kumimoji="1" lang="en-US" altLang="zh-CN" sz="1200" b="1" dirty="0" err="1">
-                <a:solidFill>
-                  <a:sysClr val="windowText" lastClr="000000"/>
-                </a:solidFill>
-                <a:latin typeface="DengXian" panose="02010600030101010101" pitchFamily="2" charset="-122"/>
-                <a:ea typeface="DengXian" panose="02010600030101010101" pitchFamily="2" charset="-122"/>
-              </a:rPr>
-              <a:t>account</a:t>
-            </a:r>
-            <a:r>
-              <a:rPr kumimoji="1" lang="en-US" altLang="zh-CN" sz="1200" dirty="0" err="1">
-                <a:solidFill>
-                  <a:sysClr val="windowText" lastClr="000000"/>
-                </a:solidFill>
-                <a:latin typeface="DengXian" panose="02010600030101010101" pitchFamily="2" charset="-122"/>
-                <a:ea typeface="DengXian" panose="02010600030101010101" pitchFamily="2" charset="-122"/>
-              </a:rPr>
-              <a:t>.id</a:t>
-            </a:r>
-            <a:r>
-              <a:rPr kumimoji="1" lang="en-US" altLang="zh-CN" sz="1200" dirty="0">
-                <a:solidFill>
-                  <a:sysClr val="windowText" lastClr="000000"/>
-                </a:solidFill>
-                <a:latin typeface="DengXian" panose="02010600030101010101" pitchFamily="2" charset="-122"/>
-                <a:ea typeface="DengXian" panose="02010600030101010101" pitchFamily="2" charset="-122"/>
-              </a:rPr>
-              <a:t>:</a:t>
-            </a:r>
-            <a:r>
-              <a:rPr kumimoji="1" lang="zh-CN" altLang="en-US" sz="1200" dirty="0">
-                <a:solidFill>
-                  <a:sysClr val="windowText" lastClr="000000"/>
-                </a:solidFill>
-                <a:latin typeface="DengXian" panose="02010600030101010101" pitchFamily="2" charset="-122"/>
-                <a:ea typeface="DengXian" panose="02010600030101010101" pitchFamily="2" charset="-122"/>
-              </a:rPr>
-              <a:t> </a:t>
-            </a:r>
-            <a:r>
-              <a:rPr kumimoji="1" lang="en-US" altLang="zh-CN" sz="1200" dirty="0">
-                <a:solidFill>
-                  <a:sysClr val="windowText" lastClr="000000"/>
-                </a:solidFill>
-                <a:latin typeface="DengXian" panose="02010600030101010101" pitchFamily="2" charset="-122"/>
-                <a:ea typeface="DengXian" panose="02010600030101010101" pitchFamily="2" charset="-122"/>
-              </a:rPr>
-              <a:t>${id}</a:t>
-            </a:r>
-            <a:endParaRPr kumimoji="1" lang="zh-CN" altLang="en-US" sz="1200" dirty="0">
-              <a:solidFill>
-                <a:sysClr val="windowText" lastClr="000000"/>
-              </a:solidFill>
-              <a:latin typeface="DengXian" panose="02010600030101010101" pitchFamily="2" charset="-122"/>
-              <a:ea typeface="DengXian" panose="02010600030101010101" pitchFamily="2" charset="-122"/>
-            </a:endParaRPr>
-          </a:p>
-        </p:txBody>
-      </p:sp>
+              </a:endParaRPr>
+            </a:p>
+          </p:txBody>
+        </p:sp>
+      </p:grpSp>
     </p:spTree>
     <p:extLst>
       <p:ext uri="{BB962C8B-B14F-4D97-AF65-F5344CB8AC3E}">

</xml_diff>

<commit_message>
remove rebundant simple 7&8 in query card
</commit_message>
<xml_diff>
--- a/patterns/transaction-simple-read.pptx
+++ b/patterns/transaction-simple-read.pptx
@@ -14,10 +14,10 @@
     <p:sldId id="414" r:id="rId5"/>
     <p:sldId id="363" r:id="rId6"/>
     <p:sldId id="373" r:id="rId7"/>
-    <p:sldId id="402" r:id="rId8"/>
-    <p:sldId id="398" r:id="rId9"/>
-    <p:sldId id="418" r:id="rId10"/>
-    <p:sldId id="417" r:id="rId11"/>
+    <p:sldId id="417" r:id="rId8"/>
+    <p:sldId id="402" r:id="rId9"/>
+    <p:sldId id="398" r:id="rId10"/>
+    <p:sldId id="418" r:id="rId11"/>
   </p:sldIdLst>
   <p:sldSz cx="12192000" cy="6858000"/>
   <p:notesSz cx="6858000" cy="9144000"/>
@@ -206,7 +206,7 @@
           <a:p>
             <a:fld id="{CAD4BD24-A097-4F9D-85E9-6A2A24CA2D98}" type="datetimeFigureOut">
               <a:rPr lang="zh-CN" altLang="en-US" smtClean="0"/>
-              <a:t>2023/4/28</a:t>
+              <a:t>2023/5/6</a:t>
             </a:fld>
             <a:endParaRPr lang="zh-CN" altLang="en-US"/>
           </a:p>
@@ -2854,7 +2854,7 @@
 </file>
 
 <file path=ppt/slides/slide10.xml><?xml version="1.0" encoding="utf-8"?>
-<p:sld xmlns:a="http://schemas.openxmlformats.org/drawingml/2006/main" xmlns:r="http://schemas.openxmlformats.org/officeDocument/2006/relationships" xmlns:p="http://schemas.openxmlformats.org/presentationml/2006/main">
+<p:sld xmlns:a="http://schemas.openxmlformats.org/drawingml/2006/main" xmlns:r="http://schemas.openxmlformats.org/officeDocument/2006/relationships" xmlns:p="http://schemas.openxmlformats.org/presentationml/2006/main" show="0">
   <p:cSld>
     <p:spTree>
       <p:nvGrpSpPr>
@@ -2870,631 +2870,772 @@
           <a:chExt cx="0" cy="0"/>
         </a:xfrm>
       </p:grpSpPr>
-      <p:sp>
-        <p:nvSpPr>
-          <p:cNvPr id="4" name="Rectangle 3">
+      <p:grpSp>
+        <p:nvGrpSpPr>
+          <p:cNvPr id="13" name="Group 12">
             <a:extLst>
               <a:ext uri="{FF2B5EF4-FFF2-40B4-BE49-F238E27FC236}">
-                <a16:creationId xmlns:a16="http://schemas.microsoft.com/office/drawing/2014/main" id="{5EFB2F0D-ABB3-D995-FA04-8C359C1827B4}"/>
+                <a16:creationId xmlns:a16="http://schemas.microsoft.com/office/drawing/2014/main" id="{5C8602AD-DA4E-8373-A4A1-319A52DFC519}"/>
               </a:ext>
             </a:extLst>
           </p:cNvPr>
-          <p:cNvSpPr/>
+          <p:cNvGrpSpPr/>
           <p:nvPr/>
-        </p:nvSpPr>
-        <p:spPr>
+        </p:nvGrpSpPr>
+        <p:grpSpPr>
           <a:xfrm>
-            <a:off x="2468880" y="2861420"/>
-            <a:ext cx="1215845" cy="387178"/>
+            <a:off x="2292625" y="2640495"/>
+            <a:ext cx="7610060" cy="1577009"/>
+            <a:chOff x="2292625" y="2640495"/>
+            <a:chExt cx="7610060" cy="1577009"/>
           </a:xfrm>
-          <a:prstGeom prst="rect">
-            <a:avLst/>
-          </a:prstGeom>
-          <a:solidFill>
-            <a:schemeClr val="accent6">
-              <a:lumMod val="60000"/>
-              <a:lumOff val="40000"/>
-            </a:schemeClr>
-          </a:solidFill>
-          <a:ln w="22225">
-            <a:solidFill>
-              <a:schemeClr val="tx1"/>
-            </a:solidFill>
-          </a:ln>
-        </p:spPr>
-        <p:style>
-          <a:lnRef idx="2">
-            <a:schemeClr val="accent1">
-              <a:shade val="50000"/>
-            </a:schemeClr>
-          </a:lnRef>
-          <a:fillRef idx="1">
-            <a:schemeClr val="accent1"/>
-          </a:fillRef>
-          <a:effectRef idx="0">
-            <a:schemeClr val="accent1"/>
-          </a:effectRef>
-          <a:fontRef idx="minor">
-            <a:schemeClr val="lt1"/>
-          </a:fontRef>
-        </p:style>
-        <p:txBody>
-          <a:bodyPr rtlCol="0" anchor="ctr"/>
-          <a:lstStyle/>
-          <a:p>
-            <a:pPr algn="ctr"/>
-            <a:r>
-              <a:rPr lang="en-US" altLang="zh-CN" b="1" dirty="0">
+        </p:grpSpPr>
+        <p:grpSp>
+          <p:nvGrpSpPr>
+            <p:cNvPr id="11" name="Group 10">
+              <a:extLst>
+                <a:ext uri="{FF2B5EF4-FFF2-40B4-BE49-F238E27FC236}">
+                  <a16:creationId xmlns:a16="http://schemas.microsoft.com/office/drawing/2014/main" id="{5168FCA5-A509-D54C-EC9F-42AEB9B2CE83}"/>
+                </a:ext>
+              </a:extLst>
+            </p:cNvPr>
+            <p:cNvGrpSpPr/>
+            <p:nvPr/>
+          </p:nvGrpSpPr>
+          <p:grpSpPr>
+            <a:xfrm>
+              <a:off x="2292625" y="2640495"/>
+              <a:ext cx="2716695" cy="1577009"/>
+              <a:chOff x="1606827" y="2640495"/>
+              <a:chExt cx="2716695" cy="1577009"/>
+            </a:xfrm>
+          </p:grpSpPr>
+          <p:sp>
+            <p:nvSpPr>
+              <p:cNvPr id="3" name="矩形 2">
+                <a:extLst>
+                  <a:ext uri="{FF2B5EF4-FFF2-40B4-BE49-F238E27FC236}">
+                    <a16:creationId xmlns:a16="http://schemas.microsoft.com/office/drawing/2014/main" id="{22DC280B-9C65-A140-A46D-687EE8B9A3F0}"/>
+                  </a:ext>
+                </a:extLst>
+              </p:cNvPr>
+              <p:cNvSpPr/>
+              <p:nvPr/>
+            </p:nvSpPr>
+            <p:spPr>
+              <a:xfrm>
+                <a:off x="1606827" y="2640495"/>
+                <a:ext cx="2716695" cy="1577009"/>
+              </a:xfrm>
+              <a:prstGeom prst="rect">
+                <a:avLst/>
+              </a:prstGeom>
+              <a:noFill/>
+              <a:ln w="25400">
                 <a:solidFill>
                   <a:schemeClr val="tx1"/>
                 </a:solidFill>
-              </a:rPr>
-              <a:t>Person</a:t>
-            </a:r>
-            <a:endParaRPr lang="en-CN" b="1" dirty="0">
-              <a:solidFill>
-                <a:schemeClr val="tx1"/>
-              </a:solidFill>
-            </a:endParaRPr>
-          </a:p>
-        </p:txBody>
-      </p:sp>
-      <p:sp>
-        <p:nvSpPr>
-          <p:cNvPr id="5" name="Rectangle 4">
-            <a:extLst>
-              <a:ext uri="{FF2B5EF4-FFF2-40B4-BE49-F238E27FC236}">
-                <a16:creationId xmlns:a16="http://schemas.microsoft.com/office/drawing/2014/main" id="{71799D25-8F4B-3E78-7E33-C84644F1D35C}"/>
-              </a:ext>
-            </a:extLst>
-          </p:cNvPr>
-          <p:cNvSpPr/>
-          <p:nvPr/>
-        </p:nvSpPr>
-        <p:spPr>
-          <a:xfrm>
-            <a:off x="3984346" y="2861420"/>
-            <a:ext cx="1215845" cy="387178"/>
-          </a:xfrm>
-          <a:prstGeom prst="rect">
-            <a:avLst/>
-          </a:prstGeom>
-          <a:solidFill>
-            <a:srgbClr val="FF0000">
-              <a:alpha val="30000"/>
-            </a:srgbClr>
-          </a:solidFill>
-          <a:ln w="22225">
-            <a:solidFill>
-              <a:schemeClr val="tx1"/>
-            </a:solidFill>
-          </a:ln>
-        </p:spPr>
-        <p:style>
-          <a:lnRef idx="2">
-            <a:schemeClr val="accent1">
-              <a:shade val="50000"/>
-            </a:schemeClr>
-          </a:lnRef>
-          <a:fillRef idx="1">
-            <a:schemeClr val="accent1"/>
-          </a:fillRef>
-          <a:effectRef idx="0">
-            <a:schemeClr val="accent1"/>
-          </a:effectRef>
-          <a:fontRef idx="minor">
-            <a:schemeClr val="lt1"/>
-          </a:fontRef>
-        </p:style>
-        <p:txBody>
-          <a:bodyPr rtlCol="0" anchor="ctr"/>
-          <a:lstStyle/>
-          <a:p>
-            <a:pPr algn="ctr"/>
-            <a:r>
-              <a:rPr lang="en-US" altLang="zh-CN" b="1" dirty="0">
+                <a:prstDash val="dash"/>
+              </a:ln>
+            </p:spPr>
+            <p:style>
+              <a:lnRef idx="2">
+                <a:schemeClr val="accent2">
+                  <a:shade val="50000"/>
+                </a:schemeClr>
+              </a:lnRef>
+              <a:fillRef idx="1">
+                <a:schemeClr val="accent2"/>
+              </a:fillRef>
+              <a:effectRef idx="0">
+                <a:schemeClr val="accent2"/>
+              </a:effectRef>
+              <a:fontRef idx="minor">
+                <a:schemeClr val="lt1"/>
+              </a:fontRef>
+            </p:style>
+            <p:txBody>
+              <a:bodyPr rtlCol="0" anchor="b"/>
+              <a:lstStyle/>
+              <a:p>
+                <a:pPr algn="ctr"/>
+                <a:r>
+                  <a:rPr kumimoji="1" lang="en-US" altLang="zh-CN" sz="1200" b="1" dirty="0">
+                    <a:solidFill>
+                      <a:srgbClr val="FF0000"/>
+                    </a:solidFill>
+                    <a:latin typeface="DengXian" panose="02010600030101010101" pitchFamily="2" charset="-122"/>
+                    <a:ea typeface="DengXian" panose="02010600030101010101" pitchFamily="2" charset="-122"/>
+                  </a:rPr>
+                  <a:t>RESULT</a:t>
+                </a:r>
+                <a:r>
+                  <a:rPr kumimoji="1" lang="zh-CN" altLang="en-US" sz="1200" b="1" dirty="0">
+                    <a:solidFill>
+                      <a:srgbClr val="FF0000"/>
+                    </a:solidFill>
+                    <a:latin typeface="DengXian" panose="02010600030101010101" pitchFamily="2" charset="-122"/>
+                    <a:ea typeface="DengXian" panose="02010600030101010101" pitchFamily="2" charset="-122"/>
+                  </a:rPr>
+                  <a:t> </a:t>
+                </a:r>
+                <a:r>
+                  <a:rPr kumimoji="1" lang="en-US" altLang="zh-CN" sz="1200" dirty="0">
+                    <a:solidFill>
+                      <a:sysClr val="windowText" lastClr="000000"/>
+                    </a:solidFill>
+                    <a:latin typeface="DengXian" panose="02010600030101010101" pitchFamily="2" charset="-122"/>
+                    <a:ea typeface="DengXian" panose="02010600030101010101" pitchFamily="2" charset="-122"/>
+                  </a:rPr>
+                  <a:t>properties(</a:t>
+                </a:r>
+                <a:r>
+                  <a:rPr kumimoji="1" lang="en-US" altLang="zh-CN" sz="1200" b="1" dirty="0">
+                    <a:solidFill>
+                      <a:sysClr val="windowText" lastClr="000000"/>
+                    </a:solidFill>
+                    <a:latin typeface="DengXian" panose="02010600030101010101" pitchFamily="2" charset="-122"/>
+                    <a:ea typeface="DengXian" panose="02010600030101010101" pitchFamily="2" charset="-122"/>
+                  </a:rPr>
+                  <a:t>account</a:t>
+                </a:r>
+                <a:r>
+                  <a:rPr kumimoji="1" lang="en-US" altLang="zh-CN" sz="1200" dirty="0">
+                    <a:solidFill>
+                      <a:sysClr val="windowText" lastClr="000000"/>
+                    </a:solidFill>
+                    <a:latin typeface="DengXian" panose="02010600030101010101" pitchFamily="2" charset="-122"/>
+                    <a:ea typeface="DengXian" panose="02010600030101010101" pitchFamily="2" charset="-122"/>
+                  </a:rPr>
+                  <a:t>)</a:t>
+                </a:r>
+              </a:p>
+            </p:txBody>
+          </p:sp>
+          <p:grpSp>
+            <p:nvGrpSpPr>
+              <p:cNvPr id="9" name="Group 8">
+                <a:extLst>
+                  <a:ext uri="{FF2B5EF4-FFF2-40B4-BE49-F238E27FC236}">
+                    <a16:creationId xmlns:a16="http://schemas.microsoft.com/office/drawing/2014/main" id="{52A08965-7938-02E8-7A5E-CD3A10264DA7}"/>
+                  </a:ext>
+                </a:extLst>
+              </p:cNvPr>
+              <p:cNvGrpSpPr/>
+              <p:nvPr/>
+            </p:nvGrpSpPr>
+            <p:grpSpPr>
+              <a:xfrm>
+                <a:off x="1906774" y="2815878"/>
+                <a:ext cx="2116800" cy="1010292"/>
+                <a:chOff x="1814274" y="2815878"/>
+                <a:chExt cx="2116800" cy="1010292"/>
+              </a:xfrm>
+            </p:grpSpPr>
+            <p:sp>
+              <p:nvSpPr>
+                <p:cNvPr id="2" name="矩形 1">
+                  <a:extLst>
+                    <a:ext uri="{FF2B5EF4-FFF2-40B4-BE49-F238E27FC236}">
+                      <a16:creationId xmlns:a16="http://schemas.microsoft.com/office/drawing/2014/main" id="{B72C642D-A526-CE45-ADFB-CA4FB6B38A11}"/>
+                    </a:ext>
+                  </a:extLst>
+                </p:cNvPr>
+                <p:cNvSpPr/>
+                <p:nvPr/>
+              </p:nvSpPr>
+              <p:spPr>
+                <a:xfrm>
+                  <a:off x="1814274" y="2815878"/>
+                  <a:ext cx="2116800" cy="505147"/>
+                </a:xfrm>
+                <a:prstGeom prst="rect">
+                  <a:avLst/>
+                </a:prstGeom>
+                <a:solidFill>
+                  <a:schemeClr val="accent5">
+                    <a:lumMod val="60000"/>
+                    <a:lumOff val="40000"/>
+                  </a:schemeClr>
+                </a:solidFill>
+                <a:ln w="25400">
+                  <a:solidFill>
+                    <a:schemeClr val="tx1"/>
+                  </a:solidFill>
+                </a:ln>
+              </p:spPr>
+              <p:style>
+                <a:lnRef idx="2">
+                  <a:schemeClr val="accent2">
+                    <a:shade val="50000"/>
+                  </a:schemeClr>
+                </a:lnRef>
+                <a:fillRef idx="1">
+                  <a:schemeClr val="accent2"/>
+                </a:fillRef>
+                <a:effectRef idx="0">
+                  <a:schemeClr val="accent2"/>
+                </a:effectRef>
+                <a:fontRef idx="minor">
+                  <a:schemeClr val="lt1"/>
+                </a:fontRef>
+              </p:style>
+              <p:txBody>
+                <a:bodyPr rtlCol="0" anchor="ctr"/>
+                <a:lstStyle/>
+                <a:p>
+                  <a:pPr algn="ctr"/>
+                  <a:r>
+                    <a:rPr kumimoji="1" lang="en-US" altLang="zh-CN" sz="1200" b="1" dirty="0">
+                      <a:solidFill>
+                        <a:sysClr val="windowText" lastClr="000000"/>
+                      </a:solidFill>
+                    </a:rPr>
+                    <a:t>account</a:t>
+                  </a:r>
+                  <a:r>
+                    <a:rPr kumimoji="1" lang="en-US" altLang="zh-CN" sz="1200" dirty="0">
+                      <a:solidFill>
+                        <a:sysClr val="windowText" lastClr="000000"/>
+                      </a:solidFill>
+                    </a:rPr>
+                    <a:t>:</a:t>
+                  </a:r>
+                  <a:r>
+                    <a:rPr kumimoji="1" lang="zh-CN" altLang="en-US" sz="1200" dirty="0">
+                      <a:solidFill>
+                        <a:sysClr val="windowText" lastClr="000000"/>
+                      </a:solidFill>
+                    </a:rPr>
+                    <a:t> </a:t>
+                  </a:r>
+                  <a:r>
+                    <a:rPr kumimoji="1" lang="en-US" altLang="zh-CN" sz="1200" dirty="0">
+                      <a:solidFill>
+                        <a:sysClr val="windowText" lastClr="000000"/>
+                      </a:solidFill>
+                    </a:rPr>
+                    <a:t>Account</a:t>
+                  </a:r>
+                  <a:endParaRPr kumimoji="1" lang="zh-CN" altLang="en-US" sz="1200" dirty="0">
+                    <a:solidFill>
+                      <a:sysClr val="windowText" lastClr="000000"/>
+                    </a:solidFill>
+                  </a:endParaRPr>
+                </a:p>
+              </p:txBody>
+            </p:sp>
+            <p:sp>
+              <p:nvSpPr>
+                <p:cNvPr id="6" name="矩形 3">
+                  <a:extLst>
+                    <a:ext uri="{FF2B5EF4-FFF2-40B4-BE49-F238E27FC236}">
+                      <a16:creationId xmlns:a16="http://schemas.microsoft.com/office/drawing/2014/main" id="{BD3A2398-8C0D-7E74-5100-BA996C38E61A}"/>
+                    </a:ext>
+                  </a:extLst>
+                </p:cNvPr>
+                <p:cNvSpPr/>
+                <p:nvPr/>
+              </p:nvSpPr>
+              <p:spPr>
+                <a:xfrm>
+                  <a:off x="1814274" y="3321023"/>
+                  <a:ext cx="2116800" cy="505147"/>
+                </a:xfrm>
+                <a:prstGeom prst="rect">
+                  <a:avLst/>
+                </a:prstGeom>
+                <a:noFill/>
+                <a:ln w="25400">
+                  <a:solidFill>
+                    <a:schemeClr val="tx1"/>
+                  </a:solidFill>
+                </a:ln>
+              </p:spPr>
+              <p:style>
+                <a:lnRef idx="2">
+                  <a:schemeClr val="accent2">
+                    <a:shade val="50000"/>
+                  </a:schemeClr>
+                </a:lnRef>
+                <a:fillRef idx="1">
+                  <a:schemeClr val="accent2"/>
+                </a:fillRef>
+                <a:effectRef idx="0">
+                  <a:schemeClr val="accent2"/>
+                </a:effectRef>
+                <a:fontRef idx="minor">
+                  <a:schemeClr val="lt1"/>
+                </a:fontRef>
+              </p:style>
+              <p:txBody>
+                <a:bodyPr rtlCol="0" anchor="ctr"/>
+                <a:lstStyle/>
+                <a:p>
+                  <a:pPr algn="ctr"/>
+                  <a:r>
+                    <a:rPr kumimoji="1" lang="en-US" altLang="zh-CN" sz="1200" b="1" dirty="0" err="1">
+                      <a:solidFill>
+                        <a:sysClr val="windowText" lastClr="000000"/>
+                      </a:solidFill>
+                      <a:latin typeface="DengXian" panose="02010600030101010101" pitchFamily="2" charset="-122"/>
+                      <a:ea typeface="DengXian" panose="02010600030101010101" pitchFamily="2" charset="-122"/>
+                    </a:rPr>
+                    <a:t>account</a:t>
+                  </a:r>
+                  <a:r>
+                    <a:rPr kumimoji="1" lang="en-US" altLang="zh-CN" sz="1200" dirty="0" err="1">
+                      <a:solidFill>
+                        <a:sysClr val="windowText" lastClr="000000"/>
+                      </a:solidFill>
+                      <a:latin typeface="DengXian" panose="02010600030101010101" pitchFamily="2" charset="-122"/>
+                      <a:ea typeface="DengXian" panose="02010600030101010101" pitchFamily="2" charset="-122"/>
+                    </a:rPr>
+                    <a:t>.id</a:t>
+                  </a:r>
+                  <a:r>
+                    <a:rPr kumimoji="1" lang="en-US" altLang="zh-CN" sz="1200" dirty="0">
+                      <a:solidFill>
+                        <a:sysClr val="windowText" lastClr="000000"/>
+                      </a:solidFill>
+                      <a:latin typeface="DengXian" panose="02010600030101010101" pitchFamily="2" charset="-122"/>
+                      <a:ea typeface="DengXian" panose="02010600030101010101" pitchFamily="2" charset="-122"/>
+                    </a:rPr>
+                    <a:t>:</a:t>
+                  </a:r>
+                  <a:r>
+                    <a:rPr kumimoji="1" lang="zh-CN" altLang="en-US" sz="1200" dirty="0">
+                      <a:solidFill>
+                        <a:sysClr val="windowText" lastClr="000000"/>
+                      </a:solidFill>
+                      <a:latin typeface="DengXian" panose="02010600030101010101" pitchFamily="2" charset="-122"/>
+                      <a:ea typeface="DengXian" panose="02010600030101010101" pitchFamily="2" charset="-122"/>
+                    </a:rPr>
+                    <a:t> </a:t>
+                  </a:r>
+                  <a:r>
+                    <a:rPr kumimoji="1" lang="en-US" altLang="zh-CN" sz="1200" dirty="0">
+                      <a:solidFill>
+                        <a:sysClr val="windowText" lastClr="000000"/>
+                      </a:solidFill>
+                      <a:latin typeface="DengXian" panose="02010600030101010101" pitchFamily="2" charset="-122"/>
+                      <a:ea typeface="DengXian" panose="02010600030101010101" pitchFamily="2" charset="-122"/>
+                    </a:rPr>
+                    <a:t>${id}</a:t>
+                  </a:r>
+                  <a:endParaRPr kumimoji="1" lang="zh-CN" altLang="en-US" sz="1200" dirty="0">
+                    <a:solidFill>
+                      <a:sysClr val="windowText" lastClr="000000"/>
+                    </a:solidFill>
+                    <a:latin typeface="DengXian" panose="02010600030101010101" pitchFamily="2" charset="-122"/>
+                    <a:ea typeface="DengXian" panose="02010600030101010101" pitchFamily="2" charset="-122"/>
+                  </a:endParaRPr>
+                </a:p>
+              </p:txBody>
+            </p:sp>
+          </p:grpSp>
+        </p:grpSp>
+        <p:grpSp>
+          <p:nvGrpSpPr>
+            <p:cNvPr id="10" name="Group 9">
+              <a:extLst>
+                <a:ext uri="{FF2B5EF4-FFF2-40B4-BE49-F238E27FC236}">
+                  <a16:creationId xmlns:a16="http://schemas.microsoft.com/office/drawing/2014/main" id="{A43BD305-30B1-E286-02CD-0C8134774423}"/>
+                </a:ext>
+              </a:extLst>
+            </p:cNvPr>
+            <p:cNvGrpSpPr/>
+            <p:nvPr/>
+          </p:nvGrpSpPr>
+          <p:grpSpPr>
+            <a:xfrm>
+              <a:off x="7185990" y="2640495"/>
+              <a:ext cx="2716695" cy="1577009"/>
+              <a:chOff x="6500192" y="2640495"/>
+              <a:chExt cx="2716695" cy="1577009"/>
+            </a:xfrm>
+          </p:grpSpPr>
+          <p:grpSp>
+            <p:nvGrpSpPr>
+              <p:cNvPr id="8" name="Group 7">
+                <a:extLst>
+                  <a:ext uri="{FF2B5EF4-FFF2-40B4-BE49-F238E27FC236}">
+                    <a16:creationId xmlns:a16="http://schemas.microsoft.com/office/drawing/2014/main" id="{7CE25A49-AE87-2B55-03D7-B1DC81E8A317}"/>
+                  </a:ext>
+                </a:extLst>
+              </p:cNvPr>
+              <p:cNvGrpSpPr/>
+              <p:nvPr/>
+            </p:nvGrpSpPr>
+            <p:grpSpPr>
+              <a:xfrm>
+                <a:off x="6800300" y="2815877"/>
+                <a:ext cx="2116478" cy="1010294"/>
+                <a:chOff x="6743980" y="2815877"/>
+                <a:chExt cx="2116478" cy="1010294"/>
+              </a:xfrm>
+            </p:grpSpPr>
+            <p:sp>
+              <p:nvSpPr>
+                <p:cNvPr id="4" name="矩形 3">
+                  <a:extLst>
+                    <a:ext uri="{FF2B5EF4-FFF2-40B4-BE49-F238E27FC236}">
+                      <a16:creationId xmlns:a16="http://schemas.microsoft.com/office/drawing/2014/main" id="{68924B86-E5E9-2247-A385-17C2F6B27826}"/>
+                    </a:ext>
+                  </a:extLst>
+                </p:cNvPr>
+                <p:cNvSpPr/>
+                <p:nvPr/>
+              </p:nvSpPr>
+              <p:spPr>
+                <a:xfrm>
+                  <a:off x="6743980" y="3321024"/>
+                  <a:ext cx="2116478" cy="505147"/>
+                </a:xfrm>
+                <a:prstGeom prst="rect">
+                  <a:avLst/>
+                </a:prstGeom>
+                <a:noFill/>
+                <a:ln w="25400">
+                  <a:solidFill>
+                    <a:schemeClr val="tx1"/>
+                  </a:solidFill>
+                </a:ln>
+              </p:spPr>
+              <p:style>
+                <a:lnRef idx="2">
+                  <a:schemeClr val="accent2">
+                    <a:shade val="50000"/>
+                  </a:schemeClr>
+                </a:lnRef>
+                <a:fillRef idx="1">
+                  <a:schemeClr val="accent2"/>
+                </a:fillRef>
+                <a:effectRef idx="0">
+                  <a:schemeClr val="accent2"/>
+                </a:effectRef>
+                <a:fontRef idx="minor">
+                  <a:schemeClr val="lt1"/>
+                </a:fontRef>
+              </p:style>
+              <p:txBody>
+                <a:bodyPr rtlCol="0" anchor="ctr"/>
+                <a:lstStyle/>
+                <a:p>
+                  <a:pPr algn="ctr"/>
+                  <a:r>
+                    <a:rPr kumimoji="1" lang="en-US" altLang="zh-CN" sz="1200" b="1" dirty="0" err="1">
+                      <a:solidFill>
+                        <a:sysClr val="windowText" lastClr="000000"/>
+                      </a:solidFill>
+                      <a:latin typeface="DengXian" panose="02010600030101010101" pitchFamily="2" charset="-122"/>
+                      <a:ea typeface="DengXian" panose="02010600030101010101" pitchFamily="2" charset="-122"/>
+                    </a:rPr>
+                    <a:t>person</a:t>
+                  </a:r>
+                  <a:r>
+                    <a:rPr kumimoji="1" lang="en-US" altLang="zh-CN" sz="1200" dirty="0" err="1">
+                      <a:solidFill>
+                        <a:sysClr val="windowText" lastClr="000000"/>
+                      </a:solidFill>
+                      <a:latin typeface="DengXian" panose="02010600030101010101" pitchFamily="2" charset="-122"/>
+                      <a:ea typeface="DengXian" panose="02010600030101010101" pitchFamily="2" charset="-122"/>
+                    </a:rPr>
+                    <a:t>.id</a:t>
+                  </a:r>
+                  <a:r>
+                    <a:rPr kumimoji="1" lang="en-US" altLang="zh-CN" sz="1200" dirty="0">
+                      <a:solidFill>
+                        <a:sysClr val="windowText" lastClr="000000"/>
+                      </a:solidFill>
+                      <a:latin typeface="DengXian" panose="02010600030101010101" pitchFamily="2" charset="-122"/>
+                      <a:ea typeface="DengXian" panose="02010600030101010101" pitchFamily="2" charset="-122"/>
+                    </a:rPr>
+                    <a:t>:</a:t>
+                  </a:r>
+                  <a:r>
+                    <a:rPr kumimoji="1" lang="zh-CN" altLang="en-US" sz="1200" dirty="0">
+                      <a:solidFill>
+                        <a:sysClr val="windowText" lastClr="000000"/>
+                      </a:solidFill>
+                      <a:latin typeface="DengXian" panose="02010600030101010101" pitchFamily="2" charset="-122"/>
+                      <a:ea typeface="DengXian" panose="02010600030101010101" pitchFamily="2" charset="-122"/>
+                    </a:rPr>
+                    <a:t> </a:t>
+                  </a:r>
+                  <a:r>
+                    <a:rPr kumimoji="1" lang="en-US" altLang="zh-CN" sz="1200" dirty="0">
+                      <a:solidFill>
+                        <a:sysClr val="windowText" lastClr="000000"/>
+                      </a:solidFill>
+                      <a:latin typeface="DengXian" panose="02010600030101010101" pitchFamily="2" charset="-122"/>
+                      <a:ea typeface="DengXian" panose="02010600030101010101" pitchFamily="2" charset="-122"/>
+                    </a:rPr>
+                    <a:t>${id}</a:t>
+                  </a:r>
+                  <a:endParaRPr kumimoji="1" lang="zh-CN" altLang="en-US" sz="1200" dirty="0">
+                    <a:solidFill>
+                      <a:sysClr val="windowText" lastClr="000000"/>
+                    </a:solidFill>
+                    <a:latin typeface="DengXian" panose="02010600030101010101" pitchFamily="2" charset="-122"/>
+                    <a:ea typeface="DengXian" panose="02010600030101010101" pitchFamily="2" charset="-122"/>
+                  </a:endParaRPr>
+                </a:p>
+              </p:txBody>
+            </p:sp>
+            <p:sp>
+              <p:nvSpPr>
+                <p:cNvPr id="5" name="矩形 9">
+                  <a:extLst>
+                    <a:ext uri="{FF2B5EF4-FFF2-40B4-BE49-F238E27FC236}">
+                      <a16:creationId xmlns:a16="http://schemas.microsoft.com/office/drawing/2014/main" id="{6641C98C-130F-B917-6069-671A355C0494}"/>
+                    </a:ext>
+                  </a:extLst>
+                </p:cNvPr>
+                <p:cNvSpPr/>
+                <p:nvPr/>
+              </p:nvSpPr>
+              <p:spPr>
+                <a:xfrm>
+                  <a:off x="6743980" y="2815877"/>
+                  <a:ext cx="2116478" cy="505147"/>
+                </a:xfrm>
+                <a:prstGeom prst="rect">
+                  <a:avLst/>
+                </a:prstGeom>
+                <a:solidFill>
+                  <a:schemeClr val="accent6">
+                    <a:lumMod val="60000"/>
+                    <a:lumOff val="40000"/>
+                  </a:schemeClr>
+                </a:solidFill>
+                <a:ln w="25400">
+                  <a:solidFill>
+                    <a:schemeClr val="tx1"/>
+                  </a:solidFill>
+                </a:ln>
+              </p:spPr>
+              <p:style>
+                <a:lnRef idx="2">
+                  <a:schemeClr val="accent2">
+                    <a:shade val="50000"/>
+                  </a:schemeClr>
+                </a:lnRef>
+                <a:fillRef idx="1">
+                  <a:schemeClr val="accent2"/>
+                </a:fillRef>
+                <a:effectRef idx="0">
+                  <a:schemeClr val="accent2"/>
+                </a:effectRef>
+                <a:fontRef idx="minor">
+                  <a:schemeClr val="lt1"/>
+                </a:fontRef>
+              </p:style>
+              <p:txBody>
+                <a:bodyPr rtlCol="0" anchor="ctr"/>
+                <a:lstStyle/>
+                <a:p>
+                  <a:pPr algn="ctr"/>
+                  <a:r>
+                    <a:rPr kumimoji="1" lang="en-US" altLang="zh-CN" sz="1200" b="1" dirty="0">
+                      <a:solidFill>
+                        <a:sysClr val="windowText" lastClr="000000"/>
+                      </a:solidFill>
+                    </a:rPr>
+                    <a:t>person</a:t>
+                  </a:r>
+                  <a:r>
+                    <a:rPr kumimoji="1" lang="zh-CN" altLang="en-US" sz="1200" dirty="0">
+                      <a:solidFill>
+                        <a:sysClr val="windowText" lastClr="000000"/>
+                      </a:solidFill>
+                    </a:rPr>
+                    <a:t> </a:t>
+                  </a:r>
+                  <a:r>
+                    <a:rPr kumimoji="1" lang="en-US" altLang="zh-CN" sz="1200" dirty="0">
+                      <a:solidFill>
+                        <a:sysClr val="windowText" lastClr="000000"/>
+                      </a:solidFill>
+                    </a:rPr>
+                    <a:t>:</a:t>
+                  </a:r>
+                  <a:r>
+                    <a:rPr kumimoji="1" lang="zh-CN" altLang="en-US" sz="1200" dirty="0">
+                      <a:solidFill>
+                        <a:sysClr val="windowText" lastClr="000000"/>
+                      </a:solidFill>
+                    </a:rPr>
+                    <a:t> </a:t>
+                  </a:r>
+                  <a:r>
+                    <a:rPr kumimoji="1" lang="en-US" altLang="zh-CN" sz="1200" dirty="0">
+                      <a:solidFill>
+                        <a:sysClr val="windowText" lastClr="000000"/>
+                      </a:solidFill>
+                    </a:rPr>
+                    <a:t>Person</a:t>
+                  </a:r>
+                  <a:endParaRPr kumimoji="1" lang="zh-CN" altLang="en-US" sz="1200" dirty="0">
+                    <a:solidFill>
+                      <a:sysClr val="windowText" lastClr="000000"/>
+                    </a:solidFill>
+                  </a:endParaRPr>
+                </a:p>
+              </p:txBody>
+            </p:sp>
+          </p:grpSp>
+          <p:sp>
+            <p:nvSpPr>
+              <p:cNvPr id="7" name="矩形 2">
+                <a:extLst>
+                  <a:ext uri="{FF2B5EF4-FFF2-40B4-BE49-F238E27FC236}">
+                    <a16:creationId xmlns:a16="http://schemas.microsoft.com/office/drawing/2014/main" id="{796335C9-7FF2-C371-B888-EBFB3C3FDC46}"/>
+                  </a:ext>
+                </a:extLst>
+              </p:cNvPr>
+              <p:cNvSpPr/>
+              <p:nvPr/>
+            </p:nvSpPr>
+            <p:spPr>
+              <a:xfrm>
+                <a:off x="6500192" y="2640495"/>
+                <a:ext cx="2716695" cy="1577009"/>
+              </a:xfrm>
+              <a:prstGeom prst="rect">
+                <a:avLst/>
+              </a:prstGeom>
+              <a:noFill/>
+              <a:ln w="25400">
                 <a:solidFill>
                   <a:schemeClr val="tx1"/>
                 </a:solidFill>
-              </a:rPr>
-              <a:t>Company</a:t>
-            </a:r>
-            <a:endParaRPr lang="en-CN" b="1" dirty="0">
-              <a:solidFill>
-                <a:schemeClr val="tx1"/>
-              </a:solidFill>
-            </a:endParaRPr>
-          </a:p>
-        </p:txBody>
-      </p:sp>
-      <p:sp>
-        <p:nvSpPr>
-          <p:cNvPr id="6" name="Rectangle 5">
-            <a:extLst>
-              <a:ext uri="{FF2B5EF4-FFF2-40B4-BE49-F238E27FC236}">
-                <a16:creationId xmlns:a16="http://schemas.microsoft.com/office/drawing/2014/main" id="{4C51DCB4-07F1-ACD1-2A47-E37BE04A33BA}"/>
-              </a:ext>
-            </a:extLst>
-          </p:cNvPr>
-          <p:cNvSpPr/>
-          <p:nvPr/>
-        </p:nvSpPr>
-        <p:spPr>
-          <a:xfrm>
-            <a:off x="7040605" y="2861420"/>
-            <a:ext cx="1226941" cy="387178"/>
-          </a:xfrm>
-          <a:prstGeom prst="rect">
-            <a:avLst/>
-          </a:prstGeom>
-          <a:solidFill>
-            <a:schemeClr val="accent1">
-              <a:lumMod val="60000"/>
-              <a:lumOff val="40000"/>
-            </a:schemeClr>
-          </a:solidFill>
-          <a:ln w="22225">
-            <a:solidFill>
-              <a:schemeClr val="tx1"/>
-            </a:solidFill>
-          </a:ln>
-        </p:spPr>
-        <p:style>
-          <a:lnRef idx="2">
-            <a:schemeClr val="accent1">
-              <a:shade val="50000"/>
-            </a:schemeClr>
-          </a:lnRef>
-          <a:fillRef idx="1">
-            <a:schemeClr val="accent1"/>
-          </a:fillRef>
-          <a:effectRef idx="0">
-            <a:schemeClr val="accent1"/>
-          </a:effectRef>
-          <a:fontRef idx="minor">
-            <a:schemeClr val="lt1"/>
-          </a:fontRef>
-        </p:style>
-        <p:txBody>
-          <a:bodyPr rtlCol="0" anchor="ctr"/>
-          <a:lstStyle/>
-          <a:p>
-            <a:pPr algn="ctr"/>
-            <a:r>
-              <a:rPr lang="en-US" altLang="zh-CN" b="1" dirty="0">
-                <a:solidFill>
-                  <a:schemeClr val="tx1"/>
-                </a:solidFill>
-              </a:rPr>
-              <a:t>Account</a:t>
-            </a:r>
-            <a:endParaRPr lang="en-CN" b="1" dirty="0">
-              <a:solidFill>
-                <a:schemeClr val="tx1"/>
-              </a:solidFill>
-            </a:endParaRPr>
-          </a:p>
-        </p:txBody>
-      </p:sp>
-      <p:sp>
-        <p:nvSpPr>
-          <p:cNvPr id="9" name="Rectangle 8">
-            <a:extLst>
-              <a:ext uri="{FF2B5EF4-FFF2-40B4-BE49-F238E27FC236}">
-                <a16:creationId xmlns:a16="http://schemas.microsoft.com/office/drawing/2014/main" id="{5F68F319-B446-C876-5ECA-738B6558B6E1}"/>
-              </a:ext>
-            </a:extLst>
-          </p:cNvPr>
-          <p:cNvSpPr/>
-          <p:nvPr/>
-        </p:nvSpPr>
-        <p:spPr>
-          <a:xfrm>
-            <a:off x="8567168" y="2861420"/>
-            <a:ext cx="1215845" cy="387178"/>
-          </a:xfrm>
-          <a:prstGeom prst="rect">
-            <a:avLst/>
-          </a:prstGeom>
-          <a:solidFill>
-            <a:schemeClr val="accent4">
-              <a:lumMod val="60000"/>
-              <a:lumOff val="40000"/>
-            </a:schemeClr>
-          </a:solidFill>
-          <a:ln w="22225">
-            <a:solidFill>
-              <a:schemeClr val="tx1"/>
-            </a:solidFill>
-          </a:ln>
-        </p:spPr>
-        <p:style>
-          <a:lnRef idx="2">
-            <a:schemeClr val="accent1">
-              <a:shade val="50000"/>
-            </a:schemeClr>
-          </a:lnRef>
-          <a:fillRef idx="1">
-            <a:schemeClr val="accent1"/>
-          </a:fillRef>
-          <a:effectRef idx="0">
-            <a:schemeClr val="accent1"/>
-          </a:effectRef>
-          <a:fontRef idx="minor">
-            <a:schemeClr val="lt1"/>
-          </a:fontRef>
-        </p:style>
-        <p:txBody>
-          <a:bodyPr rtlCol="0" anchor="ctr"/>
-          <a:lstStyle/>
-          <a:p>
-            <a:pPr algn="ctr"/>
-            <a:r>
-              <a:rPr lang="en-US" altLang="zh-CN" b="1" dirty="0">
-                <a:solidFill>
-                  <a:schemeClr val="tx1"/>
-                </a:solidFill>
-              </a:rPr>
-              <a:t>Medium</a:t>
-            </a:r>
-            <a:endParaRPr lang="en-CN" b="1" dirty="0">
-              <a:solidFill>
-                <a:schemeClr val="tx1"/>
-              </a:solidFill>
-            </a:endParaRPr>
-          </a:p>
-        </p:txBody>
-      </p:sp>
-      <p:sp>
-        <p:nvSpPr>
-          <p:cNvPr id="12" name="Rectangle 11">
-            <a:extLst>
-              <a:ext uri="{FF2B5EF4-FFF2-40B4-BE49-F238E27FC236}">
-                <a16:creationId xmlns:a16="http://schemas.microsoft.com/office/drawing/2014/main" id="{74363A22-BDF1-F1C7-E411-2E379C3A7160}"/>
-              </a:ext>
-            </a:extLst>
-          </p:cNvPr>
-          <p:cNvSpPr/>
-          <p:nvPr/>
-        </p:nvSpPr>
-        <p:spPr>
-          <a:xfrm>
-            <a:off x="5506920" y="2861420"/>
-            <a:ext cx="1226977" cy="387178"/>
-          </a:xfrm>
-          <a:prstGeom prst="rect">
-            <a:avLst/>
-          </a:prstGeom>
-          <a:solidFill>
-            <a:schemeClr val="accent2">
-              <a:lumMod val="60000"/>
-              <a:lumOff val="40000"/>
-            </a:schemeClr>
-          </a:solidFill>
-          <a:ln w="22225">
-            <a:solidFill>
-              <a:schemeClr val="tx1"/>
-            </a:solidFill>
-          </a:ln>
-        </p:spPr>
-        <p:style>
-          <a:lnRef idx="2">
-            <a:schemeClr val="accent1">
-              <a:shade val="50000"/>
-            </a:schemeClr>
-          </a:lnRef>
-          <a:fillRef idx="1">
-            <a:schemeClr val="accent1"/>
-          </a:fillRef>
-          <a:effectRef idx="0">
-            <a:schemeClr val="accent1"/>
-          </a:effectRef>
-          <a:fontRef idx="minor">
-            <a:schemeClr val="lt1"/>
-          </a:fontRef>
-        </p:style>
-        <p:txBody>
-          <a:bodyPr rtlCol="0" anchor="ctr"/>
-          <a:lstStyle/>
-          <a:p>
-            <a:pPr algn="ctr"/>
-            <a:r>
-              <a:rPr lang="en-US" altLang="zh-CN" b="1" dirty="0">
-                <a:solidFill>
-                  <a:schemeClr val="tx1"/>
-                </a:solidFill>
-              </a:rPr>
-              <a:t>Loan</a:t>
-            </a:r>
-            <a:endParaRPr lang="en-CN" b="1" dirty="0">
-              <a:solidFill>
-                <a:schemeClr val="tx1"/>
-              </a:solidFill>
-            </a:endParaRPr>
-          </a:p>
-        </p:txBody>
-      </p:sp>
-      <p:sp>
-        <p:nvSpPr>
-          <p:cNvPr id="2" name="文本框 12">
-            <a:extLst>
-              <a:ext uri="{FF2B5EF4-FFF2-40B4-BE49-F238E27FC236}">
-                <a16:creationId xmlns:a16="http://schemas.microsoft.com/office/drawing/2014/main" id="{F15BB429-1D1A-0E43-F714-5B25121059E2}"/>
-              </a:ext>
-            </a:extLst>
-          </p:cNvPr>
-          <p:cNvSpPr txBox="1"/>
-          <p:nvPr/>
-        </p:nvSpPr>
-        <p:spPr>
-          <a:xfrm>
-            <a:off x="2468880" y="3867488"/>
-            <a:ext cx="2583766" cy="1015663"/>
-          </a:xfrm>
-          <a:prstGeom prst="rect">
-            <a:avLst/>
-          </a:prstGeom>
-          <a:noFill/>
-        </p:spPr>
-        <p:txBody>
-          <a:bodyPr wrap="square" rtlCol="0">
-            <a:spAutoFit/>
-          </a:bodyPr>
-          <a:lstStyle/>
-          <a:p>
-            <a:r>
-              <a:rPr kumimoji="1" lang="en-US" altLang="zh-CN" sz="1200" b="1" dirty="0">
+                <a:prstDash val="dash"/>
+              </a:ln>
+            </p:spPr>
+            <p:style>
+              <a:lnRef idx="2">
+                <a:schemeClr val="accent2">
+                  <a:shade val="50000"/>
+                </a:schemeClr>
+              </a:lnRef>
+              <a:fillRef idx="1">
+                <a:schemeClr val="accent2"/>
+              </a:fillRef>
+              <a:effectRef idx="0">
+                <a:schemeClr val="accent2"/>
+              </a:effectRef>
+              <a:fontRef idx="minor">
+                <a:schemeClr val="lt1"/>
+              </a:fontRef>
+            </p:style>
+            <p:txBody>
+              <a:bodyPr rtlCol="0" anchor="b"/>
+              <a:lstStyle/>
+              <a:p>
+                <a:pPr algn="ctr"/>
+                <a:r>
+                  <a:rPr kumimoji="1" lang="en-US" altLang="zh-CN" sz="1200" b="1" dirty="0">
+                    <a:solidFill>
+                      <a:srgbClr val="FF0000"/>
+                    </a:solidFill>
+                    <a:latin typeface="DengXian" panose="02010600030101010101" pitchFamily="2" charset="-122"/>
+                    <a:ea typeface="DengXian" panose="02010600030101010101" pitchFamily="2" charset="-122"/>
+                  </a:rPr>
+                  <a:t>RESULT</a:t>
+                </a:r>
+                <a:r>
+                  <a:rPr kumimoji="1" lang="zh-CN" altLang="en-US" sz="1200" b="1" dirty="0">
+                    <a:solidFill>
+                      <a:srgbClr val="FF0000"/>
+                    </a:solidFill>
+                    <a:latin typeface="DengXian" panose="02010600030101010101" pitchFamily="2" charset="-122"/>
+                    <a:ea typeface="DengXian" panose="02010600030101010101" pitchFamily="2" charset="-122"/>
+                  </a:rPr>
+                  <a:t> </a:t>
+                </a:r>
+                <a:r>
+                  <a:rPr kumimoji="1" lang="en-US" altLang="zh-CN" sz="1200" dirty="0">
+                    <a:solidFill>
+                      <a:sysClr val="windowText" lastClr="000000"/>
+                    </a:solidFill>
+                    <a:latin typeface="DengXian" panose="02010600030101010101" pitchFamily="2" charset="-122"/>
+                    <a:ea typeface="DengXian" panose="02010600030101010101" pitchFamily="2" charset="-122"/>
+                  </a:rPr>
+                  <a:t>properties(</a:t>
+                </a:r>
+                <a:r>
+                  <a:rPr kumimoji="1" lang="en-US" altLang="zh-CN" sz="1200" b="1" dirty="0">
+                    <a:solidFill>
+                      <a:sysClr val="windowText" lastClr="000000"/>
+                    </a:solidFill>
+                    <a:latin typeface="DengXian" panose="02010600030101010101" pitchFamily="2" charset="-122"/>
+                    <a:ea typeface="DengXian" panose="02010600030101010101" pitchFamily="2" charset="-122"/>
+                  </a:rPr>
+                  <a:t>account</a:t>
+                </a:r>
+                <a:r>
+                  <a:rPr kumimoji="1" lang="en-US" altLang="zh-CN" sz="1200" dirty="0">
+                    <a:solidFill>
+                      <a:sysClr val="windowText" lastClr="000000"/>
+                    </a:solidFill>
+                    <a:latin typeface="DengXian" panose="02010600030101010101" pitchFamily="2" charset="-122"/>
+                    <a:ea typeface="DengXian" panose="02010600030101010101" pitchFamily="2" charset="-122"/>
+                  </a:rPr>
+                  <a:t>)</a:t>
+                </a:r>
+              </a:p>
+            </p:txBody>
+          </p:sp>
+        </p:grpSp>
+        <p:sp>
+          <p:nvSpPr>
+            <p:cNvPr id="12" name="文本框 7">
+              <a:extLst>
+                <a:ext uri="{FF2B5EF4-FFF2-40B4-BE49-F238E27FC236}">
+                  <a16:creationId xmlns:a16="http://schemas.microsoft.com/office/drawing/2014/main" id="{AD01137A-7769-D5E3-C126-DE166D6BD9DD}"/>
+                </a:ext>
+              </a:extLst>
+            </p:cNvPr>
+            <p:cNvSpPr txBox="1"/>
+            <p:nvPr/>
+          </p:nvSpPr>
+          <p:spPr>
+            <a:xfrm>
+              <a:off x="5768906" y="3228945"/>
+              <a:ext cx="654188" cy="400110"/>
+            </a:xfrm>
+            <a:prstGeom prst="rect">
+              <a:avLst/>
+            </a:prstGeom>
+            <a:noFill/>
+          </p:spPr>
+          <p:txBody>
+            <a:bodyPr wrap="square" rtlCol="0">
+              <a:spAutoFit/>
+            </a:bodyPr>
+            <a:lstStyle/>
+            <a:p>
+              <a:pPr algn="ctr"/>
+              <a:r>
+                <a:rPr kumimoji="1" lang="en-US" altLang="zh-CN" sz="2000" b="1" dirty="0">
+                  <a:latin typeface="DengXian" panose="02010600030101010101" pitchFamily="2" charset="-122"/>
+                  <a:ea typeface="DengXian" panose="02010600030101010101" pitchFamily="2" charset="-122"/>
+                </a:rPr>
+                <a:t>or</a:t>
+              </a:r>
+              <a:endParaRPr kumimoji="1" lang="en-US" altLang="zh-CN" sz="2000" dirty="0">
                 <a:latin typeface="DengXian" panose="02010600030101010101" pitchFamily="2" charset="-122"/>
                 <a:ea typeface="DengXian" panose="02010600030101010101" pitchFamily="2" charset="-122"/>
-              </a:rPr>
-              <a:t>Color:</a:t>
-            </a:r>
-            <a:r>
-              <a:rPr kumimoji="1" lang="zh-CN" altLang="en-US" sz="1200" b="1" dirty="0">
-                <a:latin typeface="DengXian" panose="02010600030101010101" pitchFamily="2" charset="-122"/>
-                <a:ea typeface="DengXian" panose="02010600030101010101" pitchFamily="2" charset="-122"/>
-              </a:rPr>
-              <a:t> </a:t>
-            </a:r>
-            <a:r>
-              <a:rPr kumimoji="1" lang="en-US" altLang="zh-CN" sz="1200" b="1" dirty="0">
-                <a:latin typeface="DengXian" panose="02010600030101010101" pitchFamily="2" charset="-122"/>
-                <a:ea typeface="DengXian" panose="02010600030101010101" pitchFamily="2" charset="-122"/>
-              </a:rPr>
-              <a:t>as</a:t>
-            </a:r>
-            <a:r>
-              <a:rPr kumimoji="1" lang="zh-CN" altLang="en-US" sz="1200" b="1" dirty="0">
-                <a:latin typeface="DengXian" panose="02010600030101010101" pitchFamily="2" charset="-122"/>
-                <a:ea typeface="DengXian" panose="02010600030101010101" pitchFamily="2" charset="-122"/>
-              </a:rPr>
-              <a:t> </a:t>
-            </a:r>
-            <a:r>
-              <a:rPr kumimoji="1" lang="en-US" altLang="zh-CN" sz="1200" b="1" dirty="0">
-                <a:latin typeface="DengXian" panose="02010600030101010101" pitchFamily="2" charset="-122"/>
-                <a:ea typeface="DengXian" panose="02010600030101010101" pitchFamily="2" charset="-122"/>
-              </a:rPr>
-              <a:t>above</a:t>
-            </a:r>
-          </a:p>
-          <a:p>
-            <a:r>
-              <a:rPr kumimoji="1" lang="en-US" altLang="zh-CN" sz="1200" b="1" dirty="0">
-                <a:latin typeface="DengXian" panose="02010600030101010101" pitchFamily="2" charset="-122"/>
-                <a:ea typeface="DengXian" panose="02010600030101010101" pitchFamily="2" charset="-122"/>
-              </a:rPr>
-              <a:t>Font</a:t>
-            </a:r>
-            <a:r>
-              <a:rPr kumimoji="1" lang="zh-CN" altLang="en-US" sz="1200" b="1" dirty="0">
-                <a:latin typeface="DengXian" panose="02010600030101010101" pitchFamily="2" charset="-122"/>
-                <a:ea typeface="DengXian" panose="02010600030101010101" pitchFamily="2" charset="-122"/>
-              </a:rPr>
-              <a:t> </a:t>
-            </a:r>
-            <a:r>
-              <a:rPr kumimoji="1" lang="en-US" altLang="zh-CN" sz="1200" b="1" dirty="0">
-                <a:latin typeface="DengXian" panose="02010600030101010101" pitchFamily="2" charset="-122"/>
-                <a:ea typeface="DengXian" panose="02010600030101010101" pitchFamily="2" charset="-122"/>
-              </a:rPr>
-              <a:t>size:</a:t>
-            </a:r>
-            <a:r>
-              <a:rPr kumimoji="1" lang="zh-CN" altLang="en-US" sz="1200" b="1" dirty="0">
-                <a:latin typeface="DengXian" panose="02010600030101010101" pitchFamily="2" charset="-122"/>
-                <a:ea typeface="DengXian" panose="02010600030101010101" pitchFamily="2" charset="-122"/>
-              </a:rPr>
-              <a:t> </a:t>
-            </a:r>
-            <a:r>
-              <a:rPr kumimoji="1" lang="en-US" altLang="zh-CN" sz="1200" b="1" dirty="0">
-                <a:latin typeface="DengXian" panose="02010600030101010101" pitchFamily="2" charset="-122"/>
-                <a:ea typeface="DengXian" panose="02010600030101010101" pitchFamily="2" charset="-122"/>
-              </a:rPr>
-              <a:t>12</a:t>
-            </a:r>
-          </a:p>
-          <a:p>
-            <a:r>
-              <a:rPr kumimoji="1" lang="en-US" altLang="zh-CN" sz="1200" b="1" dirty="0">
-                <a:latin typeface="DengXian" panose="02010600030101010101" pitchFamily="2" charset="-122"/>
-                <a:ea typeface="DengXian" panose="02010600030101010101" pitchFamily="2" charset="-122"/>
-              </a:rPr>
-              <a:t>Border</a:t>
-            </a:r>
-            <a:r>
-              <a:rPr kumimoji="1" lang="zh-CN" altLang="en-US" sz="1200" b="1" dirty="0">
-                <a:latin typeface="DengXian" panose="02010600030101010101" pitchFamily="2" charset="-122"/>
-                <a:ea typeface="DengXian" panose="02010600030101010101" pitchFamily="2" charset="-122"/>
-              </a:rPr>
-              <a:t> </a:t>
-            </a:r>
-            <a:r>
-              <a:rPr kumimoji="1" lang="en-US" altLang="zh-CN" sz="1200" b="1" dirty="0">
-                <a:latin typeface="DengXian" panose="02010600030101010101" pitchFamily="2" charset="-122"/>
-                <a:ea typeface="DengXian" panose="02010600030101010101" pitchFamily="2" charset="-122"/>
-              </a:rPr>
-              <a:t>width:</a:t>
-            </a:r>
-            <a:r>
-              <a:rPr kumimoji="1" lang="zh-CN" altLang="en-US" sz="1200" b="1" dirty="0">
-                <a:latin typeface="DengXian" panose="02010600030101010101" pitchFamily="2" charset="-122"/>
-                <a:ea typeface="DengXian" panose="02010600030101010101" pitchFamily="2" charset="-122"/>
-              </a:rPr>
-              <a:t> </a:t>
-            </a:r>
-            <a:r>
-              <a:rPr kumimoji="1" lang="en-US" altLang="zh-CN" sz="1200" b="1" dirty="0">
-                <a:latin typeface="DengXian" panose="02010600030101010101" pitchFamily="2" charset="-122"/>
-                <a:ea typeface="DengXian" panose="02010600030101010101" pitchFamily="2" charset="-122"/>
-              </a:rPr>
-              <a:t>2pt</a:t>
-            </a:r>
-          </a:p>
-          <a:p>
-            <a:r>
-              <a:rPr kumimoji="1" lang="en-US" altLang="zh-CN" sz="1200" b="1" dirty="0">
-                <a:latin typeface="DengXian" panose="02010600030101010101" pitchFamily="2" charset="-122"/>
-                <a:ea typeface="DengXian" panose="02010600030101010101" pitchFamily="2" charset="-122"/>
-              </a:rPr>
-              <a:t>Result:</a:t>
-            </a:r>
-            <a:r>
-              <a:rPr kumimoji="1" lang="zh-CN" altLang="en-US" sz="1200" b="1" dirty="0">
-                <a:latin typeface="DengXian" panose="02010600030101010101" pitchFamily="2" charset="-122"/>
-                <a:ea typeface="DengXian" panose="02010600030101010101" pitchFamily="2" charset="-122"/>
-              </a:rPr>
-              <a:t> </a:t>
-            </a:r>
-            <a:r>
-              <a:rPr kumimoji="1" lang="en-US" altLang="zh-CN" sz="1200" b="1" dirty="0">
-                <a:latin typeface="DengXian" panose="02010600030101010101" pitchFamily="2" charset="-122"/>
-                <a:ea typeface="DengXian" panose="02010600030101010101" pitchFamily="2" charset="-122"/>
-              </a:rPr>
-              <a:t>red</a:t>
-            </a:r>
-            <a:r>
-              <a:rPr kumimoji="1" lang="zh-CN" altLang="en-US" sz="1200" b="1" dirty="0">
-                <a:latin typeface="DengXian" panose="02010600030101010101" pitchFamily="2" charset="-122"/>
-                <a:ea typeface="DengXian" panose="02010600030101010101" pitchFamily="2" charset="-122"/>
-              </a:rPr>
-              <a:t> </a:t>
-            </a:r>
-            <a:r>
-              <a:rPr kumimoji="1" lang="en-US" altLang="zh-CN" sz="1200" b="1" dirty="0">
-                <a:latin typeface="DengXian" panose="02010600030101010101" pitchFamily="2" charset="-122"/>
-                <a:ea typeface="DengXian" panose="02010600030101010101" pitchFamily="2" charset="-122"/>
-              </a:rPr>
-              <a:t>color</a:t>
-            </a:r>
-            <a:r>
-              <a:rPr kumimoji="1" lang="zh-CN" altLang="en-US" sz="1200" b="1" dirty="0">
-                <a:latin typeface="DengXian" panose="02010600030101010101" pitchFamily="2" charset="-122"/>
-                <a:ea typeface="DengXian" panose="02010600030101010101" pitchFamily="2" charset="-122"/>
-              </a:rPr>
-              <a:t> </a:t>
-            </a:r>
-            <a:r>
-              <a:rPr kumimoji="1" lang="en-US" altLang="zh-CN" sz="1200" b="1" dirty="0">
-                <a:latin typeface="DengXian" panose="02010600030101010101" pitchFamily="2" charset="-122"/>
-                <a:ea typeface="DengXian" panose="02010600030101010101" pitchFamily="2" charset="-122"/>
-              </a:rPr>
-              <a:t>and</a:t>
-            </a:r>
-            <a:r>
-              <a:rPr kumimoji="1" lang="zh-CN" altLang="en-US" sz="1200" b="1" dirty="0">
-                <a:latin typeface="DengXian" panose="02010600030101010101" pitchFamily="2" charset="-122"/>
-                <a:ea typeface="DengXian" panose="02010600030101010101" pitchFamily="2" charset="-122"/>
-              </a:rPr>
-              <a:t> </a:t>
-            </a:r>
-            <a:r>
-              <a:rPr kumimoji="1" lang="en-US" altLang="zh-CN" sz="1200" b="1" dirty="0">
-                <a:latin typeface="DengXian" panose="02010600030101010101" pitchFamily="2" charset="-122"/>
-                <a:ea typeface="DengXian" panose="02010600030101010101" pitchFamily="2" charset="-122"/>
-              </a:rPr>
-              <a:t>bold</a:t>
-            </a:r>
-          </a:p>
-          <a:p>
-            <a:r>
-              <a:rPr kumimoji="1" lang="en-US" altLang="zh-CN" sz="1200" b="1" dirty="0" err="1">
-                <a:latin typeface="DengXian" panose="02010600030101010101" pitchFamily="2" charset="-122"/>
-                <a:ea typeface="DengXian" panose="02010600030101010101" pitchFamily="2" charset="-122"/>
-              </a:rPr>
-              <a:t>Groupby</a:t>
-            </a:r>
-            <a:r>
-              <a:rPr kumimoji="1" lang="en-US" altLang="zh-CN" sz="1200" b="1" dirty="0">
-                <a:latin typeface="DengXian" panose="02010600030101010101" pitchFamily="2" charset="-122"/>
-                <a:ea typeface="DengXian" panose="02010600030101010101" pitchFamily="2" charset="-122"/>
-              </a:rPr>
-              <a:t>:</a:t>
-            </a:r>
-            <a:r>
-              <a:rPr kumimoji="1" lang="zh-CN" altLang="en-US" sz="1200" b="1" dirty="0">
-                <a:latin typeface="DengXian" panose="02010600030101010101" pitchFamily="2" charset="-122"/>
-                <a:ea typeface="DengXian" panose="02010600030101010101" pitchFamily="2" charset="-122"/>
-              </a:rPr>
-              <a:t> </a:t>
-            </a:r>
-            <a:r>
-              <a:rPr kumimoji="1" lang="en-US" altLang="zh-CN" sz="1200" b="1" dirty="0">
-                <a:latin typeface="DengXian" panose="02010600030101010101" pitchFamily="2" charset="-122"/>
-                <a:ea typeface="DengXian" panose="02010600030101010101" pitchFamily="2" charset="-122"/>
-              </a:rPr>
-              <a:t>red</a:t>
-            </a:r>
-            <a:r>
-              <a:rPr kumimoji="1" lang="zh-CN" altLang="en-US" sz="1200" b="1" dirty="0">
-                <a:latin typeface="DengXian" panose="02010600030101010101" pitchFamily="2" charset="-122"/>
-                <a:ea typeface="DengXian" panose="02010600030101010101" pitchFamily="2" charset="-122"/>
-              </a:rPr>
-              <a:t> </a:t>
-            </a:r>
-            <a:r>
-              <a:rPr kumimoji="1" lang="en-US" altLang="zh-CN" sz="1200" b="1" dirty="0">
-                <a:latin typeface="DengXian" panose="02010600030101010101" pitchFamily="2" charset="-122"/>
-                <a:ea typeface="DengXian" panose="02010600030101010101" pitchFamily="2" charset="-122"/>
-              </a:rPr>
-              <a:t>color</a:t>
-            </a:r>
-            <a:r>
-              <a:rPr kumimoji="1" lang="zh-CN" altLang="en-US" sz="1200" b="1" dirty="0">
-                <a:latin typeface="DengXian" panose="02010600030101010101" pitchFamily="2" charset="-122"/>
-                <a:ea typeface="DengXian" panose="02010600030101010101" pitchFamily="2" charset="-122"/>
-              </a:rPr>
-              <a:t> </a:t>
-            </a:r>
-            <a:r>
-              <a:rPr kumimoji="1" lang="en-US" altLang="zh-CN" sz="1200" b="1" dirty="0">
-                <a:latin typeface="DengXian" panose="02010600030101010101" pitchFamily="2" charset="-122"/>
-                <a:ea typeface="DengXian" panose="02010600030101010101" pitchFamily="2" charset="-122"/>
-              </a:rPr>
-              <a:t>and</a:t>
-            </a:r>
-            <a:r>
-              <a:rPr kumimoji="1" lang="zh-CN" altLang="en-US" sz="1200" b="1" dirty="0">
-                <a:latin typeface="DengXian" panose="02010600030101010101" pitchFamily="2" charset="-122"/>
-                <a:ea typeface="DengXian" panose="02010600030101010101" pitchFamily="2" charset="-122"/>
-              </a:rPr>
-              <a:t> </a:t>
-            </a:r>
-            <a:r>
-              <a:rPr kumimoji="1" lang="en-US" altLang="zh-CN" sz="1200" b="1" dirty="0">
-                <a:latin typeface="DengXian" panose="02010600030101010101" pitchFamily="2" charset="-122"/>
-                <a:ea typeface="DengXian" panose="02010600030101010101" pitchFamily="2" charset="-122"/>
-              </a:rPr>
-              <a:t>bold</a:t>
-            </a:r>
-          </a:p>
-        </p:txBody>
-      </p:sp>
+              </a:endParaRPr>
+            </a:p>
+          </p:txBody>
+        </p:sp>
+      </p:grpSp>
     </p:spTree>
     <p:extLst>
       <p:ext uri="{BB962C8B-B14F-4D97-AF65-F5344CB8AC3E}">
-        <p14:creationId xmlns:p14="http://schemas.microsoft.com/office/powerpoint/2010/main" val="3265552492"/>
+        <p14:creationId xmlns:p14="http://schemas.microsoft.com/office/powerpoint/2010/main" val="3136280630"/>
       </p:ext>
     </p:extLst>
   </p:cSld>
@@ -10342,6 +10483,657 @@
           <a:chExt cx="0" cy="0"/>
         </a:xfrm>
       </p:grpSpPr>
+      <p:sp>
+        <p:nvSpPr>
+          <p:cNvPr id="4" name="Rectangle 3">
+            <a:extLst>
+              <a:ext uri="{FF2B5EF4-FFF2-40B4-BE49-F238E27FC236}">
+                <a16:creationId xmlns:a16="http://schemas.microsoft.com/office/drawing/2014/main" id="{5EFB2F0D-ABB3-D995-FA04-8C359C1827B4}"/>
+              </a:ext>
+            </a:extLst>
+          </p:cNvPr>
+          <p:cNvSpPr/>
+          <p:nvPr/>
+        </p:nvSpPr>
+        <p:spPr>
+          <a:xfrm>
+            <a:off x="2468880" y="2861420"/>
+            <a:ext cx="1215845" cy="387178"/>
+          </a:xfrm>
+          <a:prstGeom prst="rect">
+            <a:avLst/>
+          </a:prstGeom>
+          <a:solidFill>
+            <a:schemeClr val="accent6">
+              <a:lumMod val="60000"/>
+              <a:lumOff val="40000"/>
+            </a:schemeClr>
+          </a:solidFill>
+          <a:ln w="22225">
+            <a:solidFill>
+              <a:schemeClr val="tx1"/>
+            </a:solidFill>
+          </a:ln>
+        </p:spPr>
+        <p:style>
+          <a:lnRef idx="2">
+            <a:schemeClr val="accent1">
+              <a:shade val="50000"/>
+            </a:schemeClr>
+          </a:lnRef>
+          <a:fillRef idx="1">
+            <a:schemeClr val="accent1"/>
+          </a:fillRef>
+          <a:effectRef idx="0">
+            <a:schemeClr val="accent1"/>
+          </a:effectRef>
+          <a:fontRef idx="minor">
+            <a:schemeClr val="lt1"/>
+          </a:fontRef>
+        </p:style>
+        <p:txBody>
+          <a:bodyPr rtlCol="0" anchor="ctr"/>
+          <a:lstStyle/>
+          <a:p>
+            <a:pPr algn="ctr"/>
+            <a:r>
+              <a:rPr lang="en-US" altLang="zh-CN" b="1" dirty="0">
+                <a:solidFill>
+                  <a:schemeClr val="tx1"/>
+                </a:solidFill>
+              </a:rPr>
+              <a:t>Person</a:t>
+            </a:r>
+            <a:endParaRPr lang="en-CN" b="1" dirty="0">
+              <a:solidFill>
+                <a:schemeClr val="tx1"/>
+              </a:solidFill>
+            </a:endParaRPr>
+          </a:p>
+        </p:txBody>
+      </p:sp>
+      <p:sp>
+        <p:nvSpPr>
+          <p:cNvPr id="5" name="Rectangle 4">
+            <a:extLst>
+              <a:ext uri="{FF2B5EF4-FFF2-40B4-BE49-F238E27FC236}">
+                <a16:creationId xmlns:a16="http://schemas.microsoft.com/office/drawing/2014/main" id="{71799D25-8F4B-3E78-7E33-C84644F1D35C}"/>
+              </a:ext>
+            </a:extLst>
+          </p:cNvPr>
+          <p:cNvSpPr/>
+          <p:nvPr/>
+        </p:nvSpPr>
+        <p:spPr>
+          <a:xfrm>
+            <a:off x="3984346" y="2861420"/>
+            <a:ext cx="1215845" cy="387178"/>
+          </a:xfrm>
+          <a:prstGeom prst="rect">
+            <a:avLst/>
+          </a:prstGeom>
+          <a:solidFill>
+            <a:srgbClr val="FF0000">
+              <a:alpha val="30000"/>
+            </a:srgbClr>
+          </a:solidFill>
+          <a:ln w="22225">
+            <a:solidFill>
+              <a:schemeClr val="tx1"/>
+            </a:solidFill>
+          </a:ln>
+        </p:spPr>
+        <p:style>
+          <a:lnRef idx="2">
+            <a:schemeClr val="accent1">
+              <a:shade val="50000"/>
+            </a:schemeClr>
+          </a:lnRef>
+          <a:fillRef idx="1">
+            <a:schemeClr val="accent1"/>
+          </a:fillRef>
+          <a:effectRef idx="0">
+            <a:schemeClr val="accent1"/>
+          </a:effectRef>
+          <a:fontRef idx="minor">
+            <a:schemeClr val="lt1"/>
+          </a:fontRef>
+        </p:style>
+        <p:txBody>
+          <a:bodyPr rtlCol="0" anchor="ctr"/>
+          <a:lstStyle/>
+          <a:p>
+            <a:pPr algn="ctr"/>
+            <a:r>
+              <a:rPr lang="en-US" altLang="zh-CN" b="1" dirty="0">
+                <a:solidFill>
+                  <a:schemeClr val="tx1"/>
+                </a:solidFill>
+              </a:rPr>
+              <a:t>Company</a:t>
+            </a:r>
+            <a:endParaRPr lang="en-CN" b="1" dirty="0">
+              <a:solidFill>
+                <a:schemeClr val="tx1"/>
+              </a:solidFill>
+            </a:endParaRPr>
+          </a:p>
+        </p:txBody>
+      </p:sp>
+      <p:sp>
+        <p:nvSpPr>
+          <p:cNvPr id="6" name="Rectangle 5">
+            <a:extLst>
+              <a:ext uri="{FF2B5EF4-FFF2-40B4-BE49-F238E27FC236}">
+                <a16:creationId xmlns:a16="http://schemas.microsoft.com/office/drawing/2014/main" id="{4C51DCB4-07F1-ACD1-2A47-E37BE04A33BA}"/>
+              </a:ext>
+            </a:extLst>
+          </p:cNvPr>
+          <p:cNvSpPr/>
+          <p:nvPr/>
+        </p:nvSpPr>
+        <p:spPr>
+          <a:xfrm>
+            <a:off x="7040605" y="2861420"/>
+            <a:ext cx="1226941" cy="387178"/>
+          </a:xfrm>
+          <a:prstGeom prst="rect">
+            <a:avLst/>
+          </a:prstGeom>
+          <a:solidFill>
+            <a:schemeClr val="accent1">
+              <a:lumMod val="60000"/>
+              <a:lumOff val="40000"/>
+            </a:schemeClr>
+          </a:solidFill>
+          <a:ln w="22225">
+            <a:solidFill>
+              <a:schemeClr val="tx1"/>
+            </a:solidFill>
+          </a:ln>
+        </p:spPr>
+        <p:style>
+          <a:lnRef idx="2">
+            <a:schemeClr val="accent1">
+              <a:shade val="50000"/>
+            </a:schemeClr>
+          </a:lnRef>
+          <a:fillRef idx="1">
+            <a:schemeClr val="accent1"/>
+          </a:fillRef>
+          <a:effectRef idx="0">
+            <a:schemeClr val="accent1"/>
+          </a:effectRef>
+          <a:fontRef idx="minor">
+            <a:schemeClr val="lt1"/>
+          </a:fontRef>
+        </p:style>
+        <p:txBody>
+          <a:bodyPr rtlCol="0" anchor="ctr"/>
+          <a:lstStyle/>
+          <a:p>
+            <a:pPr algn="ctr"/>
+            <a:r>
+              <a:rPr lang="en-US" altLang="zh-CN" b="1" dirty="0">
+                <a:solidFill>
+                  <a:schemeClr val="tx1"/>
+                </a:solidFill>
+              </a:rPr>
+              <a:t>Account</a:t>
+            </a:r>
+            <a:endParaRPr lang="en-CN" b="1" dirty="0">
+              <a:solidFill>
+                <a:schemeClr val="tx1"/>
+              </a:solidFill>
+            </a:endParaRPr>
+          </a:p>
+        </p:txBody>
+      </p:sp>
+      <p:sp>
+        <p:nvSpPr>
+          <p:cNvPr id="9" name="Rectangle 8">
+            <a:extLst>
+              <a:ext uri="{FF2B5EF4-FFF2-40B4-BE49-F238E27FC236}">
+                <a16:creationId xmlns:a16="http://schemas.microsoft.com/office/drawing/2014/main" id="{5F68F319-B446-C876-5ECA-738B6558B6E1}"/>
+              </a:ext>
+            </a:extLst>
+          </p:cNvPr>
+          <p:cNvSpPr/>
+          <p:nvPr/>
+        </p:nvSpPr>
+        <p:spPr>
+          <a:xfrm>
+            <a:off x="8567168" y="2861420"/>
+            <a:ext cx="1215845" cy="387178"/>
+          </a:xfrm>
+          <a:prstGeom prst="rect">
+            <a:avLst/>
+          </a:prstGeom>
+          <a:solidFill>
+            <a:schemeClr val="accent4">
+              <a:lumMod val="60000"/>
+              <a:lumOff val="40000"/>
+            </a:schemeClr>
+          </a:solidFill>
+          <a:ln w="22225">
+            <a:solidFill>
+              <a:schemeClr val="tx1"/>
+            </a:solidFill>
+          </a:ln>
+        </p:spPr>
+        <p:style>
+          <a:lnRef idx="2">
+            <a:schemeClr val="accent1">
+              <a:shade val="50000"/>
+            </a:schemeClr>
+          </a:lnRef>
+          <a:fillRef idx="1">
+            <a:schemeClr val="accent1"/>
+          </a:fillRef>
+          <a:effectRef idx="0">
+            <a:schemeClr val="accent1"/>
+          </a:effectRef>
+          <a:fontRef idx="minor">
+            <a:schemeClr val="lt1"/>
+          </a:fontRef>
+        </p:style>
+        <p:txBody>
+          <a:bodyPr rtlCol="0" anchor="ctr"/>
+          <a:lstStyle/>
+          <a:p>
+            <a:pPr algn="ctr"/>
+            <a:r>
+              <a:rPr lang="en-US" altLang="zh-CN" b="1" dirty="0">
+                <a:solidFill>
+                  <a:schemeClr val="tx1"/>
+                </a:solidFill>
+              </a:rPr>
+              <a:t>Medium</a:t>
+            </a:r>
+            <a:endParaRPr lang="en-CN" b="1" dirty="0">
+              <a:solidFill>
+                <a:schemeClr val="tx1"/>
+              </a:solidFill>
+            </a:endParaRPr>
+          </a:p>
+        </p:txBody>
+      </p:sp>
+      <p:sp>
+        <p:nvSpPr>
+          <p:cNvPr id="12" name="Rectangle 11">
+            <a:extLst>
+              <a:ext uri="{FF2B5EF4-FFF2-40B4-BE49-F238E27FC236}">
+                <a16:creationId xmlns:a16="http://schemas.microsoft.com/office/drawing/2014/main" id="{74363A22-BDF1-F1C7-E411-2E379C3A7160}"/>
+              </a:ext>
+            </a:extLst>
+          </p:cNvPr>
+          <p:cNvSpPr/>
+          <p:nvPr/>
+        </p:nvSpPr>
+        <p:spPr>
+          <a:xfrm>
+            <a:off x="5506920" y="2861420"/>
+            <a:ext cx="1226977" cy="387178"/>
+          </a:xfrm>
+          <a:prstGeom prst="rect">
+            <a:avLst/>
+          </a:prstGeom>
+          <a:solidFill>
+            <a:schemeClr val="accent2">
+              <a:lumMod val="60000"/>
+              <a:lumOff val="40000"/>
+            </a:schemeClr>
+          </a:solidFill>
+          <a:ln w="22225">
+            <a:solidFill>
+              <a:schemeClr val="tx1"/>
+            </a:solidFill>
+          </a:ln>
+        </p:spPr>
+        <p:style>
+          <a:lnRef idx="2">
+            <a:schemeClr val="accent1">
+              <a:shade val="50000"/>
+            </a:schemeClr>
+          </a:lnRef>
+          <a:fillRef idx="1">
+            <a:schemeClr val="accent1"/>
+          </a:fillRef>
+          <a:effectRef idx="0">
+            <a:schemeClr val="accent1"/>
+          </a:effectRef>
+          <a:fontRef idx="minor">
+            <a:schemeClr val="lt1"/>
+          </a:fontRef>
+        </p:style>
+        <p:txBody>
+          <a:bodyPr rtlCol="0" anchor="ctr"/>
+          <a:lstStyle/>
+          <a:p>
+            <a:pPr algn="ctr"/>
+            <a:r>
+              <a:rPr lang="en-US" altLang="zh-CN" b="1" dirty="0">
+                <a:solidFill>
+                  <a:schemeClr val="tx1"/>
+                </a:solidFill>
+              </a:rPr>
+              <a:t>Loan</a:t>
+            </a:r>
+            <a:endParaRPr lang="en-CN" b="1" dirty="0">
+              <a:solidFill>
+                <a:schemeClr val="tx1"/>
+              </a:solidFill>
+            </a:endParaRPr>
+          </a:p>
+        </p:txBody>
+      </p:sp>
+      <p:sp>
+        <p:nvSpPr>
+          <p:cNvPr id="2" name="文本框 12">
+            <a:extLst>
+              <a:ext uri="{FF2B5EF4-FFF2-40B4-BE49-F238E27FC236}">
+                <a16:creationId xmlns:a16="http://schemas.microsoft.com/office/drawing/2014/main" id="{F15BB429-1D1A-0E43-F714-5B25121059E2}"/>
+              </a:ext>
+            </a:extLst>
+          </p:cNvPr>
+          <p:cNvSpPr txBox="1"/>
+          <p:nvPr/>
+        </p:nvSpPr>
+        <p:spPr>
+          <a:xfrm>
+            <a:off x="2468880" y="3867488"/>
+            <a:ext cx="2583766" cy="1015663"/>
+          </a:xfrm>
+          <a:prstGeom prst="rect">
+            <a:avLst/>
+          </a:prstGeom>
+          <a:noFill/>
+        </p:spPr>
+        <p:txBody>
+          <a:bodyPr wrap="square" rtlCol="0">
+            <a:spAutoFit/>
+          </a:bodyPr>
+          <a:lstStyle/>
+          <a:p>
+            <a:r>
+              <a:rPr kumimoji="1" lang="en-US" altLang="zh-CN" sz="1200" b="1" dirty="0">
+                <a:latin typeface="DengXian" panose="02010600030101010101" pitchFamily="2" charset="-122"/>
+                <a:ea typeface="DengXian" panose="02010600030101010101" pitchFamily="2" charset="-122"/>
+              </a:rPr>
+              <a:t>Color:</a:t>
+            </a:r>
+            <a:r>
+              <a:rPr kumimoji="1" lang="zh-CN" altLang="en-US" sz="1200" b="1" dirty="0">
+                <a:latin typeface="DengXian" panose="02010600030101010101" pitchFamily="2" charset="-122"/>
+                <a:ea typeface="DengXian" panose="02010600030101010101" pitchFamily="2" charset="-122"/>
+              </a:rPr>
+              <a:t> </a:t>
+            </a:r>
+            <a:r>
+              <a:rPr kumimoji="1" lang="en-US" altLang="zh-CN" sz="1200" b="1" dirty="0">
+                <a:latin typeface="DengXian" panose="02010600030101010101" pitchFamily="2" charset="-122"/>
+                <a:ea typeface="DengXian" panose="02010600030101010101" pitchFamily="2" charset="-122"/>
+              </a:rPr>
+              <a:t>as</a:t>
+            </a:r>
+            <a:r>
+              <a:rPr kumimoji="1" lang="zh-CN" altLang="en-US" sz="1200" b="1" dirty="0">
+                <a:latin typeface="DengXian" panose="02010600030101010101" pitchFamily="2" charset="-122"/>
+                <a:ea typeface="DengXian" panose="02010600030101010101" pitchFamily="2" charset="-122"/>
+              </a:rPr>
+              <a:t> </a:t>
+            </a:r>
+            <a:r>
+              <a:rPr kumimoji="1" lang="en-US" altLang="zh-CN" sz="1200" b="1" dirty="0">
+                <a:latin typeface="DengXian" panose="02010600030101010101" pitchFamily="2" charset="-122"/>
+                <a:ea typeface="DengXian" panose="02010600030101010101" pitchFamily="2" charset="-122"/>
+              </a:rPr>
+              <a:t>above</a:t>
+            </a:r>
+          </a:p>
+          <a:p>
+            <a:r>
+              <a:rPr kumimoji="1" lang="en-US" altLang="zh-CN" sz="1200" b="1" dirty="0">
+                <a:latin typeface="DengXian" panose="02010600030101010101" pitchFamily="2" charset="-122"/>
+                <a:ea typeface="DengXian" panose="02010600030101010101" pitchFamily="2" charset="-122"/>
+              </a:rPr>
+              <a:t>Font</a:t>
+            </a:r>
+            <a:r>
+              <a:rPr kumimoji="1" lang="zh-CN" altLang="en-US" sz="1200" b="1" dirty="0">
+                <a:latin typeface="DengXian" panose="02010600030101010101" pitchFamily="2" charset="-122"/>
+                <a:ea typeface="DengXian" panose="02010600030101010101" pitchFamily="2" charset="-122"/>
+              </a:rPr>
+              <a:t> </a:t>
+            </a:r>
+            <a:r>
+              <a:rPr kumimoji="1" lang="en-US" altLang="zh-CN" sz="1200" b="1" dirty="0">
+                <a:latin typeface="DengXian" panose="02010600030101010101" pitchFamily="2" charset="-122"/>
+                <a:ea typeface="DengXian" panose="02010600030101010101" pitchFamily="2" charset="-122"/>
+              </a:rPr>
+              <a:t>size:</a:t>
+            </a:r>
+            <a:r>
+              <a:rPr kumimoji="1" lang="zh-CN" altLang="en-US" sz="1200" b="1" dirty="0">
+                <a:latin typeface="DengXian" panose="02010600030101010101" pitchFamily="2" charset="-122"/>
+                <a:ea typeface="DengXian" panose="02010600030101010101" pitchFamily="2" charset="-122"/>
+              </a:rPr>
+              <a:t> </a:t>
+            </a:r>
+            <a:r>
+              <a:rPr kumimoji="1" lang="en-US" altLang="zh-CN" sz="1200" b="1" dirty="0">
+                <a:latin typeface="DengXian" panose="02010600030101010101" pitchFamily="2" charset="-122"/>
+                <a:ea typeface="DengXian" panose="02010600030101010101" pitchFamily="2" charset="-122"/>
+              </a:rPr>
+              <a:t>12</a:t>
+            </a:r>
+          </a:p>
+          <a:p>
+            <a:r>
+              <a:rPr kumimoji="1" lang="en-US" altLang="zh-CN" sz="1200" b="1" dirty="0">
+                <a:latin typeface="DengXian" panose="02010600030101010101" pitchFamily="2" charset="-122"/>
+                <a:ea typeface="DengXian" panose="02010600030101010101" pitchFamily="2" charset="-122"/>
+              </a:rPr>
+              <a:t>Border</a:t>
+            </a:r>
+            <a:r>
+              <a:rPr kumimoji="1" lang="zh-CN" altLang="en-US" sz="1200" b="1" dirty="0">
+                <a:latin typeface="DengXian" panose="02010600030101010101" pitchFamily="2" charset="-122"/>
+                <a:ea typeface="DengXian" panose="02010600030101010101" pitchFamily="2" charset="-122"/>
+              </a:rPr>
+              <a:t> </a:t>
+            </a:r>
+            <a:r>
+              <a:rPr kumimoji="1" lang="en-US" altLang="zh-CN" sz="1200" b="1" dirty="0">
+                <a:latin typeface="DengXian" panose="02010600030101010101" pitchFamily="2" charset="-122"/>
+                <a:ea typeface="DengXian" panose="02010600030101010101" pitchFamily="2" charset="-122"/>
+              </a:rPr>
+              <a:t>width:</a:t>
+            </a:r>
+            <a:r>
+              <a:rPr kumimoji="1" lang="zh-CN" altLang="en-US" sz="1200" b="1" dirty="0">
+                <a:latin typeface="DengXian" panose="02010600030101010101" pitchFamily="2" charset="-122"/>
+                <a:ea typeface="DengXian" panose="02010600030101010101" pitchFamily="2" charset="-122"/>
+              </a:rPr>
+              <a:t> </a:t>
+            </a:r>
+            <a:r>
+              <a:rPr kumimoji="1" lang="en-US" altLang="zh-CN" sz="1200" b="1" dirty="0">
+                <a:latin typeface="DengXian" panose="02010600030101010101" pitchFamily="2" charset="-122"/>
+                <a:ea typeface="DengXian" panose="02010600030101010101" pitchFamily="2" charset="-122"/>
+              </a:rPr>
+              <a:t>2pt</a:t>
+            </a:r>
+          </a:p>
+          <a:p>
+            <a:r>
+              <a:rPr kumimoji="1" lang="en-US" altLang="zh-CN" sz="1200" b="1" dirty="0">
+                <a:latin typeface="DengXian" panose="02010600030101010101" pitchFamily="2" charset="-122"/>
+                <a:ea typeface="DengXian" panose="02010600030101010101" pitchFamily="2" charset="-122"/>
+              </a:rPr>
+              <a:t>Result:</a:t>
+            </a:r>
+            <a:r>
+              <a:rPr kumimoji="1" lang="zh-CN" altLang="en-US" sz="1200" b="1" dirty="0">
+                <a:latin typeface="DengXian" panose="02010600030101010101" pitchFamily="2" charset="-122"/>
+                <a:ea typeface="DengXian" panose="02010600030101010101" pitchFamily="2" charset="-122"/>
+              </a:rPr>
+              <a:t> </a:t>
+            </a:r>
+            <a:r>
+              <a:rPr kumimoji="1" lang="en-US" altLang="zh-CN" sz="1200" b="1" dirty="0">
+                <a:latin typeface="DengXian" panose="02010600030101010101" pitchFamily="2" charset="-122"/>
+                <a:ea typeface="DengXian" panose="02010600030101010101" pitchFamily="2" charset="-122"/>
+              </a:rPr>
+              <a:t>red</a:t>
+            </a:r>
+            <a:r>
+              <a:rPr kumimoji="1" lang="zh-CN" altLang="en-US" sz="1200" b="1" dirty="0">
+                <a:latin typeface="DengXian" panose="02010600030101010101" pitchFamily="2" charset="-122"/>
+                <a:ea typeface="DengXian" panose="02010600030101010101" pitchFamily="2" charset="-122"/>
+              </a:rPr>
+              <a:t> </a:t>
+            </a:r>
+            <a:r>
+              <a:rPr kumimoji="1" lang="en-US" altLang="zh-CN" sz="1200" b="1" dirty="0">
+                <a:latin typeface="DengXian" panose="02010600030101010101" pitchFamily="2" charset="-122"/>
+                <a:ea typeface="DengXian" panose="02010600030101010101" pitchFamily="2" charset="-122"/>
+              </a:rPr>
+              <a:t>color</a:t>
+            </a:r>
+            <a:r>
+              <a:rPr kumimoji="1" lang="zh-CN" altLang="en-US" sz="1200" b="1" dirty="0">
+                <a:latin typeface="DengXian" panose="02010600030101010101" pitchFamily="2" charset="-122"/>
+                <a:ea typeface="DengXian" panose="02010600030101010101" pitchFamily="2" charset="-122"/>
+              </a:rPr>
+              <a:t> </a:t>
+            </a:r>
+            <a:r>
+              <a:rPr kumimoji="1" lang="en-US" altLang="zh-CN" sz="1200" b="1" dirty="0">
+                <a:latin typeface="DengXian" panose="02010600030101010101" pitchFamily="2" charset="-122"/>
+                <a:ea typeface="DengXian" panose="02010600030101010101" pitchFamily="2" charset="-122"/>
+              </a:rPr>
+              <a:t>and</a:t>
+            </a:r>
+            <a:r>
+              <a:rPr kumimoji="1" lang="zh-CN" altLang="en-US" sz="1200" b="1" dirty="0">
+                <a:latin typeface="DengXian" panose="02010600030101010101" pitchFamily="2" charset="-122"/>
+                <a:ea typeface="DengXian" panose="02010600030101010101" pitchFamily="2" charset="-122"/>
+              </a:rPr>
+              <a:t> </a:t>
+            </a:r>
+            <a:r>
+              <a:rPr kumimoji="1" lang="en-US" altLang="zh-CN" sz="1200" b="1" dirty="0">
+                <a:latin typeface="DengXian" panose="02010600030101010101" pitchFamily="2" charset="-122"/>
+                <a:ea typeface="DengXian" panose="02010600030101010101" pitchFamily="2" charset="-122"/>
+              </a:rPr>
+              <a:t>bold</a:t>
+            </a:r>
+          </a:p>
+          <a:p>
+            <a:r>
+              <a:rPr kumimoji="1" lang="en-US" altLang="zh-CN" sz="1200" b="1" dirty="0" err="1">
+                <a:latin typeface="DengXian" panose="02010600030101010101" pitchFamily="2" charset="-122"/>
+                <a:ea typeface="DengXian" panose="02010600030101010101" pitchFamily="2" charset="-122"/>
+              </a:rPr>
+              <a:t>Groupby</a:t>
+            </a:r>
+            <a:r>
+              <a:rPr kumimoji="1" lang="en-US" altLang="zh-CN" sz="1200" b="1" dirty="0">
+                <a:latin typeface="DengXian" panose="02010600030101010101" pitchFamily="2" charset="-122"/>
+                <a:ea typeface="DengXian" panose="02010600030101010101" pitchFamily="2" charset="-122"/>
+              </a:rPr>
+              <a:t>:</a:t>
+            </a:r>
+            <a:r>
+              <a:rPr kumimoji="1" lang="zh-CN" altLang="en-US" sz="1200" b="1" dirty="0">
+                <a:latin typeface="DengXian" panose="02010600030101010101" pitchFamily="2" charset="-122"/>
+                <a:ea typeface="DengXian" panose="02010600030101010101" pitchFamily="2" charset="-122"/>
+              </a:rPr>
+              <a:t> </a:t>
+            </a:r>
+            <a:r>
+              <a:rPr kumimoji="1" lang="en-US" altLang="zh-CN" sz="1200" b="1" dirty="0">
+                <a:latin typeface="DengXian" panose="02010600030101010101" pitchFamily="2" charset="-122"/>
+                <a:ea typeface="DengXian" panose="02010600030101010101" pitchFamily="2" charset="-122"/>
+              </a:rPr>
+              <a:t>red</a:t>
+            </a:r>
+            <a:r>
+              <a:rPr kumimoji="1" lang="zh-CN" altLang="en-US" sz="1200" b="1" dirty="0">
+                <a:latin typeface="DengXian" panose="02010600030101010101" pitchFamily="2" charset="-122"/>
+                <a:ea typeface="DengXian" panose="02010600030101010101" pitchFamily="2" charset="-122"/>
+              </a:rPr>
+              <a:t> </a:t>
+            </a:r>
+            <a:r>
+              <a:rPr kumimoji="1" lang="en-US" altLang="zh-CN" sz="1200" b="1" dirty="0">
+                <a:latin typeface="DengXian" panose="02010600030101010101" pitchFamily="2" charset="-122"/>
+                <a:ea typeface="DengXian" panose="02010600030101010101" pitchFamily="2" charset="-122"/>
+              </a:rPr>
+              <a:t>color</a:t>
+            </a:r>
+            <a:r>
+              <a:rPr kumimoji="1" lang="zh-CN" altLang="en-US" sz="1200" b="1" dirty="0">
+                <a:latin typeface="DengXian" panose="02010600030101010101" pitchFamily="2" charset="-122"/>
+                <a:ea typeface="DengXian" panose="02010600030101010101" pitchFamily="2" charset="-122"/>
+              </a:rPr>
+              <a:t> </a:t>
+            </a:r>
+            <a:r>
+              <a:rPr kumimoji="1" lang="en-US" altLang="zh-CN" sz="1200" b="1" dirty="0">
+                <a:latin typeface="DengXian" panose="02010600030101010101" pitchFamily="2" charset="-122"/>
+                <a:ea typeface="DengXian" panose="02010600030101010101" pitchFamily="2" charset="-122"/>
+              </a:rPr>
+              <a:t>and</a:t>
+            </a:r>
+            <a:r>
+              <a:rPr kumimoji="1" lang="zh-CN" altLang="en-US" sz="1200" b="1" dirty="0">
+                <a:latin typeface="DengXian" panose="02010600030101010101" pitchFamily="2" charset="-122"/>
+                <a:ea typeface="DengXian" panose="02010600030101010101" pitchFamily="2" charset="-122"/>
+              </a:rPr>
+              <a:t> </a:t>
+            </a:r>
+            <a:r>
+              <a:rPr kumimoji="1" lang="en-US" altLang="zh-CN" sz="1200" b="1" dirty="0">
+                <a:latin typeface="DengXian" panose="02010600030101010101" pitchFamily="2" charset="-122"/>
+                <a:ea typeface="DengXian" panose="02010600030101010101" pitchFamily="2" charset="-122"/>
+              </a:rPr>
+              <a:t>bold</a:t>
+            </a:r>
+          </a:p>
+        </p:txBody>
+      </p:sp>
+    </p:spTree>
+    <p:extLst>
+      <p:ext uri="{BB962C8B-B14F-4D97-AF65-F5344CB8AC3E}">
+        <p14:creationId xmlns:p14="http://schemas.microsoft.com/office/powerpoint/2010/main" val="3265552492"/>
+      </p:ext>
+    </p:extLst>
+  </p:cSld>
+  <p:clrMapOvr>
+    <a:masterClrMapping/>
+  </p:clrMapOvr>
+</p:sld>
+</file>
+
+<file path=ppt/slides/slide8.xml><?xml version="1.0" encoding="utf-8"?>
+<p:sld xmlns:a="http://schemas.openxmlformats.org/drawingml/2006/main" xmlns:r="http://schemas.openxmlformats.org/officeDocument/2006/relationships" xmlns:p="http://schemas.openxmlformats.org/presentationml/2006/main" show="0">
+  <p:cSld>
+    <p:spTree>
+      <p:nvGrpSpPr>
+        <p:cNvPr id="1" name=""/>
+        <p:cNvGrpSpPr/>
+        <p:nvPr/>
+      </p:nvGrpSpPr>
+      <p:grpSpPr>
+        <a:xfrm>
+          <a:off x="0" y="0"/>
+          <a:ext cx="0" cy="0"/>
+          <a:chOff x="0" y="0"/>
+          <a:chExt cx="0" cy="0"/>
+        </a:xfrm>
+      </p:grpSpPr>
       <p:grpSp>
         <p:nvGrpSpPr>
           <p:cNvPr id="3" name="Group 2">
@@ -11195,8 +11987,8 @@
 </p:sld>
 </file>
 
-<file path=ppt/slides/slide8.xml><?xml version="1.0" encoding="utf-8"?>
-<p:sld xmlns:a="http://schemas.openxmlformats.org/drawingml/2006/main" xmlns:r="http://schemas.openxmlformats.org/officeDocument/2006/relationships" xmlns:p="http://schemas.openxmlformats.org/presentationml/2006/main">
+<file path=ppt/slides/slide9.xml><?xml version="1.0" encoding="utf-8"?>
+<p:sld xmlns:a="http://schemas.openxmlformats.org/drawingml/2006/main" xmlns:r="http://schemas.openxmlformats.org/officeDocument/2006/relationships" xmlns:p="http://schemas.openxmlformats.org/presentationml/2006/main" show="0">
   <p:cSld>
     <p:spTree>
       <p:nvGrpSpPr>
@@ -12766,798 +13558,6 @@
     <p:extLst>
       <p:ext uri="{BB962C8B-B14F-4D97-AF65-F5344CB8AC3E}">
         <p14:creationId xmlns:p14="http://schemas.microsoft.com/office/powerpoint/2010/main" val="2765736608"/>
-      </p:ext>
-    </p:extLst>
-  </p:cSld>
-  <p:clrMapOvr>
-    <a:masterClrMapping/>
-  </p:clrMapOvr>
-</p:sld>
-</file>
-
-<file path=ppt/slides/slide9.xml><?xml version="1.0" encoding="utf-8"?>
-<p:sld xmlns:a="http://schemas.openxmlformats.org/drawingml/2006/main" xmlns:r="http://schemas.openxmlformats.org/officeDocument/2006/relationships" xmlns:p="http://schemas.openxmlformats.org/presentationml/2006/main" show="0">
-  <p:cSld>
-    <p:spTree>
-      <p:nvGrpSpPr>
-        <p:cNvPr id="1" name=""/>
-        <p:cNvGrpSpPr/>
-        <p:nvPr/>
-      </p:nvGrpSpPr>
-      <p:grpSpPr>
-        <a:xfrm>
-          <a:off x="0" y="0"/>
-          <a:ext cx="0" cy="0"/>
-          <a:chOff x="0" y="0"/>
-          <a:chExt cx="0" cy="0"/>
-        </a:xfrm>
-      </p:grpSpPr>
-      <p:grpSp>
-        <p:nvGrpSpPr>
-          <p:cNvPr id="13" name="Group 12">
-            <a:extLst>
-              <a:ext uri="{FF2B5EF4-FFF2-40B4-BE49-F238E27FC236}">
-                <a16:creationId xmlns:a16="http://schemas.microsoft.com/office/drawing/2014/main" id="{5C8602AD-DA4E-8373-A4A1-319A52DFC519}"/>
-              </a:ext>
-            </a:extLst>
-          </p:cNvPr>
-          <p:cNvGrpSpPr/>
-          <p:nvPr/>
-        </p:nvGrpSpPr>
-        <p:grpSpPr>
-          <a:xfrm>
-            <a:off x="2292625" y="2640495"/>
-            <a:ext cx="7610060" cy="1577009"/>
-            <a:chOff x="2292625" y="2640495"/>
-            <a:chExt cx="7610060" cy="1577009"/>
-          </a:xfrm>
-        </p:grpSpPr>
-        <p:grpSp>
-          <p:nvGrpSpPr>
-            <p:cNvPr id="11" name="Group 10">
-              <a:extLst>
-                <a:ext uri="{FF2B5EF4-FFF2-40B4-BE49-F238E27FC236}">
-                  <a16:creationId xmlns:a16="http://schemas.microsoft.com/office/drawing/2014/main" id="{5168FCA5-A509-D54C-EC9F-42AEB9B2CE83}"/>
-                </a:ext>
-              </a:extLst>
-            </p:cNvPr>
-            <p:cNvGrpSpPr/>
-            <p:nvPr/>
-          </p:nvGrpSpPr>
-          <p:grpSpPr>
-            <a:xfrm>
-              <a:off x="2292625" y="2640495"/>
-              <a:ext cx="2716695" cy="1577009"/>
-              <a:chOff x="1606827" y="2640495"/>
-              <a:chExt cx="2716695" cy="1577009"/>
-            </a:xfrm>
-          </p:grpSpPr>
-          <p:sp>
-            <p:nvSpPr>
-              <p:cNvPr id="3" name="矩形 2">
-                <a:extLst>
-                  <a:ext uri="{FF2B5EF4-FFF2-40B4-BE49-F238E27FC236}">
-                    <a16:creationId xmlns:a16="http://schemas.microsoft.com/office/drawing/2014/main" id="{22DC280B-9C65-A140-A46D-687EE8B9A3F0}"/>
-                  </a:ext>
-                </a:extLst>
-              </p:cNvPr>
-              <p:cNvSpPr/>
-              <p:nvPr/>
-            </p:nvSpPr>
-            <p:spPr>
-              <a:xfrm>
-                <a:off x="1606827" y="2640495"/>
-                <a:ext cx="2716695" cy="1577009"/>
-              </a:xfrm>
-              <a:prstGeom prst="rect">
-                <a:avLst/>
-              </a:prstGeom>
-              <a:noFill/>
-              <a:ln w="25400">
-                <a:solidFill>
-                  <a:schemeClr val="tx1"/>
-                </a:solidFill>
-                <a:prstDash val="dash"/>
-              </a:ln>
-            </p:spPr>
-            <p:style>
-              <a:lnRef idx="2">
-                <a:schemeClr val="accent2">
-                  <a:shade val="50000"/>
-                </a:schemeClr>
-              </a:lnRef>
-              <a:fillRef idx="1">
-                <a:schemeClr val="accent2"/>
-              </a:fillRef>
-              <a:effectRef idx="0">
-                <a:schemeClr val="accent2"/>
-              </a:effectRef>
-              <a:fontRef idx="minor">
-                <a:schemeClr val="lt1"/>
-              </a:fontRef>
-            </p:style>
-            <p:txBody>
-              <a:bodyPr rtlCol="0" anchor="b"/>
-              <a:lstStyle/>
-              <a:p>
-                <a:pPr algn="ctr"/>
-                <a:r>
-                  <a:rPr kumimoji="1" lang="en-US" altLang="zh-CN" sz="1200" b="1" dirty="0">
-                    <a:solidFill>
-                      <a:srgbClr val="FF0000"/>
-                    </a:solidFill>
-                    <a:latin typeface="DengXian" panose="02010600030101010101" pitchFamily="2" charset="-122"/>
-                    <a:ea typeface="DengXian" panose="02010600030101010101" pitchFamily="2" charset="-122"/>
-                  </a:rPr>
-                  <a:t>RESULT</a:t>
-                </a:r>
-                <a:r>
-                  <a:rPr kumimoji="1" lang="zh-CN" altLang="en-US" sz="1200" b="1" dirty="0">
-                    <a:solidFill>
-                      <a:srgbClr val="FF0000"/>
-                    </a:solidFill>
-                    <a:latin typeface="DengXian" panose="02010600030101010101" pitchFamily="2" charset="-122"/>
-                    <a:ea typeface="DengXian" panose="02010600030101010101" pitchFamily="2" charset="-122"/>
-                  </a:rPr>
-                  <a:t> </a:t>
-                </a:r>
-                <a:r>
-                  <a:rPr kumimoji="1" lang="en-US" altLang="zh-CN" sz="1200" dirty="0">
-                    <a:solidFill>
-                      <a:sysClr val="windowText" lastClr="000000"/>
-                    </a:solidFill>
-                    <a:latin typeface="DengXian" panose="02010600030101010101" pitchFamily="2" charset="-122"/>
-                    <a:ea typeface="DengXian" panose="02010600030101010101" pitchFamily="2" charset="-122"/>
-                  </a:rPr>
-                  <a:t>properties(</a:t>
-                </a:r>
-                <a:r>
-                  <a:rPr kumimoji="1" lang="en-US" altLang="zh-CN" sz="1200" b="1" dirty="0">
-                    <a:solidFill>
-                      <a:sysClr val="windowText" lastClr="000000"/>
-                    </a:solidFill>
-                    <a:latin typeface="DengXian" panose="02010600030101010101" pitchFamily="2" charset="-122"/>
-                    <a:ea typeface="DengXian" panose="02010600030101010101" pitchFamily="2" charset="-122"/>
-                  </a:rPr>
-                  <a:t>account</a:t>
-                </a:r>
-                <a:r>
-                  <a:rPr kumimoji="1" lang="en-US" altLang="zh-CN" sz="1200" dirty="0">
-                    <a:solidFill>
-                      <a:sysClr val="windowText" lastClr="000000"/>
-                    </a:solidFill>
-                    <a:latin typeface="DengXian" panose="02010600030101010101" pitchFamily="2" charset="-122"/>
-                    <a:ea typeface="DengXian" panose="02010600030101010101" pitchFamily="2" charset="-122"/>
-                  </a:rPr>
-                  <a:t>)</a:t>
-                </a:r>
-              </a:p>
-            </p:txBody>
-          </p:sp>
-          <p:grpSp>
-            <p:nvGrpSpPr>
-              <p:cNvPr id="9" name="Group 8">
-                <a:extLst>
-                  <a:ext uri="{FF2B5EF4-FFF2-40B4-BE49-F238E27FC236}">
-                    <a16:creationId xmlns:a16="http://schemas.microsoft.com/office/drawing/2014/main" id="{52A08965-7938-02E8-7A5E-CD3A10264DA7}"/>
-                  </a:ext>
-                </a:extLst>
-              </p:cNvPr>
-              <p:cNvGrpSpPr/>
-              <p:nvPr/>
-            </p:nvGrpSpPr>
-            <p:grpSpPr>
-              <a:xfrm>
-                <a:off x="1906774" y="2815878"/>
-                <a:ext cx="2116800" cy="1010292"/>
-                <a:chOff x="1814274" y="2815878"/>
-                <a:chExt cx="2116800" cy="1010292"/>
-              </a:xfrm>
-            </p:grpSpPr>
-            <p:sp>
-              <p:nvSpPr>
-                <p:cNvPr id="2" name="矩形 1">
-                  <a:extLst>
-                    <a:ext uri="{FF2B5EF4-FFF2-40B4-BE49-F238E27FC236}">
-                      <a16:creationId xmlns:a16="http://schemas.microsoft.com/office/drawing/2014/main" id="{B72C642D-A526-CE45-ADFB-CA4FB6B38A11}"/>
-                    </a:ext>
-                  </a:extLst>
-                </p:cNvPr>
-                <p:cNvSpPr/>
-                <p:nvPr/>
-              </p:nvSpPr>
-              <p:spPr>
-                <a:xfrm>
-                  <a:off x="1814274" y="2815878"/>
-                  <a:ext cx="2116800" cy="505147"/>
-                </a:xfrm>
-                <a:prstGeom prst="rect">
-                  <a:avLst/>
-                </a:prstGeom>
-                <a:solidFill>
-                  <a:schemeClr val="accent5">
-                    <a:lumMod val="60000"/>
-                    <a:lumOff val="40000"/>
-                  </a:schemeClr>
-                </a:solidFill>
-                <a:ln w="25400">
-                  <a:solidFill>
-                    <a:schemeClr val="tx1"/>
-                  </a:solidFill>
-                </a:ln>
-              </p:spPr>
-              <p:style>
-                <a:lnRef idx="2">
-                  <a:schemeClr val="accent2">
-                    <a:shade val="50000"/>
-                  </a:schemeClr>
-                </a:lnRef>
-                <a:fillRef idx="1">
-                  <a:schemeClr val="accent2"/>
-                </a:fillRef>
-                <a:effectRef idx="0">
-                  <a:schemeClr val="accent2"/>
-                </a:effectRef>
-                <a:fontRef idx="minor">
-                  <a:schemeClr val="lt1"/>
-                </a:fontRef>
-              </p:style>
-              <p:txBody>
-                <a:bodyPr rtlCol="0" anchor="ctr"/>
-                <a:lstStyle/>
-                <a:p>
-                  <a:pPr algn="ctr"/>
-                  <a:r>
-                    <a:rPr kumimoji="1" lang="en-US" altLang="zh-CN" sz="1200" b="1" dirty="0">
-                      <a:solidFill>
-                        <a:sysClr val="windowText" lastClr="000000"/>
-                      </a:solidFill>
-                    </a:rPr>
-                    <a:t>account</a:t>
-                  </a:r>
-                  <a:r>
-                    <a:rPr kumimoji="1" lang="en-US" altLang="zh-CN" sz="1200" dirty="0">
-                      <a:solidFill>
-                        <a:sysClr val="windowText" lastClr="000000"/>
-                      </a:solidFill>
-                    </a:rPr>
-                    <a:t>:</a:t>
-                  </a:r>
-                  <a:r>
-                    <a:rPr kumimoji="1" lang="zh-CN" altLang="en-US" sz="1200" dirty="0">
-                      <a:solidFill>
-                        <a:sysClr val="windowText" lastClr="000000"/>
-                      </a:solidFill>
-                    </a:rPr>
-                    <a:t> </a:t>
-                  </a:r>
-                  <a:r>
-                    <a:rPr kumimoji="1" lang="en-US" altLang="zh-CN" sz="1200" dirty="0">
-                      <a:solidFill>
-                        <a:sysClr val="windowText" lastClr="000000"/>
-                      </a:solidFill>
-                    </a:rPr>
-                    <a:t>Account</a:t>
-                  </a:r>
-                  <a:endParaRPr kumimoji="1" lang="zh-CN" altLang="en-US" sz="1200" dirty="0">
-                    <a:solidFill>
-                      <a:sysClr val="windowText" lastClr="000000"/>
-                    </a:solidFill>
-                  </a:endParaRPr>
-                </a:p>
-              </p:txBody>
-            </p:sp>
-            <p:sp>
-              <p:nvSpPr>
-                <p:cNvPr id="6" name="矩形 3">
-                  <a:extLst>
-                    <a:ext uri="{FF2B5EF4-FFF2-40B4-BE49-F238E27FC236}">
-                      <a16:creationId xmlns:a16="http://schemas.microsoft.com/office/drawing/2014/main" id="{BD3A2398-8C0D-7E74-5100-BA996C38E61A}"/>
-                    </a:ext>
-                  </a:extLst>
-                </p:cNvPr>
-                <p:cNvSpPr/>
-                <p:nvPr/>
-              </p:nvSpPr>
-              <p:spPr>
-                <a:xfrm>
-                  <a:off x="1814274" y="3321023"/>
-                  <a:ext cx="2116800" cy="505147"/>
-                </a:xfrm>
-                <a:prstGeom prst="rect">
-                  <a:avLst/>
-                </a:prstGeom>
-                <a:noFill/>
-                <a:ln w="25400">
-                  <a:solidFill>
-                    <a:schemeClr val="tx1"/>
-                  </a:solidFill>
-                </a:ln>
-              </p:spPr>
-              <p:style>
-                <a:lnRef idx="2">
-                  <a:schemeClr val="accent2">
-                    <a:shade val="50000"/>
-                  </a:schemeClr>
-                </a:lnRef>
-                <a:fillRef idx="1">
-                  <a:schemeClr val="accent2"/>
-                </a:fillRef>
-                <a:effectRef idx="0">
-                  <a:schemeClr val="accent2"/>
-                </a:effectRef>
-                <a:fontRef idx="minor">
-                  <a:schemeClr val="lt1"/>
-                </a:fontRef>
-              </p:style>
-              <p:txBody>
-                <a:bodyPr rtlCol="0" anchor="ctr"/>
-                <a:lstStyle/>
-                <a:p>
-                  <a:pPr algn="ctr"/>
-                  <a:r>
-                    <a:rPr kumimoji="1" lang="en-US" altLang="zh-CN" sz="1200" b="1" dirty="0" err="1">
-                      <a:solidFill>
-                        <a:sysClr val="windowText" lastClr="000000"/>
-                      </a:solidFill>
-                      <a:latin typeface="DengXian" panose="02010600030101010101" pitchFamily="2" charset="-122"/>
-                      <a:ea typeface="DengXian" panose="02010600030101010101" pitchFamily="2" charset="-122"/>
-                    </a:rPr>
-                    <a:t>account</a:t>
-                  </a:r>
-                  <a:r>
-                    <a:rPr kumimoji="1" lang="en-US" altLang="zh-CN" sz="1200" dirty="0" err="1">
-                      <a:solidFill>
-                        <a:sysClr val="windowText" lastClr="000000"/>
-                      </a:solidFill>
-                      <a:latin typeface="DengXian" panose="02010600030101010101" pitchFamily="2" charset="-122"/>
-                      <a:ea typeface="DengXian" panose="02010600030101010101" pitchFamily="2" charset="-122"/>
-                    </a:rPr>
-                    <a:t>.id</a:t>
-                  </a:r>
-                  <a:r>
-                    <a:rPr kumimoji="1" lang="en-US" altLang="zh-CN" sz="1200" dirty="0">
-                      <a:solidFill>
-                        <a:sysClr val="windowText" lastClr="000000"/>
-                      </a:solidFill>
-                      <a:latin typeface="DengXian" panose="02010600030101010101" pitchFamily="2" charset="-122"/>
-                      <a:ea typeface="DengXian" panose="02010600030101010101" pitchFamily="2" charset="-122"/>
-                    </a:rPr>
-                    <a:t>:</a:t>
-                  </a:r>
-                  <a:r>
-                    <a:rPr kumimoji="1" lang="zh-CN" altLang="en-US" sz="1200" dirty="0">
-                      <a:solidFill>
-                        <a:sysClr val="windowText" lastClr="000000"/>
-                      </a:solidFill>
-                      <a:latin typeface="DengXian" panose="02010600030101010101" pitchFamily="2" charset="-122"/>
-                      <a:ea typeface="DengXian" panose="02010600030101010101" pitchFamily="2" charset="-122"/>
-                    </a:rPr>
-                    <a:t> </a:t>
-                  </a:r>
-                  <a:r>
-                    <a:rPr kumimoji="1" lang="en-US" altLang="zh-CN" sz="1200" dirty="0">
-                      <a:solidFill>
-                        <a:sysClr val="windowText" lastClr="000000"/>
-                      </a:solidFill>
-                      <a:latin typeface="DengXian" panose="02010600030101010101" pitchFamily="2" charset="-122"/>
-                      <a:ea typeface="DengXian" panose="02010600030101010101" pitchFamily="2" charset="-122"/>
-                    </a:rPr>
-                    <a:t>${id}</a:t>
-                  </a:r>
-                  <a:endParaRPr kumimoji="1" lang="zh-CN" altLang="en-US" sz="1200" dirty="0">
-                    <a:solidFill>
-                      <a:sysClr val="windowText" lastClr="000000"/>
-                    </a:solidFill>
-                    <a:latin typeface="DengXian" panose="02010600030101010101" pitchFamily="2" charset="-122"/>
-                    <a:ea typeface="DengXian" panose="02010600030101010101" pitchFamily="2" charset="-122"/>
-                  </a:endParaRPr>
-                </a:p>
-              </p:txBody>
-            </p:sp>
-          </p:grpSp>
-        </p:grpSp>
-        <p:grpSp>
-          <p:nvGrpSpPr>
-            <p:cNvPr id="10" name="Group 9">
-              <a:extLst>
-                <a:ext uri="{FF2B5EF4-FFF2-40B4-BE49-F238E27FC236}">
-                  <a16:creationId xmlns:a16="http://schemas.microsoft.com/office/drawing/2014/main" id="{A43BD305-30B1-E286-02CD-0C8134774423}"/>
-                </a:ext>
-              </a:extLst>
-            </p:cNvPr>
-            <p:cNvGrpSpPr/>
-            <p:nvPr/>
-          </p:nvGrpSpPr>
-          <p:grpSpPr>
-            <a:xfrm>
-              <a:off x="7185990" y="2640495"/>
-              <a:ext cx="2716695" cy="1577009"/>
-              <a:chOff x="6500192" y="2640495"/>
-              <a:chExt cx="2716695" cy="1577009"/>
-            </a:xfrm>
-          </p:grpSpPr>
-          <p:grpSp>
-            <p:nvGrpSpPr>
-              <p:cNvPr id="8" name="Group 7">
-                <a:extLst>
-                  <a:ext uri="{FF2B5EF4-FFF2-40B4-BE49-F238E27FC236}">
-                    <a16:creationId xmlns:a16="http://schemas.microsoft.com/office/drawing/2014/main" id="{7CE25A49-AE87-2B55-03D7-B1DC81E8A317}"/>
-                  </a:ext>
-                </a:extLst>
-              </p:cNvPr>
-              <p:cNvGrpSpPr/>
-              <p:nvPr/>
-            </p:nvGrpSpPr>
-            <p:grpSpPr>
-              <a:xfrm>
-                <a:off x="6800300" y="2815877"/>
-                <a:ext cx="2116478" cy="1010294"/>
-                <a:chOff x="6743980" y="2815877"/>
-                <a:chExt cx="2116478" cy="1010294"/>
-              </a:xfrm>
-            </p:grpSpPr>
-            <p:sp>
-              <p:nvSpPr>
-                <p:cNvPr id="4" name="矩形 3">
-                  <a:extLst>
-                    <a:ext uri="{FF2B5EF4-FFF2-40B4-BE49-F238E27FC236}">
-                      <a16:creationId xmlns:a16="http://schemas.microsoft.com/office/drawing/2014/main" id="{68924B86-E5E9-2247-A385-17C2F6B27826}"/>
-                    </a:ext>
-                  </a:extLst>
-                </p:cNvPr>
-                <p:cNvSpPr/>
-                <p:nvPr/>
-              </p:nvSpPr>
-              <p:spPr>
-                <a:xfrm>
-                  <a:off x="6743980" y="3321024"/>
-                  <a:ext cx="2116478" cy="505147"/>
-                </a:xfrm>
-                <a:prstGeom prst="rect">
-                  <a:avLst/>
-                </a:prstGeom>
-                <a:noFill/>
-                <a:ln w="25400">
-                  <a:solidFill>
-                    <a:schemeClr val="tx1"/>
-                  </a:solidFill>
-                </a:ln>
-              </p:spPr>
-              <p:style>
-                <a:lnRef idx="2">
-                  <a:schemeClr val="accent2">
-                    <a:shade val="50000"/>
-                  </a:schemeClr>
-                </a:lnRef>
-                <a:fillRef idx="1">
-                  <a:schemeClr val="accent2"/>
-                </a:fillRef>
-                <a:effectRef idx="0">
-                  <a:schemeClr val="accent2"/>
-                </a:effectRef>
-                <a:fontRef idx="minor">
-                  <a:schemeClr val="lt1"/>
-                </a:fontRef>
-              </p:style>
-              <p:txBody>
-                <a:bodyPr rtlCol="0" anchor="ctr"/>
-                <a:lstStyle/>
-                <a:p>
-                  <a:pPr algn="ctr"/>
-                  <a:r>
-                    <a:rPr kumimoji="1" lang="en-US" altLang="zh-CN" sz="1200" b="1" dirty="0" err="1">
-                      <a:solidFill>
-                        <a:sysClr val="windowText" lastClr="000000"/>
-                      </a:solidFill>
-                      <a:latin typeface="DengXian" panose="02010600030101010101" pitchFamily="2" charset="-122"/>
-                      <a:ea typeface="DengXian" panose="02010600030101010101" pitchFamily="2" charset="-122"/>
-                    </a:rPr>
-                    <a:t>person</a:t>
-                  </a:r>
-                  <a:r>
-                    <a:rPr kumimoji="1" lang="en-US" altLang="zh-CN" sz="1200" dirty="0" err="1">
-                      <a:solidFill>
-                        <a:sysClr val="windowText" lastClr="000000"/>
-                      </a:solidFill>
-                      <a:latin typeface="DengXian" panose="02010600030101010101" pitchFamily="2" charset="-122"/>
-                      <a:ea typeface="DengXian" panose="02010600030101010101" pitchFamily="2" charset="-122"/>
-                    </a:rPr>
-                    <a:t>.id</a:t>
-                  </a:r>
-                  <a:r>
-                    <a:rPr kumimoji="1" lang="en-US" altLang="zh-CN" sz="1200" dirty="0">
-                      <a:solidFill>
-                        <a:sysClr val="windowText" lastClr="000000"/>
-                      </a:solidFill>
-                      <a:latin typeface="DengXian" panose="02010600030101010101" pitchFamily="2" charset="-122"/>
-                      <a:ea typeface="DengXian" panose="02010600030101010101" pitchFamily="2" charset="-122"/>
-                    </a:rPr>
-                    <a:t>:</a:t>
-                  </a:r>
-                  <a:r>
-                    <a:rPr kumimoji="1" lang="zh-CN" altLang="en-US" sz="1200" dirty="0">
-                      <a:solidFill>
-                        <a:sysClr val="windowText" lastClr="000000"/>
-                      </a:solidFill>
-                      <a:latin typeface="DengXian" panose="02010600030101010101" pitchFamily="2" charset="-122"/>
-                      <a:ea typeface="DengXian" panose="02010600030101010101" pitchFamily="2" charset="-122"/>
-                    </a:rPr>
-                    <a:t> </a:t>
-                  </a:r>
-                  <a:r>
-                    <a:rPr kumimoji="1" lang="en-US" altLang="zh-CN" sz="1200" dirty="0">
-                      <a:solidFill>
-                        <a:sysClr val="windowText" lastClr="000000"/>
-                      </a:solidFill>
-                      <a:latin typeface="DengXian" panose="02010600030101010101" pitchFamily="2" charset="-122"/>
-                      <a:ea typeface="DengXian" panose="02010600030101010101" pitchFamily="2" charset="-122"/>
-                    </a:rPr>
-                    <a:t>${id}</a:t>
-                  </a:r>
-                  <a:endParaRPr kumimoji="1" lang="zh-CN" altLang="en-US" sz="1200" dirty="0">
-                    <a:solidFill>
-                      <a:sysClr val="windowText" lastClr="000000"/>
-                    </a:solidFill>
-                    <a:latin typeface="DengXian" panose="02010600030101010101" pitchFamily="2" charset="-122"/>
-                    <a:ea typeface="DengXian" panose="02010600030101010101" pitchFamily="2" charset="-122"/>
-                  </a:endParaRPr>
-                </a:p>
-              </p:txBody>
-            </p:sp>
-            <p:sp>
-              <p:nvSpPr>
-                <p:cNvPr id="5" name="矩形 9">
-                  <a:extLst>
-                    <a:ext uri="{FF2B5EF4-FFF2-40B4-BE49-F238E27FC236}">
-                      <a16:creationId xmlns:a16="http://schemas.microsoft.com/office/drawing/2014/main" id="{6641C98C-130F-B917-6069-671A355C0494}"/>
-                    </a:ext>
-                  </a:extLst>
-                </p:cNvPr>
-                <p:cNvSpPr/>
-                <p:nvPr/>
-              </p:nvSpPr>
-              <p:spPr>
-                <a:xfrm>
-                  <a:off x="6743980" y="2815877"/>
-                  <a:ext cx="2116478" cy="505147"/>
-                </a:xfrm>
-                <a:prstGeom prst="rect">
-                  <a:avLst/>
-                </a:prstGeom>
-                <a:solidFill>
-                  <a:schemeClr val="accent6">
-                    <a:lumMod val="60000"/>
-                    <a:lumOff val="40000"/>
-                  </a:schemeClr>
-                </a:solidFill>
-                <a:ln w="25400">
-                  <a:solidFill>
-                    <a:schemeClr val="tx1"/>
-                  </a:solidFill>
-                </a:ln>
-              </p:spPr>
-              <p:style>
-                <a:lnRef idx="2">
-                  <a:schemeClr val="accent2">
-                    <a:shade val="50000"/>
-                  </a:schemeClr>
-                </a:lnRef>
-                <a:fillRef idx="1">
-                  <a:schemeClr val="accent2"/>
-                </a:fillRef>
-                <a:effectRef idx="0">
-                  <a:schemeClr val="accent2"/>
-                </a:effectRef>
-                <a:fontRef idx="minor">
-                  <a:schemeClr val="lt1"/>
-                </a:fontRef>
-              </p:style>
-              <p:txBody>
-                <a:bodyPr rtlCol="0" anchor="ctr"/>
-                <a:lstStyle/>
-                <a:p>
-                  <a:pPr algn="ctr"/>
-                  <a:r>
-                    <a:rPr kumimoji="1" lang="en-US" altLang="zh-CN" sz="1200" b="1" dirty="0">
-                      <a:solidFill>
-                        <a:sysClr val="windowText" lastClr="000000"/>
-                      </a:solidFill>
-                    </a:rPr>
-                    <a:t>person</a:t>
-                  </a:r>
-                  <a:r>
-                    <a:rPr kumimoji="1" lang="zh-CN" altLang="en-US" sz="1200" dirty="0">
-                      <a:solidFill>
-                        <a:sysClr val="windowText" lastClr="000000"/>
-                      </a:solidFill>
-                    </a:rPr>
-                    <a:t> </a:t>
-                  </a:r>
-                  <a:r>
-                    <a:rPr kumimoji="1" lang="en-US" altLang="zh-CN" sz="1200" dirty="0">
-                      <a:solidFill>
-                        <a:sysClr val="windowText" lastClr="000000"/>
-                      </a:solidFill>
-                    </a:rPr>
-                    <a:t>:</a:t>
-                  </a:r>
-                  <a:r>
-                    <a:rPr kumimoji="1" lang="zh-CN" altLang="en-US" sz="1200" dirty="0">
-                      <a:solidFill>
-                        <a:sysClr val="windowText" lastClr="000000"/>
-                      </a:solidFill>
-                    </a:rPr>
-                    <a:t> </a:t>
-                  </a:r>
-                  <a:r>
-                    <a:rPr kumimoji="1" lang="en-US" altLang="zh-CN" sz="1200" dirty="0">
-                      <a:solidFill>
-                        <a:sysClr val="windowText" lastClr="000000"/>
-                      </a:solidFill>
-                    </a:rPr>
-                    <a:t>Person</a:t>
-                  </a:r>
-                  <a:endParaRPr kumimoji="1" lang="zh-CN" altLang="en-US" sz="1200" dirty="0">
-                    <a:solidFill>
-                      <a:sysClr val="windowText" lastClr="000000"/>
-                    </a:solidFill>
-                  </a:endParaRPr>
-                </a:p>
-              </p:txBody>
-            </p:sp>
-          </p:grpSp>
-          <p:sp>
-            <p:nvSpPr>
-              <p:cNvPr id="7" name="矩形 2">
-                <a:extLst>
-                  <a:ext uri="{FF2B5EF4-FFF2-40B4-BE49-F238E27FC236}">
-                    <a16:creationId xmlns:a16="http://schemas.microsoft.com/office/drawing/2014/main" id="{796335C9-7FF2-C371-B888-EBFB3C3FDC46}"/>
-                  </a:ext>
-                </a:extLst>
-              </p:cNvPr>
-              <p:cNvSpPr/>
-              <p:nvPr/>
-            </p:nvSpPr>
-            <p:spPr>
-              <a:xfrm>
-                <a:off x="6500192" y="2640495"/>
-                <a:ext cx="2716695" cy="1577009"/>
-              </a:xfrm>
-              <a:prstGeom prst="rect">
-                <a:avLst/>
-              </a:prstGeom>
-              <a:noFill/>
-              <a:ln w="25400">
-                <a:solidFill>
-                  <a:schemeClr val="tx1"/>
-                </a:solidFill>
-                <a:prstDash val="dash"/>
-              </a:ln>
-            </p:spPr>
-            <p:style>
-              <a:lnRef idx="2">
-                <a:schemeClr val="accent2">
-                  <a:shade val="50000"/>
-                </a:schemeClr>
-              </a:lnRef>
-              <a:fillRef idx="1">
-                <a:schemeClr val="accent2"/>
-              </a:fillRef>
-              <a:effectRef idx="0">
-                <a:schemeClr val="accent2"/>
-              </a:effectRef>
-              <a:fontRef idx="minor">
-                <a:schemeClr val="lt1"/>
-              </a:fontRef>
-            </p:style>
-            <p:txBody>
-              <a:bodyPr rtlCol="0" anchor="b"/>
-              <a:lstStyle/>
-              <a:p>
-                <a:pPr algn="ctr"/>
-                <a:r>
-                  <a:rPr kumimoji="1" lang="en-US" altLang="zh-CN" sz="1200" b="1" dirty="0">
-                    <a:solidFill>
-                      <a:srgbClr val="FF0000"/>
-                    </a:solidFill>
-                    <a:latin typeface="DengXian" panose="02010600030101010101" pitchFamily="2" charset="-122"/>
-                    <a:ea typeface="DengXian" panose="02010600030101010101" pitchFamily="2" charset="-122"/>
-                  </a:rPr>
-                  <a:t>RESULT</a:t>
-                </a:r>
-                <a:r>
-                  <a:rPr kumimoji="1" lang="zh-CN" altLang="en-US" sz="1200" b="1" dirty="0">
-                    <a:solidFill>
-                      <a:srgbClr val="FF0000"/>
-                    </a:solidFill>
-                    <a:latin typeface="DengXian" panose="02010600030101010101" pitchFamily="2" charset="-122"/>
-                    <a:ea typeface="DengXian" panose="02010600030101010101" pitchFamily="2" charset="-122"/>
-                  </a:rPr>
-                  <a:t> </a:t>
-                </a:r>
-                <a:r>
-                  <a:rPr kumimoji="1" lang="en-US" altLang="zh-CN" sz="1200" dirty="0">
-                    <a:solidFill>
-                      <a:sysClr val="windowText" lastClr="000000"/>
-                    </a:solidFill>
-                    <a:latin typeface="DengXian" panose="02010600030101010101" pitchFamily="2" charset="-122"/>
-                    <a:ea typeface="DengXian" panose="02010600030101010101" pitchFamily="2" charset="-122"/>
-                  </a:rPr>
-                  <a:t>properties(</a:t>
-                </a:r>
-                <a:r>
-                  <a:rPr kumimoji="1" lang="en-US" altLang="zh-CN" sz="1200" b="1" dirty="0">
-                    <a:solidFill>
-                      <a:sysClr val="windowText" lastClr="000000"/>
-                    </a:solidFill>
-                    <a:latin typeface="DengXian" panose="02010600030101010101" pitchFamily="2" charset="-122"/>
-                    <a:ea typeface="DengXian" panose="02010600030101010101" pitchFamily="2" charset="-122"/>
-                  </a:rPr>
-                  <a:t>account</a:t>
-                </a:r>
-                <a:r>
-                  <a:rPr kumimoji="1" lang="en-US" altLang="zh-CN" sz="1200" dirty="0">
-                    <a:solidFill>
-                      <a:sysClr val="windowText" lastClr="000000"/>
-                    </a:solidFill>
-                    <a:latin typeface="DengXian" panose="02010600030101010101" pitchFamily="2" charset="-122"/>
-                    <a:ea typeface="DengXian" panose="02010600030101010101" pitchFamily="2" charset="-122"/>
-                  </a:rPr>
-                  <a:t>)</a:t>
-                </a:r>
-              </a:p>
-            </p:txBody>
-          </p:sp>
-        </p:grpSp>
-        <p:sp>
-          <p:nvSpPr>
-            <p:cNvPr id="12" name="文本框 7">
-              <a:extLst>
-                <a:ext uri="{FF2B5EF4-FFF2-40B4-BE49-F238E27FC236}">
-                  <a16:creationId xmlns:a16="http://schemas.microsoft.com/office/drawing/2014/main" id="{AD01137A-7769-D5E3-C126-DE166D6BD9DD}"/>
-                </a:ext>
-              </a:extLst>
-            </p:cNvPr>
-            <p:cNvSpPr txBox="1"/>
-            <p:nvPr/>
-          </p:nvSpPr>
-          <p:spPr>
-            <a:xfrm>
-              <a:off x="5768906" y="3228945"/>
-              <a:ext cx="654188" cy="400110"/>
-            </a:xfrm>
-            <a:prstGeom prst="rect">
-              <a:avLst/>
-            </a:prstGeom>
-            <a:noFill/>
-          </p:spPr>
-          <p:txBody>
-            <a:bodyPr wrap="square" rtlCol="0">
-              <a:spAutoFit/>
-            </a:bodyPr>
-            <a:lstStyle/>
-            <a:p>
-              <a:pPr algn="ctr"/>
-              <a:r>
-                <a:rPr kumimoji="1" lang="en-US" altLang="zh-CN" sz="2000" b="1" dirty="0">
-                  <a:latin typeface="DengXian" panose="02010600030101010101" pitchFamily="2" charset="-122"/>
-                  <a:ea typeface="DengXian" panose="02010600030101010101" pitchFamily="2" charset="-122"/>
-                </a:rPr>
-                <a:t>or</a:t>
-              </a:r>
-              <a:endParaRPr kumimoji="1" lang="en-US" altLang="zh-CN" sz="2000" dirty="0">
-                <a:latin typeface="DengXian" panose="02010600030101010101" pitchFamily="2" charset="-122"/>
-                <a:ea typeface="DengXian" panose="02010600030101010101" pitchFamily="2" charset="-122"/>
-              </a:endParaRPr>
-            </a:p>
-          </p:txBody>
-        </p:sp>
-      </p:grpSp>
-    </p:spTree>
-    <p:extLst>
-      <p:ext uri="{BB962C8B-B14F-4D97-AF65-F5344CB8AC3E}">
-        <p14:creationId xmlns:p14="http://schemas.microsoft.com/office/powerpoint/2010/main" val="3136280630"/>
       </p:ext>
     </p:extLst>
   </p:cSld>

</xml_diff>

<commit_message>
remove rebundant simple 7&8 in query card (#77)
</commit_message>
<xml_diff>
--- a/patterns/transaction-simple-read.pptx
+++ b/patterns/transaction-simple-read.pptx
@@ -14,10 +14,10 @@
     <p:sldId id="414" r:id="rId5"/>
     <p:sldId id="363" r:id="rId6"/>
     <p:sldId id="373" r:id="rId7"/>
-    <p:sldId id="402" r:id="rId8"/>
-    <p:sldId id="398" r:id="rId9"/>
-    <p:sldId id="418" r:id="rId10"/>
-    <p:sldId id="417" r:id="rId11"/>
+    <p:sldId id="417" r:id="rId8"/>
+    <p:sldId id="402" r:id="rId9"/>
+    <p:sldId id="398" r:id="rId10"/>
+    <p:sldId id="418" r:id="rId11"/>
   </p:sldIdLst>
   <p:sldSz cx="12192000" cy="6858000"/>
   <p:notesSz cx="6858000" cy="9144000"/>
@@ -206,7 +206,7 @@
           <a:p>
             <a:fld id="{CAD4BD24-A097-4F9D-85E9-6A2A24CA2D98}" type="datetimeFigureOut">
               <a:rPr lang="zh-CN" altLang="en-US" smtClean="0"/>
-              <a:t>2023/4/28</a:t>
+              <a:t>2023/5/6</a:t>
             </a:fld>
             <a:endParaRPr lang="zh-CN" altLang="en-US"/>
           </a:p>
@@ -2854,7 +2854,7 @@
 </file>
 
 <file path=ppt/slides/slide10.xml><?xml version="1.0" encoding="utf-8"?>
-<p:sld xmlns:a="http://schemas.openxmlformats.org/drawingml/2006/main" xmlns:r="http://schemas.openxmlformats.org/officeDocument/2006/relationships" xmlns:p="http://schemas.openxmlformats.org/presentationml/2006/main">
+<p:sld xmlns:a="http://schemas.openxmlformats.org/drawingml/2006/main" xmlns:r="http://schemas.openxmlformats.org/officeDocument/2006/relationships" xmlns:p="http://schemas.openxmlformats.org/presentationml/2006/main" show="0">
   <p:cSld>
     <p:spTree>
       <p:nvGrpSpPr>
@@ -2870,631 +2870,772 @@
           <a:chExt cx="0" cy="0"/>
         </a:xfrm>
       </p:grpSpPr>
-      <p:sp>
-        <p:nvSpPr>
-          <p:cNvPr id="4" name="Rectangle 3">
+      <p:grpSp>
+        <p:nvGrpSpPr>
+          <p:cNvPr id="13" name="Group 12">
             <a:extLst>
               <a:ext uri="{FF2B5EF4-FFF2-40B4-BE49-F238E27FC236}">
-                <a16:creationId xmlns:a16="http://schemas.microsoft.com/office/drawing/2014/main" id="{5EFB2F0D-ABB3-D995-FA04-8C359C1827B4}"/>
+                <a16:creationId xmlns:a16="http://schemas.microsoft.com/office/drawing/2014/main" id="{5C8602AD-DA4E-8373-A4A1-319A52DFC519}"/>
               </a:ext>
             </a:extLst>
           </p:cNvPr>
-          <p:cNvSpPr/>
+          <p:cNvGrpSpPr/>
           <p:nvPr/>
-        </p:nvSpPr>
-        <p:spPr>
+        </p:nvGrpSpPr>
+        <p:grpSpPr>
           <a:xfrm>
-            <a:off x="2468880" y="2861420"/>
-            <a:ext cx="1215845" cy="387178"/>
+            <a:off x="2292625" y="2640495"/>
+            <a:ext cx="7610060" cy="1577009"/>
+            <a:chOff x="2292625" y="2640495"/>
+            <a:chExt cx="7610060" cy="1577009"/>
           </a:xfrm>
-          <a:prstGeom prst="rect">
-            <a:avLst/>
-          </a:prstGeom>
-          <a:solidFill>
-            <a:schemeClr val="accent6">
-              <a:lumMod val="60000"/>
-              <a:lumOff val="40000"/>
-            </a:schemeClr>
-          </a:solidFill>
-          <a:ln w="22225">
-            <a:solidFill>
-              <a:schemeClr val="tx1"/>
-            </a:solidFill>
-          </a:ln>
-        </p:spPr>
-        <p:style>
-          <a:lnRef idx="2">
-            <a:schemeClr val="accent1">
-              <a:shade val="50000"/>
-            </a:schemeClr>
-          </a:lnRef>
-          <a:fillRef idx="1">
-            <a:schemeClr val="accent1"/>
-          </a:fillRef>
-          <a:effectRef idx="0">
-            <a:schemeClr val="accent1"/>
-          </a:effectRef>
-          <a:fontRef idx="minor">
-            <a:schemeClr val="lt1"/>
-          </a:fontRef>
-        </p:style>
-        <p:txBody>
-          <a:bodyPr rtlCol="0" anchor="ctr"/>
-          <a:lstStyle/>
-          <a:p>
-            <a:pPr algn="ctr"/>
-            <a:r>
-              <a:rPr lang="en-US" altLang="zh-CN" b="1" dirty="0">
+        </p:grpSpPr>
+        <p:grpSp>
+          <p:nvGrpSpPr>
+            <p:cNvPr id="11" name="Group 10">
+              <a:extLst>
+                <a:ext uri="{FF2B5EF4-FFF2-40B4-BE49-F238E27FC236}">
+                  <a16:creationId xmlns:a16="http://schemas.microsoft.com/office/drawing/2014/main" id="{5168FCA5-A509-D54C-EC9F-42AEB9B2CE83}"/>
+                </a:ext>
+              </a:extLst>
+            </p:cNvPr>
+            <p:cNvGrpSpPr/>
+            <p:nvPr/>
+          </p:nvGrpSpPr>
+          <p:grpSpPr>
+            <a:xfrm>
+              <a:off x="2292625" y="2640495"/>
+              <a:ext cx="2716695" cy="1577009"/>
+              <a:chOff x="1606827" y="2640495"/>
+              <a:chExt cx="2716695" cy="1577009"/>
+            </a:xfrm>
+          </p:grpSpPr>
+          <p:sp>
+            <p:nvSpPr>
+              <p:cNvPr id="3" name="矩形 2">
+                <a:extLst>
+                  <a:ext uri="{FF2B5EF4-FFF2-40B4-BE49-F238E27FC236}">
+                    <a16:creationId xmlns:a16="http://schemas.microsoft.com/office/drawing/2014/main" id="{22DC280B-9C65-A140-A46D-687EE8B9A3F0}"/>
+                  </a:ext>
+                </a:extLst>
+              </p:cNvPr>
+              <p:cNvSpPr/>
+              <p:nvPr/>
+            </p:nvSpPr>
+            <p:spPr>
+              <a:xfrm>
+                <a:off x="1606827" y="2640495"/>
+                <a:ext cx="2716695" cy="1577009"/>
+              </a:xfrm>
+              <a:prstGeom prst="rect">
+                <a:avLst/>
+              </a:prstGeom>
+              <a:noFill/>
+              <a:ln w="25400">
                 <a:solidFill>
                   <a:schemeClr val="tx1"/>
                 </a:solidFill>
-              </a:rPr>
-              <a:t>Person</a:t>
-            </a:r>
-            <a:endParaRPr lang="en-CN" b="1" dirty="0">
-              <a:solidFill>
-                <a:schemeClr val="tx1"/>
-              </a:solidFill>
-            </a:endParaRPr>
-          </a:p>
-        </p:txBody>
-      </p:sp>
-      <p:sp>
-        <p:nvSpPr>
-          <p:cNvPr id="5" name="Rectangle 4">
-            <a:extLst>
-              <a:ext uri="{FF2B5EF4-FFF2-40B4-BE49-F238E27FC236}">
-                <a16:creationId xmlns:a16="http://schemas.microsoft.com/office/drawing/2014/main" id="{71799D25-8F4B-3E78-7E33-C84644F1D35C}"/>
-              </a:ext>
-            </a:extLst>
-          </p:cNvPr>
-          <p:cNvSpPr/>
-          <p:nvPr/>
-        </p:nvSpPr>
-        <p:spPr>
-          <a:xfrm>
-            <a:off x="3984346" y="2861420"/>
-            <a:ext cx="1215845" cy="387178"/>
-          </a:xfrm>
-          <a:prstGeom prst="rect">
-            <a:avLst/>
-          </a:prstGeom>
-          <a:solidFill>
-            <a:srgbClr val="FF0000">
-              <a:alpha val="30000"/>
-            </a:srgbClr>
-          </a:solidFill>
-          <a:ln w="22225">
-            <a:solidFill>
-              <a:schemeClr val="tx1"/>
-            </a:solidFill>
-          </a:ln>
-        </p:spPr>
-        <p:style>
-          <a:lnRef idx="2">
-            <a:schemeClr val="accent1">
-              <a:shade val="50000"/>
-            </a:schemeClr>
-          </a:lnRef>
-          <a:fillRef idx="1">
-            <a:schemeClr val="accent1"/>
-          </a:fillRef>
-          <a:effectRef idx="0">
-            <a:schemeClr val="accent1"/>
-          </a:effectRef>
-          <a:fontRef idx="minor">
-            <a:schemeClr val="lt1"/>
-          </a:fontRef>
-        </p:style>
-        <p:txBody>
-          <a:bodyPr rtlCol="0" anchor="ctr"/>
-          <a:lstStyle/>
-          <a:p>
-            <a:pPr algn="ctr"/>
-            <a:r>
-              <a:rPr lang="en-US" altLang="zh-CN" b="1" dirty="0">
+                <a:prstDash val="dash"/>
+              </a:ln>
+            </p:spPr>
+            <p:style>
+              <a:lnRef idx="2">
+                <a:schemeClr val="accent2">
+                  <a:shade val="50000"/>
+                </a:schemeClr>
+              </a:lnRef>
+              <a:fillRef idx="1">
+                <a:schemeClr val="accent2"/>
+              </a:fillRef>
+              <a:effectRef idx="0">
+                <a:schemeClr val="accent2"/>
+              </a:effectRef>
+              <a:fontRef idx="minor">
+                <a:schemeClr val="lt1"/>
+              </a:fontRef>
+            </p:style>
+            <p:txBody>
+              <a:bodyPr rtlCol="0" anchor="b"/>
+              <a:lstStyle/>
+              <a:p>
+                <a:pPr algn="ctr"/>
+                <a:r>
+                  <a:rPr kumimoji="1" lang="en-US" altLang="zh-CN" sz="1200" b="1" dirty="0">
+                    <a:solidFill>
+                      <a:srgbClr val="FF0000"/>
+                    </a:solidFill>
+                    <a:latin typeface="DengXian" panose="02010600030101010101" pitchFamily="2" charset="-122"/>
+                    <a:ea typeface="DengXian" panose="02010600030101010101" pitchFamily="2" charset="-122"/>
+                  </a:rPr>
+                  <a:t>RESULT</a:t>
+                </a:r>
+                <a:r>
+                  <a:rPr kumimoji="1" lang="zh-CN" altLang="en-US" sz="1200" b="1" dirty="0">
+                    <a:solidFill>
+                      <a:srgbClr val="FF0000"/>
+                    </a:solidFill>
+                    <a:latin typeface="DengXian" panose="02010600030101010101" pitchFamily="2" charset="-122"/>
+                    <a:ea typeface="DengXian" panose="02010600030101010101" pitchFamily="2" charset="-122"/>
+                  </a:rPr>
+                  <a:t> </a:t>
+                </a:r>
+                <a:r>
+                  <a:rPr kumimoji="1" lang="en-US" altLang="zh-CN" sz="1200" dirty="0">
+                    <a:solidFill>
+                      <a:sysClr val="windowText" lastClr="000000"/>
+                    </a:solidFill>
+                    <a:latin typeface="DengXian" panose="02010600030101010101" pitchFamily="2" charset="-122"/>
+                    <a:ea typeface="DengXian" panose="02010600030101010101" pitchFamily="2" charset="-122"/>
+                  </a:rPr>
+                  <a:t>properties(</a:t>
+                </a:r>
+                <a:r>
+                  <a:rPr kumimoji="1" lang="en-US" altLang="zh-CN" sz="1200" b="1" dirty="0">
+                    <a:solidFill>
+                      <a:sysClr val="windowText" lastClr="000000"/>
+                    </a:solidFill>
+                    <a:latin typeface="DengXian" panose="02010600030101010101" pitchFamily="2" charset="-122"/>
+                    <a:ea typeface="DengXian" panose="02010600030101010101" pitchFamily="2" charset="-122"/>
+                  </a:rPr>
+                  <a:t>account</a:t>
+                </a:r>
+                <a:r>
+                  <a:rPr kumimoji="1" lang="en-US" altLang="zh-CN" sz="1200" dirty="0">
+                    <a:solidFill>
+                      <a:sysClr val="windowText" lastClr="000000"/>
+                    </a:solidFill>
+                    <a:latin typeface="DengXian" panose="02010600030101010101" pitchFamily="2" charset="-122"/>
+                    <a:ea typeface="DengXian" panose="02010600030101010101" pitchFamily="2" charset="-122"/>
+                  </a:rPr>
+                  <a:t>)</a:t>
+                </a:r>
+              </a:p>
+            </p:txBody>
+          </p:sp>
+          <p:grpSp>
+            <p:nvGrpSpPr>
+              <p:cNvPr id="9" name="Group 8">
+                <a:extLst>
+                  <a:ext uri="{FF2B5EF4-FFF2-40B4-BE49-F238E27FC236}">
+                    <a16:creationId xmlns:a16="http://schemas.microsoft.com/office/drawing/2014/main" id="{52A08965-7938-02E8-7A5E-CD3A10264DA7}"/>
+                  </a:ext>
+                </a:extLst>
+              </p:cNvPr>
+              <p:cNvGrpSpPr/>
+              <p:nvPr/>
+            </p:nvGrpSpPr>
+            <p:grpSpPr>
+              <a:xfrm>
+                <a:off x="1906774" y="2815878"/>
+                <a:ext cx="2116800" cy="1010292"/>
+                <a:chOff x="1814274" y="2815878"/>
+                <a:chExt cx="2116800" cy="1010292"/>
+              </a:xfrm>
+            </p:grpSpPr>
+            <p:sp>
+              <p:nvSpPr>
+                <p:cNvPr id="2" name="矩形 1">
+                  <a:extLst>
+                    <a:ext uri="{FF2B5EF4-FFF2-40B4-BE49-F238E27FC236}">
+                      <a16:creationId xmlns:a16="http://schemas.microsoft.com/office/drawing/2014/main" id="{B72C642D-A526-CE45-ADFB-CA4FB6B38A11}"/>
+                    </a:ext>
+                  </a:extLst>
+                </p:cNvPr>
+                <p:cNvSpPr/>
+                <p:nvPr/>
+              </p:nvSpPr>
+              <p:spPr>
+                <a:xfrm>
+                  <a:off x="1814274" y="2815878"/>
+                  <a:ext cx="2116800" cy="505147"/>
+                </a:xfrm>
+                <a:prstGeom prst="rect">
+                  <a:avLst/>
+                </a:prstGeom>
+                <a:solidFill>
+                  <a:schemeClr val="accent5">
+                    <a:lumMod val="60000"/>
+                    <a:lumOff val="40000"/>
+                  </a:schemeClr>
+                </a:solidFill>
+                <a:ln w="25400">
+                  <a:solidFill>
+                    <a:schemeClr val="tx1"/>
+                  </a:solidFill>
+                </a:ln>
+              </p:spPr>
+              <p:style>
+                <a:lnRef idx="2">
+                  <a:schemeClr val="accent2">
+                    <a:shade val="50000"/>
+                  </a:schemeClr>
+                </a:lnRef>
+                <a:fillRef idx="1">
+                  <a:schemeClr val="accent2"/>
+                </a:fillRef>
+                <a:effectRef idx="0">
+                  <a:schemeClr val="accent2"/>
+                </a:effectRef>
+                <a:fontRef idx="minor">
+                  <a:schemeClr val="lt1"/>
+                </a:fontRef>
+              </p:style>
+              <p:txBody>
+                <a:bodyPr rtlCol="0" anchor="ctr"/>
+                <a:lstStyle/>
+                <a:p>
+                  <a:pPr algn="ctr"/>
+                  <a:r>
+                    <a:rPr kumimoji="1" lang="en-US" altLang="zh-CN" sz="1200" b="1" dirty="0">
+                      <a:solidFill>
+                        <a:sysClr val="windowText" lastClr="000000"/>
+                      </a:solidFill>
+                    </a:rPr>
+                    <a:t>account</a:t>
+                  </a:r>
+                  <a:r>
+                    <a:rPr kumimoji="1" lang="en-US" altLang="zh-CN" sz="1200" dirty="0">
+                      <a:solidFill>
+                        <a:sysClr val="windowText" lastClr="000000"/>
+                      </a:solidFill>
+                    </a:rPr>
+                    <a:t>:</a:t>
+                  </a:r>
+                  <a:r>
+                    <a:rPr kumimoji="1" lang="zh-CN" altLang="en-US" sz="1200" dirty="0">
+                      <a:solidFill>
+                        <a:sysClr val="windowText" lastClr="000000"/>
+                      </a:solidFill>
+                    </a:rPr>
+                    <a:t> </a:t>
+                  </a:r>
+                  <a:r>
+                    <a:rPr kumimoji="1" lang="en-US" altLang="zh-CN" sz="1200" dirty="0">
+                      <a:solidFill>
+                        <a:sysClr val="windowText" lastClr="000000"/>
+                      </a:solidFill>
+                    </a:rPr>
+                    <a:t>Account</a:t>
+                  </a:r>
+                  <a:endParaRPr kumimoji="1" lang="zh-CN" altLang="en-US" sz="1200" dirty="0">
+                    <a:solidFill>
+                      <a:sysClr val="windowText" lastClr="000000"/>
+                    </a:solidFill>
+                  </a:endParaRPr>
+                </a:p>
+              </p:txBody>
+            </p:sp>
+            <p:sp>
+              <p:nvSpPr>
+                <p:cNvPr id="6" name="矩形 3">
+                  <a:extLst>
+                    <a:ext uri="{FF2B5EF4-FFF2-40B4-BE49-F238E27FC236}">
+                      <a16:creationId xmlns:a16="http://schemas.microsoft.com/office/drawing/2014/main" id="{BD3A2398-8C0D-7E74-5100-BA996C38E61A}"/>
+                    </a:ext>
+                  </a:extLst>
+                </p:cNvPr>
+                <p:cNvSpPr/>
+                <p:nvPr/>
+              </p:nvSpPr>
+              <p:spPr>
+                <a:xfrm>
+                  <a:off x="1814274" y="3321023"/>
+                  <a:ext cx="2116800" cy="505147"/>
+                </a:xfrm>
+                <a:prstGeom prst="rect">
+                  <a:avLst/>
+                </a:prstGeom>
+                <a:noFill/>
+                <a:ln w="25400">
+                  <a:solidFill>
+                    <a:schemeClr val="tx1"/>
+                  </a:solidFill>
+                </a:ln>
+              </p:spPr>
+              <p:style>
+                <a:lnRef idx="2">
+                  <a:schemeClr val="accent2">
+                    <a:shade val="50000"/>
+                  </a:schemeClr>
+                </a:lnRef>
+                <a:fillRef idx="1">
+                  <a:schemeClr val="accent2"/>
+                </a:fillRef>
+                <a:effectRef idx="0">
+                  <a:schemeClr val="accent2"/>
+                </a:effectRef>
+                <a:fontRef idx="minor">
+                  <a:schemeClr val="lt1"/>
+                </a:fontRef>
+              </p:style>
+              <p:txBody>
+                <a:bodyPr rtlCol="0" anchor="ctr"/>
+                <a:lstStyle/>
+                <a:p>
+                  <a:pPr algn="ctr"/>
+                  <a:r>
+                    <a:rPr kumimoji="1" lang="en-US" altLang="zh-CN" sz="1200" b="1" dirty="0" err="1">
+                      <a:solidFill>
+                        <a:sysClr val="windowText" lastClr="000000"/>
+                      </a:solidFill>
+                      <a:latin typeface="DengXian" panose="02010600030101010101" pitchFamily="2" charset="-122"/>
+                      <a:ea typeface="DengXian" panose="02010600030101010101" pitchFamily="2" charset="-122"/>
+                    </a:rPr>
+                    <a:t>account</a:t>
+                  </a:r>
+                  <a:r>
+                    <a:rPr kumimoji="1" lang="en-US" altLang="zh-CN" sz="1200" dirty="0" err="1">
+                      <a:solidFill>
+                        <a:sysClr val="windowText" lastClr="000000"/>
+                      </a:solidFill>
+                      <a:latin typeface="DengXian" panose="02010600030101010101" pitchFamily="2" charset="-122"/>
+                      <a:ea typeface="DengXian" panose="02010600030101010101" pitchFamily="2" charset="-122"/>
+                    </a:rPr>
+                    <a:t>.id</a:t>
+                  </a:r>
+                  <a:r>
+                    <a:rPr kumimoji="1" lang="en-US" altLang="zh-CN" sz="1200" dirty="0">
+                      <a:solidFill>
+                        <a:sysClr val="windowText" lastClr="000000"/>
+                      </a:solidFill>
+                      <a:latin typeface="DengXian" panose="02010600030101010101" pitchFamily="2" charset="-122"/>
+                      <a:ea typeface="DengXian" panose="02010600030101010101" pitchFamily="2" charset="-122"/>
+                    </a:rPr>
+                    <a:t>:</a:t>
+                  </a:r>
+                  <a:r>
+                    <a:rPr kumimoji="1" lang="zh-CN" altLang="en-US" sz="1200" dirty="0">
+                      <a:solidFill>
+                        <a:sysClr val="windowText" lastClr="000000"/>
+                      </a:solidFill>
+                      <a:latin typeface="DengXian" panose="02010600030101010101" pitchFamily="2" charset="-122"/>
+                      <a:ea typeface="DengXian" panose="02010600030101010101" pitchFamily="2" charset="-122"/>
+                    </a:rPr>
+                    <a:t> </a:t>
+                  </a:r>
+                  <a:r>
+                    <a:rPr kumimoji="1" lang="en-US" altLang="zh-CN" sz="1200" dirty="0">
+                      <a:solidFill>
+                        <a:sysClr val="windowText" lastClr="000000"/>
+                      </a:solidFill>
+                      <a:latin typeface="DengXian" panose="02010600030101010101" pitchFamily="2" charset="-122"/>
+                      <a:ea typeface="DengXian" panose="02010600030101010101" pitchFamily="2" charset="-122"/>
+                    </a:rPr>
+                    <a:t>${id}</a:t>
+                  </a:r>
+                  <a:endParaRPr kumimoji="1" lang="zh-CN" altLang="en-US" sz="1200" dirty="0">
+                    <a:solidFill>
+                      <a:sysClr val="windowText" lastClr="000000"/>
+                    </a:solidFill>
+                    <a:latin typeface="DengXian" panose="02010600030101010101" pitchFamily="2" charset="-122"/>
+                    <a:ea typeface="DengXian" panose="02010600030101010101" pitchFamily="2" charset="-122"/>
+                  </a:endParaRPr>
+                </a:p>
+              </p:txBody>
+            </p:sp>
+          </p:grpSp>
+        </p:grpSp>
+        <p:grpSp>
+          <p:nvGrpSpPr>
+            <p:cNvPr id="10" name="Group 9">
+              <a:extLst>
+                <a:ext uri="{FF2B5EF4-FFF2-40B4-BE49-F238E27FC236}">
+                  <a16:creationId xmlns:a16="http://schemas.microsoft.com/office/drawing/2014/main" id="{A43BD305-30B1-E286-02CD-0C8134774423}"/>
+                </a:ext>
+              </a:extLst>
+            </p:cNvPr>
+            <p:cNvGrpSpPr/>
+            <p:nvPr/>
+          </p:nvGrpSpPr>
+          <p:grpSpPr>
+            <a:xfrm>
+              <a:off x="7185990" y="2640495"/>
+              <a:ext cx="2716695" cy="1577009"/>
+              <a:chOff x="6500192" y="2640495"/>
+              <a:chExt cx="2716695" cy="1577009"/>
+            </a:xfrm>
+          </p:grpSpPr>
+          <p:grpSp>
+            <p:nvGrpSpPr>
+              <p:cNvPr id="8" name="Group 7">
+                <a:extLst>
+                  <a:ext uri="{FF2B5EF4-FFF2-40B4-BE49-F238E27FC236}">
+                    <a16:creationId xmlns:a16="http://schemas.microsoft.com/office/drawing/2014/main" id="{7CE25A49-AE87-2B55-03D7-B1DC81E8A317}"/>
+                  </a:ext>
+                </a:extLst>
+              </p:cNvPr>
+              <p:cNvGrpSpPr/>
+              <p:nvPr/>
+            </p:nvGrpSpPr>
+            <p:grpSpPr>
+              <a:xfrm>
+                <a:off x="6800300" y="2815877"/>
+                <a:ext cx="2116478" cy="1010294"/>
+                <a:chOff x="6743980" y="2815877"/>
+                <a:chExt cx="2116478" cy="1010294"/>
+              </a:xfrm>
+            </p:grpSpPr>
+            <p:sp>
+              <p:nvSpPr>
+                <p:cNvPr id="4" name="矩形 3">
+                  <a:extLst>
+                    <a:ext uri="{FF2B5EF4-FFF2-40B4-BE49-F238E27FC236}">
+                      <a16:creationId xmlns:a16="http://schemas.microsoft.com/office/drawing/2014/main" id="{68924B86-E5E9-2247-A385-17C2F6B27826}"/>
+                    </a:ext>
+                  </a:extLst>
+                </p:cNvPr>
+                <p:cNvSpPr/>
+                <p:nvPr/>
+              </p:nvSpPr>
+              <p:spPr>
+                <a:xfrm>
+                  <a:off x="6743980" y="3321024"/>
+                  <a:ext cx="2116478" cy="505147"/>
+                </a:xfrm>
+                <a:prstGeom prst="rect">
+                  <a:avLst/>
+                </a:prstGeom>
+                <a:noFill/>
+                <a:ln w="25400">
+                  <a:solidFill>
+                    <a:schemeClr val="tx1"/>
+                  </a:solidFill>
+                </a:ln>
+              </p:spPr>
+              <p:style>
+                <a:lnRef idx="2">
+                  <a:schemeClr val="accent2">
+                    <a:shade val="50000"/>
+                  </a:schemeClr>
+                </a:lnRef>
+                <a:fillRef idx="1">
+                  <a:schemeClr val="accent2"/>
+                </a:fillRef>
+                <a:effectRef idx="0">
+                  <a:schemeClr val="accent2"/>
+                </a:effectRef>
+                <a:fontRef idx="minor">
+                  <a:schemeClr val="lt1"/>
+                </a:fontRef>
+              </p:style>
+              <p:txBody>
+                <a:bodyPr rtlCol="0" anchor="ctr"/>
+                <a:lstStyle/>
+                <a:p>
+                  <a:pPr algn="ctr"/>
+                  <a:r>
+                    <a:rPr kumimoji="1" lang="en-US" altLang="zh-CN" sz="1200" b="1" dirty="0" err="1">
+                      <a:solidFill>
+                        <a:sysClr val="windowText" lastClr="000000"/>
+                      </a:solidFill>
+                      <a:latin typeface="DengXian" panose="02010600030101010101" pitchFamily="2" charset="-122"/>
+                      <a:ea typeface="DengXian" panose="02010600030101010101" pitchFamily="2" charset="-122"/>
+                    </a:rPr>
+                    <a:t>person</a:t>
+                  </a:r>
+                  <a:r>
+                    <a:rPr kumimoji="1" lang="en-US" altLang="zh-CN" sz="1200" dirty="0" err="1">
+                      <a:solidFill>
+                        <a:sysClr val="windowText" lastClr="000000"/>
+                      </a:solidFill>
+                      <a:latin typeface="DengXian" panose="02010600030101010101" pitchFamily="2" charset="-122"/>
+                      <a:ea typeface="DengXian" panose="02010600030101010101" pitchFamily="2" charset="-122"/>
+                    </a:rPr>
+                    <a:t>.id</a:t>
+                  </a:r>
+                  <a:r>
+                    <a:rPr kumimoji="1" lang="en-US" altLang="zh-CN" sz="1200" dirty="0">
+                      <a:solidFill>
+                        <a:sysClr val="windowText" lastClr="000000"/>
+                      </a:solidFill>
+                      <a:latin typeface="DengXian" panose="02010600030101010101" pitchFamily="2" charset="-122"/>
+                      <a:ea typeface="DengXian" panose="02010600030101010101" pitchFamily="2" charset="-122"/>
+                    </a:rPr>
+                    <a:t>:</a:t>
+                  </a:r>
+                  <a:r>
+                    <a:rPr kumimoji="1" lang="zh-CN" altLang="en-US" sz="1200" dirty="0">
+                      <a:solidFill>
+                        <a:sysClr val="windowText" lastClr="000000"/>
+                      </a:solidFill>
+                      <a:latin typeface="DengXian" panose="02010600030101010101" pitchFamily="2" charset="-122"/>
+                      <a:ea typeface="DengXian" panose="02010600030101010101" pitchFamily="2" charset="-122"/>
+                    </a:rPr>
+                    <a:t> </a:t>
+                  </a:r>
+                  <a:r>
+                    <a:rPr kumimoji="1" lang="en-US" altLang="zh-CN" sz="1200" dirty="0">
+                      <a:solidFill>
+                        <a:sysClr val="windowText" lastClr="000000"/>
+                      </a:solidFill>
+                      <a:latin typeface="DengXian" panose="02010600030101010101" pitchFamily="2" charset="-122"/>
+                      <a:ea typeface="DengXian" panose="02010600030101010101" pitchFamily="2" charset="-122"/>
+                    </a:rPr>
+                    <a:t>${id}</a:t>
+                  </a:r>
+                  <a:endParaRPr kumimoji="1" lang="zh-CN" altLang="en-US" sz="1200" dirty="0">
+                    <a:solidFill>
+                      <a:sysClr val="windowText" lastClr="000000"/>
+                    </a:solidFill>
+                    <a:latin typeface="DengXian" panose="02010600030101010101" pitchFamily="2" charset="-122"/>
+                    <a:ea typeface="DengXian" panose="02010600030101010101" pitchFamily="2" charset="-122"/>
+                  </a:endParaRPr>
+                </a:p>
+              </p:txBody>
+            </p:sp>
+            <p:sp>
+              <p:nvSpPr>
+                <p:cNvPr id="5" name="矩形 9">
+                  <a:extLst>
+                    <a:ext uri="{FF2B5EF4-FFF2-40B4-BE49-F238E27FC236}">
+                      <a16:creationId xmlns:a16="http://schemas.microsoft.com/office/drawing/2014/main" id="{6641C98C-130F-B917-6069-671A355C0494}"/>
+                    </a:ext>
+                  </a:extLst>
+                </p:cNvPr>
+                <p:cNvSpPr/>
+                <p:nvPr/>
+              </p:nvSpPr>
+              <p:spPr>
+                <a:xfrm>
+                  <a:off x="6743980" y="2815877"/>
+                  <a:ext cx="2116478" cy="505147"/>
+                </a:xfrm>
+                <a:prstGeom prst="rect">
+                  <a:avLst/>
+                </a:prstGeom>
+                <a:solidFill>
+                  <a:schemeClr val="accent6">
+                    <a:lumMod val="60000"/>
+                    <a:lumOff val="40000"/>
+                  </a:schemeClr>
+                </a:solidFill>
+                <a:ln w="25400">
+                  <a:solidFill>
+                    <a:schemeClr val="tx1"/>
+                  </a:solidFill>
+                </a:ln>
+              </p:spPr>
+              <p:style>
+                <a:lnRef idx="2">
+                  <a:schemeClr val="accent2">
+                    <a:shade val="50000"/>
+                  </a:schemeClr>
+                </a:lnRef>
+                <a:fillRef idx="1">
+                  <a:schemeClr val="accent2"/>
+                </a:fillRef>
+                <a:effectRef idx="0">
+                  <a:schemeClr val="accent2"/>
+                </a:effectRef>
+                <a:fontRef idx="minor">
+                  <a:schemeClr val="lt1"/>
+                </a:fontRef>
+              </p:style>
+              <p:txBody>
+                <a:bodyPr rtlCol="0" anchor="ctr"/>
+                <a:lstStyle/>
+                <a:p>
+                  <a:pPr algn="ctr"/>
+                  <a:r>
+                    <a:rPr kumimoji="1" lang="en-US" altLang="zh-CN" sz="1200" b="1" dirty="0">
+                      <a:solidFill>
+                        <a:sysClr val="windowText" lastClr="000000"/>
+                      </a:solidFill>
+                    </a:rPr>
+                    <a:t>person</a:t>
+                  </a:r>
+                  <a:r>
+                    <a:rPr kumimoji="1" lang="zh-CN" altLang="en-US" sz="1200" dirty="0">
+                      <a:solidFill>
+                        <a:sysClr val="windowText" lastClr="000000"/>
+                      </a:solidFill>
+                    </a:rPr>
+                    <a:t> </a:t>
+                  </a:r>
+                  <a:r>
+                    <a:rPr kumimoji="1" lang="en-US" altLang="zh-CN" sz="1200" dirty="0">
+                      <a:solidFill>
+                        <a:sysClr val="windowText" lastClr="000000"/>
+                      </a:solidFill>
+                    </a:rPr>
+                    <a:t>:</a:t>
+                  </a:r>
+                  <a:r>
+                    <a:rPr kumimoji="1" lang="zh-CN" altLang="en-US" sz="1200" dirty="0">
+                      <a:solidFill>
+                        <a:sysClr val="windowText" lastClr="000000"/>
+                      </a:solidFill>
+                    </a:rPr>
+                    <a:t> </a:t>
+                  </a:r>
+                  <a:r>
+                    <a:rPr kumimoji="1" lang="en-US" altLang="zh-CN" sz="1200" dirty="0">
+                      <a:solidFill>
+                        <a:sysClr val="windowText" lastClr="000000"/>
+                      </a:solidFill>
+                    </a:rPr>
+                    <a:t>Person</a:t>
+                  </a:r>
+                  <a:endParaRPr kumimoji="1" lang="zh-CN" altLang="en-US" sz="1200" dirty="0">
+                    <a:solidFill>
+                      <a:sysClr val="windowText" lastClr="000000"/>
+                    </a:solidFill>
+                  </a:endParaRPr>
+                </a:p>
+              </p:txBody>
+            </p:sp>
+          </p:grpSp>
+          <p:sp>
+            <p:nvSpPr>
+              <p:cNvPr id="7" name="矩形 2">
+                <a:extLst>
+                  <a:ext uri="{FF2B5EF4-FFF2-40B4-BE49-F238E27FC236}">
+                    <a16:creationId xmlns:a16="http://schemas.microsoft.com/office/drawing/2014/main" id="{796335C9-7FF2-C371-B888-EBFB3C3FDC46}"/>
+                  </a:ext>
+                </a:extLst>
+              </p:cNvPr>
+              <p:cNvSpPr/>
+              <p:nvPr/>
+            </p:nvSpPr>
+            <p:spPr>
+              <a:xfrm>
+                <a:off x="6500192" y="2640495"/>
+                <a:ext cx="2716695" cy="1577009"/>
+              </a:xfrm>
+              <a:prstGeom prst="rect">
+                <a:avLst/>
+              </a:prstGeom>
+              <a:noFill/>
+              <a:ln w="25400">
                 <a:solidFill>
                   <a:schemeClr val="tx1"/>
                 </a:solidFill>
-              </a:rPr>
-              <a:t>Company</a:t>
-            </a:r>
-            <a:endParaRPr lang="en-CN" b="1" dirty="0">
-              <a:solidFill>
-                <a:schemeClr val="tx1"/>
-              </a:solidFill>
-            </a:endParaRPr>
-          </a:p>
-        </p:txBody>
-      </p:sp>
-      <p:sp>
-        <p:nvSpPr>
-          <p:cNvPr id="6" name="Rectangle 5">
-            <a:extLst>
-              <a:ext uri="{FF2B5EF4-FFF2-40B4-BE49-F238E27FC236}">
-                <a16:creationId xmlns:a16="http://schemas.microsoft.com/office/drawing/2014/main" id="{4C51DCB4-07F1-ACD1-2A47-E37BE04A33BA}"/>
-              </a:ext>
-            </a:extLst>
-          </p:cNvPr>
-          <p:cNvSpPr/>
-          <p:nvPr/>
-        </p:nvSpPr>
-        <p:spPr>
-          <a:xfrm>
-            <a:off x="7040605" y="2861420"/>
-            <a:ext cx="1226941" cy="387178"/>
-          </a:xfrm>
-          <a:prstGeom prst="rect">
-            <a:avLst/>
-          </a:prstGeom>
-          <a:solidFill>
-            <a:schemeClr val="accent1">
-              <a:lumMod val="60000"/>
-              <a:lumOff val="40000"/>
-            </a:schemeClr>
-          </a:solidFill>
-          <a:ln w="22225">
-            <a:solidFill>
-              <a:schemeClr val="tx1"/>
-            </a:solidFill>
-          </a:ln>
-        </p:spPr>
-        <p:style>
-          <a:lnRef idx="2">
-            <a:schemeClr val="accent1">
-              <a:shade val="50000"/>
-            </a:schemeClr>
-          </a:lnRef>
-          <a:fillRef idx="1">
-            <a:schemeClr val="accent1"/>
-          </a:fillRef>
-          <a:effectRef idx="0">
-            <a:schemeClr val="accent1"/>
-          </a:effectRef>
-          <a:fontRef idx="minor">
-            <a:schemeClr val="lt1"/>
-          </a:fontRef>
-        </p:style>
-        <p:txBody>
-          <a:bodyPr rtlCol="0" anchor="ctr"/>
-          <a:lstStyle/>
-          <a:p>
-            <a:pPr algn="ctr"/>
-            <a:r>
-              <a:rPr lang="en-US" altLang="zh-CN" b="1" dirty="0">
-                <a:solidFill>
-                  <a:schemeClr val="tx1"/>
-                </a:solidFill>
-              </a:rPr>
-              <a:t>Account</a:t>
-            </a:r>
-            <a:endParaRPr lang="en-CN" b="1" dirty="0">
-              <a:solidFill>
-                <a:schemeClr val="tx1"/>
-              </a:solidFill>
-            </a:endParaRPr>
-          </a:p>
-        </p:txBody>
-      </p:sp>
-      <p:sp>
-        <p:nvSpPr>
-          <p:cNvPr id="9" name="Rectangle 8">
-            <a:extLst>
-              <a:ext uri="{FF2B5EF4-FFF2-40B4-BE49-F238E27FC236}">
-                <a16:creationId xmlns:a16="http://schemas.microsoft.com/office/drawing/2014/main" id="{5F68F319-B446-C876-5ECA-738B6558B6E1}"/>
-              </a:ext>
-            </a:extLst>
-          </p:cNvPr>
-          <p:cNvSpPr/>
-          <p:nvPr/>
-        </p:nvSpPr>
-        <p:spPr>
-          <a:xfrm>
-            <a:off x="8567168" y="2861420"/>
-            <a:ext cx="1215845" cy="387178"/>
-          </a:xfrm>
-          <a:prstGeom prst="rect">
-            <a:avLst/>
-          </a:prstGeom>
-          <a:solidFill>
-            <a:schemeClr val="accent4">
-              <a:lumMod val="60000"/>
-              <a:lumOff val="40000"/>
-            </a:schemeClr>
-          </a:solidFill>
-          <a:ln w="22225">
-            <a:solidFill>
-              <a:schemeClr val="tx1"/>
-            </a:solidFill>
-          </a:ln>
-        </p:spPr>
-        <p:style>
-          <a:lnRef idx="2">
-            <a:schemeClr val="accent1">
-              <a:shade val="50000"/>
-            </a:schemeClr>
-          </a:lnRef>
-          <a:fillRef idx="1">
-            <a:schemeClr val="accent1"/>
-          </a:fillRef>
-          <a:effectRef idx="0">
-            <a:schemeClr val="accent1"/>
-          </a:effectRef>
-          <a:fontRef idx="minor">
-            <a:schemeClr val="lt1"/>
-          </a:fontRef>
-        </p:style>
-        <p:txBody>
-          <a:bodyPr rtlCol="0" anchor="ctr"/>
-          <a:lstStyle/>
-          <a:p>
-            <a:pPr algn="ctr"/>
-            <a:r>
-              <a:rPr lang="en-US" altLang="zh-CN" b="1" dirty="0">
-                <a:solidFill>
-                  <a:schemeClr val="tx1"/>
-                </a:solidFill>
-              </a:rPr>
-              <a:t>Medium</a:t>
-            </a:r>
-            <a:endParaRPr lang="en-CN" b="1" dirty="0">
-              <a:solidFill>
-                <a:schemeClr val="tx1"/>
-              </a:solidFill>
-            </a:endParaRPr>
-          </a:p>
-        </p:txBody>
-      </p:sp>
-      <p:sp>
-        <p:nvSpPr>
-          <p:cNvPr id="12" name="Rectangle 11">
-            <a:extLst>
-              <a:ext uri="{FF2B5EF4-FFF2-40B4-BE49-F238E27FC236}">
-                <a16:creationId xmlns:a16="http://schemas.microsoft.com/office/drawing/2014/main" id="{74363A22-BDF1-F1C7-E411-2E379C3A7160}"/>
-              </a:ext>
-            </a:extLst>
-          </p:cNvPr>
-          <p:cNvSpPr/>
-          <p:nvPr/>
-        </p:nvSpPr>
-        <p:spPr>
-          <a:xfrm>
-            <a:off x="5506920" y="2861420"/>
-            <a:ext cx="1226977" cy="387178"/>
-          </a:xfrm>
-          <a:prstGeom prst="rect">
-            <a:avLst/>
-          </a:prstGeom>
-          <a:solidFill>
-            <a:schemeClr val="accent2">
-              <a:lumMod val="60000"/>
-              <a:lumOff val="40000"/>
-            </a:schemeClr>
-          </a:solidFill>
-          <a:ln w="22225">
-            <a:solidFill>
-              <a:schemeClr val="tx1"/>
-            </a:solidFill>
-          </a:ln>
-        </p:spPr>
-        <p:style>
-          <a:lnRef idx="2">
-            <a:schemeClr val="accent1">
-              <a:shade val="50000"/>
-            </a:schemeClr>
-          </a:lnRef>
-          <a:fillRef idx="1">
-            <a:schemeClr val="accent1"/>
-          </a:fillRef>
-          <a:effectRef idx="0">
-            <a:schemeClr val="accent1"/>
-          </a:effectRef>
-          <a:fontRef idx="minor">
-            <a:schemeClr val="lt1"/>
-          </a:fontRef>
-        </p:style>
-        <p:txBody>
-          <a:bodyPr rtlCol="0" anchor="ctr"/>
-          <a:lstStyle/>
-          <a:p>
-            <a:pPr algn="ctr"/>
-            <a:r>
-              <a:rPr lang="en-US" altLang="zh-CN" b="1" dirty="0">
-                <a:solidFill>
-                  <a:schemeClr val="tx1"/>
-                </a:solidFill>
-              </a:rPr>
-              <a:t>Loan</a:t>
-            </a:r>
-            <a:endParaRPr lang="en-CN" b="1" dirty="0">
-              <a:solidFill>
-                <a:schemeClr val="tx1"/>
-              </a:solidFill>
-            </a:endParaRPr>
-          </a:p>
-        </p:txBody>
-      </p:sp>
-      <p:sp>
-        <p:nvSpPr>
-          <p:cNvPr id="2" name="文本框 12">
-            <a:extLst>
-              <a:ext uri="{FF2B5EF4-FFF2-40B4-BE49-F238E27FC236}">
-                <a16:creationId xmlns:a16="http://schemas.microsoft.com/office/drawing/2014/main" id="{F15BB429-1D1A-0E43-F714-5B25121059E2}"/>
-              </a:ext>
-            </a:extLst>
-          </p:cNvPr>
-          <p:cNvSpPr txBox="1"/>
-          <p:nvPr/>
-        </p:nvSpPr>
-        <p:spPr>
-          <a:xfrm>
-            <a:off x="2468880" y="3867488"/>
-            <a:ext cx="2583766" cy="1015663"/>
-          </a:xfrm>
-          <a:prstGeom prst="rect">
-            <a:avLst/>
-          </a:prstGeom>
-          <a:noFill/>
-        </p:spPr>
-        <p:txBody>
-          <a:bodyPr wrap="square" rtlCol="0">
-            <a:spAutoFit/>
-          </a:bodyPr>
-          <a:lstStyle/>
-          <a:p>
-            <a:r>
-              <a:rPr kumimoji="1" lang="en-US" altLang="zh-CN" sz="1200" b="1" dirty="0">
+                <a:prstDash val="dash"/>
+              </a:ln>
+            </p:spPr>
+            <p:style>
+              <a:lnRef idx="2">
+                <a:schemeClr val="accent2">
+                  <a:shade val="50000"/>
+                </a:schemeClr>
+              </a:lnRef>
+              <a:fillRef idx="1">
+                <a:schemeClr val="accent2"/>
+              </a:fillRef>
+              <a:effectRef idx="0">
+                <a:schemeClr val="accent2"/>
+              </a:effectRef>
+              <a:fontRef idx="minor">
+                <a:schemeClr val="lt1"/>
+              </a:fontRef>
+            </p:style>
+            <p:txBody>
+              <a:bodyPr rtlCol="0" anchor="b"/>
+              <a:lstStyle/>
+              <a:p>
+                <a:pPr algn="ctr"/>
+                <a:r>
+                  <a:rPr kumimoji="1" lang="en-US" altLang="zh-CN" sz="1200" b="1" dirty="0">
+                    <a:solidFill>
+                      <a:srgbClr val="FF0000"/>
+                    </a:solidFill>
+                    <a:latin typeface="DengXian" panose="02010600030101010101" pitchFamily="2" charset="-122"/>
+                    <a:ea typeface="DengXian" panose="02010600030101010101" pitchFamily="2" charset="-122"/>
+                  </a:rPr>
+                  <a:t>RESULT</a:t>
+                </a:r>
+                <a:r>
+                  <a:rPr kumimoji="1" lang="zh-CN" altLang="en-US" sz="1200" b="1" dirty="0">
+                    <a:solidFill>
+                      <a:srgbClr val="FF0000"/>
+                    </a:solidFill>
+                    <a:latin typeface="DengXian" panose="02010600030101010101" pitchFamily="2" charset="-122"/>
+                    <a:ea typeface="DengXian" panose="02010600030101010101" pitchFamily="2" charset="-122"/>
+                  </a:rPr>
+                  <a:t> </a:t>
+                </a:r>
+                <a:r>
+                  <a:rPr kumimoji="1" lang="en-US" altLang="zh-CN" sz="1200" dirty="0">
+                    <a:solidFill>
+                      <a:sysClr val="windowText" lastClr="000000"/>
+                    </a:solidFill>
+                    <a:latin typeface="DengXian" panose="02010600030101010101" pitchFamily="2" charset="-122"/>
+                    <a:ea typeface="DengXian" panose="02010600030101010101" pitchFamily="2" charset="-122"/>
+                  </a:rPr>
+                  <a:t>properties(</a:t>
+                </a:r>
+                <a:r>
+                  <a:rPr kumimoji="1" lang="en-US" altLang="zh-CN" sz="1200" b="1" dirty="0">
+                    <a:solidFill>
+                      <a:sysClr val="windowText" lastClr="000000"/>
+                    </a:solidFill>
+                    <a:latin typeface="DengXian" panose="02010600030101010101" pitchFamily="2" charset="-122"/>
+                    <a:ea typeface="DengXian" panose="02010600030101010101" pitchFamily="2" charset="-122"/>
+                  </a:rPr>
+                  <a:t>account</a:t>
+                </a:r>
+                <a:r>
+                  <a:rPr kumimoji="1" lang="en-US" altLang="zh-CN" sz="1200" dirty="0">
+                    <a:solidFill>
+                      <a:sysClr val="windowText" lastClr="000000"/>
+                    </a:solidFill>
+                    <a:latin typeface="DengXian" panose="02010600030101010101" pitchFamily="2" charset="-122"/>
+                    <a:ea typeface="DengXian" panose="02010600030101010101" pitchFamily="2" charset="-122"/>
+                  </a:rPr>
+                  <a:t>)</a:t>
+                </a:r>
+              </a:p>
+            </p:txBody>
+          </p:sp>
+        </p:grpSp>
+        <p:sp>
+          <p:nvSpPr>
+            <p:cNvPr id="12" name="文本框 7">
+              <a:extLst>
+                <a:ext uri="{FF2B5EF4-FFF2-40B4-BE49-F238E27FC236}">
+                  <a16:creationId xmlns:a16="http://schemas.microsoft.com/office/drawing/2014/main" id="{AD01137A-7769-D5E3-C126-DE166D6BD9DD}"/>
+                </a:ext>
+              </a:extLst>
+            </p:cNvPr>
+            <p:cNvSpPr txBox="1"/>
+            <p:nvPr/>
+          </p:nvSpPr>
+          <p:spPr>
+            <a:xfrm>
+              <a:off x="5768906" y="3228945"/>
+              <a:ext cx="654188" cy="400110"/>
+            </a:xfrm>
+            <a:prstGeom prst="rect">
+              <a:avLst/>
+            </a:prstGeom>
+            <a:noFill/>
+          </p:spPr>
+          <p:txBody>
+            <a:bodyPr wrap="square" rtlCol="0">
+              <a:spAutoFit/>
+            </a:bodyPr>
+            <a:lstStyle/>
+            <a:p>
+              <a:pPr algn="ctr"/>
+              <a:r>
+                <a:rPr kumimoji="1" lang="en-US" altLang="zh-CN" sz="2000" b="1" dirty="0">
+                  <a:latin typeface="DengXian" panose="02010600030101010101" pitchFamily="2" charset="-122"/>
+                  <a:ea typeface="DengXian" panose="02010600030101010101" pitchFamily="2" charset="-122"/>
+                </a:rPr>
+                <a:t>or</a:t>
+              </a:r>
+              <a:endParaRPr kumimoji="1" lang="en-US" altLang="zh-CN" sz="2000" dirty="0">
                 <a:latin typeface="DengXian" panose="02010600030101010101" pitchFamily="2" charset="-122"/>
                 <a:ea typeface="DengXian" panose="02010600030101010101" pitchFamily="2" charset="-122"/>
-              </a:rPr>
-              <a:t>Color:</a:t>
-            </a:r>
-            <a:r>
-              <a:rPr kumimoji="1" lang="zh-CN" altLang="en-US" sz="1200" b="1" dirty="0">
-                <a:latin typeface="DengXian" panose="02010600030101010101" pitchFamily="2" charset="-122"/>
-                <a:ea typeface="DengXian" panose="02010600030101010101" pitchFamily="2" charset="-122"/>
-              </a:rPr>
-              <a:t> </a:t>
-            </a:r>
-            <a:r>
-              <a:rPr kumimoji="1" lang="en-US" altLang="zh-CN" sz="1200" b="1" dirty="0">
-                <a:latin typeface="DengXian" panose="02010600030101010101" pitchFamily="2" charset="-122"/>
-                <a:ea typeface="DengXian" panose="02010600030101010101" pitchFamily="2" charset="-122"/>
-              </a:rPr>
-              <a:t>as</a:t>
-            </a:r>
-            <a:r>
-              <a:rPr kumimoji="1" lang="zh-CN" altLang="en-US" sz="1200" b="1" dirty="0">
-                <a:latin typeface="DengXian" panose="02010600030101010101" pitchFamily="2" charset="-122"/>
-                <a:ea typeface="DengXian" panose="02010600030101010101" pitchFamily="2" charset="-122"/>
-              </a:rPr>
-              <a:t> </a:t>
-            </a:r>
-            <a:r>
-              <a:rPr kumimoji="1" lang="en-US" altLang="zh-CN" sz="1200" b="1" dirty="0">
-                <a:latin typeface="DengXian" panose="02010600030101010101" pitchFamily="2" charset="-122"/>
-                <a:ea typeface="DengXian" panose="02010600030101010101" pitchFamily="2" charset="-122"/>
-              </a:rPr>
-              <a:t>above</a:t>
-            </a:r>
-          </a:p>
-          <a:p>
-            <a:r>
-              <a:rPr kumimoji="1" lang="en-US" altLang="zh-CN" sz="1200" b="1" dirty="0">
-                <a:latin typeface="DengXian" panose="02010600030101010101" pitchFamily="2" charset="-122"/>
-                <a:ea typeface="DengXian" panose="02010600030101010101" pitchFamily="2" charset="-122"/>
-              </a:rPr>
-              <a:t>Font</a:t>
-            </a:r>
-            <a:r>
-              <a:rPr kumimoji="1" lang="zh-CN" altLang="en-US" sz="1200" b="1" dirty="0">
-                <a:latin typeface="DengXian" panose="02010600030101010101" pitchFamily="2" charset="-122"/>
-                <a:ea typeface="DengXian" panose="02010600030101010101" pitchFamily="2" charset="-122"/>
-              </a:rPr>
-              <a:t> </a:t>
-            </a:r>
-            <a:r>
-              <a:rPr kumimoji="1" lang="en-US" altLang="zh-CN" sz="1200" b="1" dirty="0">
-                <a:latin typeface="DengXian" panose="02010600030101010101" pitchFamily="2" charset="-122"/>
-                <a:ea typeface="DengXian" panose="02010600030101010101" pitchFamily="2" charset="-122"/>
-              </a:rPr>
-              <a:t>size:</a:t>
-            </a:r>
-            <a:r>
-              <a:rPr kumimoji="1" lang="zh-CN" altLang="en-US" sz="1200" b="1" dirty="0">
-                <a:latin typeface="DengXian" panose="02010600030101010101" pitchFamily="2" charset="-122"/>
-                <a:ea typeface="DengXian" panose="02010600030101010101" pitchFamily="2" charset="-122"/>
-              </a:rPr>
-              <a:t> </a:t>
-            </a:r>
-            <a:r>
-              <a:rPr kumimoji="1" lang="en-US" altLang="zh-CN" sz="1200" b="1" dirty="0">
-                <a:latin typeface="DengXian" panose="02010600030101010101" pitchFamily="2" charset="-122"/>
-                <a:ea typeface="DengXian" panose="02010600030101010101" pitchFamily="2" charset="-122"/>
-              </a:rPr>
-              <a:t>12</a:t>
-            </a:r>
-          </a:p>
-          <a:p>
-            <a:r>
-              <a:rPr kumimoji="1" lang="en-US" altLang="zh-CN" sz="1200" b="1" dirty="0">
-                <a:latin typeface="DengXian" panose="02010600030101010101" pitchFamily="2" charset="-122"/>
-                <a:ea typeface="DengXian" panose="02010600030101010101" pitchFamily="2" charset="-122"/>
-              </a:rPr>
-              <a:t>Border</a:t>
-            </a:r>
-            <a:r>
-              <a:rPr kumimoji="1" lang="zh-CN" altLang="en-US" sz="1200" b="1" dirty="0">
-                <a:latin typeface="DengXian" panose="02010600030101010101" pitchFamily="2" charset="-122"/>
-                <a:ea typeface="DengXian" panose="02010600030101010101" pitchFamily="2" charset="-122"/>
-              </a:rPr>
-              <a:t> </a:t>
-            </a:r>
-            <a:r>
-              <a:rPr kumimoji="1" lang="en-US" altLang="zh-CN" sz="1200" b="1" dirty="0">
-                <a:latin typeface="DengXian" panose="02010600030101010101" pitchFamily="2" charset="-122"/>
-                <a:ea typeface="DengXian" panose="02010600030101010101" pitchFamily="2" charset="-122"/>
-              </a:rPr>
-              <a:t>width:</a:t>
-            </a:r>
-            <a:r>
-              <a:rPr kumimoji="1" lang="zh-CN" altLang="en-US" sz="1200" b="1" dirty="0">
-                <a:latin typeface="DengXian" panose="02010600030101010101" pitchFamily="2" charset="-122"/>
-                <a:ea typeface="DengXian" panose="02010600030101010101" pitchFamily="2" charset="-122"/>
-              </a:rPr>
-              <a:t> </a:t>
-            </a:r>
-            <a:r>
-              <a:rPr kumimoji="1" lang="en-US" altLang="zh-CN" sz="1200" b="1" dirty="0">
-                <a:latin typeface="DengXian" panose="02010600030101010101" pitchFamily="2" charset="-122"/>
-                <a:ea typeface="DengXian" panose="02010600030101010101" pitchFamily="2" charset="-122"/>
-              </a:rPr>
-              <a:t>2pt</a:t>
-            </a:r>
-          </a:p>
-          <a:p>
-            <a:r>
-              <a:rPr kumimoji="1" lang="en-US" altLang="zh-CN" sz="1200" b="1" dirty="0">
-                <a:latin typeface="DengXian" panose="02010600030101010101" pitchFamily="2" charset="-122"/>
-                <a:ea typeface="DengXian" panose="02010600030101010101" pitchFamily="2" charset="-122"/>
-              </a:rPr>
-              <a:t>Result:</a:t>
-            </a:r>
-            <a:r>
-              <a:rPr kumimoji="1" lang="zh-CN" altLang="en-US" sz="1200" b="1" dirty="0">
-                <a:latin typeface="DengXian" panose="02010600030101010101" pitchFamily="2" charset="-122"/>
-                <a:ea typeface="DengXian" panose="02010600030101010101" pitchFamily="2" charset="-122"/>
-              </a:rPr>
-              <a:t> </a:t>
-            </a:r>
-            <a:r>
-              <a:rPr kumimoji="1" lang="en-US" altLang="zh-CN" sz="1200" b="1" dirty="0">
-                <a:latin typeface="DengXian" panose="02010600030101010101" pitchFamily="2" charset="-122"/>
-                <a:ea typeface="DengXian" panose="02010600030101010101" pitchFamily="2" charset="-122"/>
-              </a:rPr>
-              <a:t>red</a:t>
-            </a:r>
-            <a:r>
-              <a:rPr kumimoji="1" lang="zh-CN" altLang="en-US" sz="1200" b="1" dirty="0">
-                <a:latin typeface="DengXian" panose="02010600030101010101" pitchFamily="2" charset="-122"/>
-                <a:ea typeface="DengXian" panose="02010600030101010101" pitchFamily="2" charset="-122"/>
-              </a:rPr>
-              <a:t> </a:t>
-            </a:r>
-            <a:r>
-              <a:rPr kumimoji="1" lang="en-US" altLang="zh-CN" sz="1200" b="1" dirty="0">
-                <a:latin typeface="DengXian" panose="02010600030101010101" pitchFamily="2" charset="-122"/>
-                <a:ea typeface="DengXian" panose="02010600030101010101" pitchFamily="2" charset="-122"/>
-              </a:rPr>
-              <a:t>color</a:t>
-            </a:r>
-            <a:r>
-              <a:rPr kumimoji="1" lang="zh-CN" altLang="en-US" sz="1200" b="1" dirty="0">
-                <a:latin typeface="DengXian" panose="02010600030101010101" pitchFamily="2" charset="-122"/>
-                <a:ea typeface="DengXian" panose="02010600030101010101" pitchFamily="2" charset="-122"/>
-              </a:rPr>
-              <a:t> </a:t>
-            </a:r>
-            <a:r>
-              <a:rPr kumimoji="1" lang="en-US" altLang="zh-CN" sz="1200" b="1" dirty="0">
-                <a:latin typeface="DengXian" panose="02010600030101010101" pitchFamily="2" charset="-122"/>
-                <a:ea typeface="DengXian" panose="02010600030101010101" pitchFamily="2" charset="-122"/>
-              </a:rPr>
-              <a:t>and</a:t>
-            </a:r>
-            <a:r>
-              <a:rPr kumimoji="1" lang="zh-CN" altLang="en-US" sz="1200" b="1" dirty="0">
-                <a:latin typeface="DengXian" panose="02010600030101010101" pitchFamily="2" charset="-122"/>
-                <a:ea typeface="DengXian" panose="02010600030101010101" pitchFamily="2" charset="-122"/>
-              </a:rPr>
-              <a:t> </a:t>
-            </a:r>
-            <a:r>
-              <a:rPr kumimoji="1" lang="en-US" altLang="zh-CN" sz="1200" b="1" dirty="0">
-                <a:latin typeface="DengXian" panose="02010600030101010101" pitchFamily="2" charset="-122"/>
-                <a:ea typeface="DengXian" panose="02010600030101010101" pitchFamily="2" charset="-122"/>
-              </a:rPr>
-              <a:t>bold</a:t>
-            </a:r>
-          </a:p>
-          <a:p>
-            <a:r>
-              <a:rPr kumimoji="1" lang="en-US" altLang="zh-CN" sz="1200" b="1" dirty="0" err="1">
-                <a:latin typeface="DengXian" panose="02010600030101010101" pitchFamily="2" charset="-122"/>
-                <a:ea typeface="DengXian" panose="02010600030101010101" pitchFamily="2" charset="-122"/>
-              </a:rPr>
-              <a:t>Groupby</a:t>
-            </a:r>
-            <a:r>
-              <a:rPr kumimoji="1" lang="en-US" altLang="zh-CN" sz="1200" b="1" dirty="0">
-                <a:latin typeface="DengXian" panose="02010600030101010101" pitchFamily="2" charset="-122"/>
-                <a:ea typeface="DengXian" panose="02010600030101010101" pitchFamily="2" charset="-122"/>
-              </a:rPr>
-              <a:t>:</a:t>
-            </a:r>
-            <a:r>
-              <a:rPr kumimoji="1" lang="zh-CN" altLang="en-US" sz="1200" b="1" dirty="0">
-                <a:latin typeface="DengXian" panose="02010600030101010101" pitchFamily="2" charset="-122"/>
-                <a:ea typeface="DengXian" panose="02010600030101010101" pitchFamily="2" charset="-122"/>
-              </a:rPr>
-              <a:t> </a:t>
-            </a:r>
-            <a:r>
-              <a:rPr kumimoji="1" lang="en-US" altLang="zh-CN" sz="1200" b="1" dirty="0">
-                <a:latin typeface="DengXian" panose="02010600030101010101" pitchFamily="2" charset="-122"/>
-                <a:ea typeface="DengXian" panose="02010600030101010101" pitchFamily="2" charset="-122"/>
-              </a:rPr>
-              <a:t>red</a:t>
-            </a:r>
-            <a:r>
-              <a:rPr kumimoji="1" lang="zh-CN" altLang="en-US" sz="1200" b="1" dirty="0">
-                <a:latin typeface="DengXian" panose="02010600030101010101" pitchFamily="2" charset="-122"/>
-                <a:ea typeface="DengXian" panose="02010600030101010101" pitchFamily="2" charset="-122"/>
-              </a:rPr>
-              <a:t> </a:t>
-            </a:r>
-            <a:r>
-              <a:rPr kumimoji="1" lang="en-US" altLang="zh-CN" sz="1200" b="1" dirty="0">
-                <a:latin typeface="DengXian" panose="02010600030101010101" pitchFamily="2" charset="-122"/>
-                <a:ea typeface="DengXian" panose="02010600030101010101" pitchFamily="2" charset="-122"/>
-              </a:rPr>
-              <a:t>color</a:t>
-            </a:r>
-            <a:r>
-              <a:rPr kumimoji="1" lang="zh-CN" altLang="en-US" sz="1200" b="1" dirty="0">
-                <a:latin typeface="DengXian" panose="02010600030101010101" pitchFamily="2" charset="-122"/>
-                <a:ea typeface="DengXian" panose="02010600030101010101" pitchFamily="2" charset="-122"/>
-              </a:rPr>
-              <a:t> </a:t>
-            </a:r>
-            <a:r>
-              <a:rPr kumimoji="1" lang="en-US" altLang="zh-CN" sz="1200" b="1" dirty="0">
-                <a:latin typeface="DengXian" panose="02010600030101010101" pitchFamily="2" charset="-122"/>
-                <a:ea typeface="DengXian" panose="02010600030101010101" pitchFamily="2" charset="-122"/>
-              </a:rPr>
-              <a:t>and</a:t>
-            </a:r>
-            <a:r>
-              <a:rPr kumimoji="1" lang="zh-CN" altLang="en-US" sz="1200" b="1" dirty="0">
-                <a:latin typeface="DengXian" panose="02010600030101010101" pitchFamily="2" charset="-122"/>
-                <a:ea typeface="DengXian" panose="02010600030101010101" pitchFamily="2" charset="-122"/>
-              </a:rPr>
-              <a:t> </a:t>
-            </a:r>
-            <a:r>
-              <a:rPr kumimoji="1" lang="en-US" altLang="zh-CN" sz="1200" b="1" dirty="0">
-                <a:latin typeface="DengXian" panose="02010600030101010101" pitchFamily="2" charset="-122"/>
-                <a:ea typeface="DengXian" panose="02010600030101010101" pitchFamily="2" charset="-122"/>
-              </a:rPr>
-              <a:t>bold</a:t>
-            </a:r>
-          </a:p>
-        </p:txBody>
-      </p:sp>
+              </a:endParaRPr>
+            </a:p>
+          </p:txBody>
+        </p:sp>
+      </p:grpSp>
     </p:spTree>
     <p:extLst>
       <p:ext uri="{BB962C8B-B14F-4D97-AF65-F5344CB8AC3E}">
-        <p14:creationId xmlns:p14="http://schemas.microsoft.com/office/powerpoint/2010/main" val="3265552492"/>
+        <p14:creationId xmlns:p14="http://schemas.microsoft.com/office/powerpoint/2010/main" val="3136280630"/>
       </p:ext>
     </p:extLst>
   </p:cSld>
@@ -10342,6 +10483,657 @@
           <a:chExt cx="0" cy="0"/>
         </a:xfrm>
       </p:grpSpPr>
+      <p:sp>
+        <p:nvSpPr>
+          <p:cNvPr id="4" name="Rectangle 3">
+            <a:extLst>
+              <a:ext uri="{FF2B5EF4-FFF2-40B4-BE49-F238E27FC236}">
+                <a16:creationId xmlns:a16="http://schemas.microsoft.com/office/drawing/2014/main" id="{5EFB2F0D-ABB3-D995-FA04-8C359C1827B4}"/>
+              </a:ext>
+            </a:extLst>
+          </p:cNvPr>
+          <p:cNvSpPr/>
+          <p:nvPr/>
+        </p:nvSpPr>
+        <p:spPr>
+          <a:xfrm>
+            <a:off x="2468880" y="2861420"/>
+            <a:ext cx="1215845" cy="387178"/>
+          </a:xfrm>
+          <a:prstGeom prst="rect">
+            <a:avLst/>
+          </a:prstGeom>
+          <a:solidFill>
+            <a:schemeClr val="accent6">
+              <a:lumMod val="60000"/>
+              <a:lumOff val="40000"/>
+            </a:schemeClr>
+          </a:solidFill>
+          <a:ln w="22225">
+            <a:solidFill>
+              <a:schemeClr val="tx1"/>
+            </a:solidFill>
+          </a:ln>
+        </p:spPr>
+        <p:style>
+          <a:lnRef idx="2">
+            <a:schemeClr val="accent1">
+              <a:shade val="50000"/>
+            </a:schemeClr>
+          </a:lnRef>
+          <a:fillRef idx="1">
+            <a:schemeClr val="accent1"/>
+          </a:fillRef>
+          <a:effectRef idx="0">
+            <a:schemeClr val="accent1"/>
+          </a:effectRef>
+          <a:fontRef idx="minor">
+            <a:schemeClr val="lt1"/>
+          </a:fontRef>
+        </p:style>
+        <p:txBody>
+          <a:bodyPr rtlCol="0" anchor="ctr"/>
+          <a:lstStyle/>
+          <a:p>
+            <a:pPr algn="ctr"/>
+            <a:r>
+              <a:rPr lang="en-US" altLang="zh-CN" b="1" dirty="0">
+                <a:solidFill>
+                  <a:schemeClr val="tx1"/>
+                </a:solidFill>
+              </a:rPr>
+              <a:t>Person</a:t>
+            </a:r>
+            <a:endParaRPr lang="en-CN" b="1" dirty="0">
+              <a:solidFill>
+                <a:schemeClr val="tx1"/>
+              </a:solidFill>
+            </a:endParaRPr>
+          </a:p>
+        </p:txBody>
+      </p:sp>
+      <p:sp>
+        <p:nvSpPr>
+          <p:cNvPr id="5" name="Rectangle 4">
+            <a:extLst>
+              <a:ext uri="{FF2B5EF4-FFF2-40B4-BE49-F238E27FC236}">
+                <a16:creationId xmlns:a16="http://schemas.microsoft.com/office/drawing/2014/main" id="{71799D25-8F4B-3E78-7E33-C84644F1D35C}"/>
+              </a:ext>
+            </a:extLst>
+          </p:cNvPr>
+          <p:cNvSpPr/>
+          <p:nvPr/>
+        </p:nvSpPr>
+        <p:spPr>
+          <a:xfrm>
+            <a:off x="3984346" y="2861420"/>
+            <a:ext cx="1215845" cy="387178"/>
+          </a:xfrm>
+          <a:prstGeom prst="rect">
+            <a:avLst/>
+          </a:prstGeom>
+          <a:solidFill>
+            <a:srgbClr val="FF0000">
+              <a:alpha val="30000"/>
+            </a:srgbClr>
+          </a:solidFill>
+          <a:ln w="22225">
+            <a:solidFill>
+              <a:schemeClr val="tx1"/>
+            </a:solidFill>
+          </a:ln>
+        </p:spPr>
+        <p:style>
+          <a:lnRef idx="2">
+            <a:schemeClr val="accent1">
+              <a:shade val="50000"/>
+            </a:schemeClr>
+          </a:lnRef>
+          <a:fillRef idx="1">
+            <a:schemeClr val="accent1"/>
+          </a:fillRef>
+          <a:effectRef idx="0">
+            <a:schemeClr val="accent1"/>
+          </a:effectRef>
+          <a:fontRef idx="minor">
+            <a:schemeClr val="lt1"/>
+          </a:fontRef>
+        </p:style>
+        <p:txBody>
+          <a:bodyPr rtlCol="0" anchor="ctr"/>
+          <a:lstStyle/>
+          <a:p>
+            <a:pPr algn="ctr"/>
+            <a:r>
+              <a:rPr lang="en-US" altLang="zh-CN" b="1" dirty="0">
+                <a:solidFill>
+                  <a:schemeClr val="tx1"/>
+                </a:solidFill>
+              </a:rPr>
+              <a:t>Company</a:t>
+            </a:r>
+            <a:endParaRPr lang="en-CN" b="1" dirty="0">
+              <a:solidFill>
+                <a:schemeClr val="tx1"/>
+              </a:solidFill>
+            </a:endParaRPr>
+          </a:p>
+        </p:txBody>
+      </p:sp>
+      <p:sp>
+        <p:nvSpPr>
+          <p:cNvPr id="6" name="Rectangle 5">
+            <a:extLst>
+              <a:ext uri="{FF2B5EF4-FFF2-40B4-BE49-F238E27FC236}">
+                <a16:creationId xmlns:a16="http://schemas.microsoft.com/office/drawing/2014/main" id="{4C51DCB4-07F1-ACD1-2A47-E37BE04A33BA}"/>
+              </a:ext>
+            </a:extLst>
+          </p:cNvPr>
+          <p:cNvSpPr/>
+          <p:nvPr/>
+        </p:nvSpPr>
+        <p:spPr>
+          <a:xfrm>
+            <a:off x="7040605" y="2861420"/>
+            <a:ext cx="1226941" cy="387178"/>
+          </a:xfrm>
+          <a:prstGeom prst="rect">
+            <a:avLst/>
+          </a:prstGeom>
+          <a:solidFill>
+            <a:schemeClr val="accent1">
+              <a:lumMod val="60000"/>
+              <a:lumOff val="40000"/>
+            </a:schemeClr>
+          </a:solidFill>
+          <a:ln w="22225">
+            <a:solidFill>
+              <a:schemeClr val="tx1"/>
+            </a:solidFill>
+          </a:ln>
+        </p:spPr>
+        <p:style>
+          <a:lnRef idx="2">
+            <a:schemeClr val="accent1">
+              <a:shade val="50000"/>
+            </a:schemeClr>
+          </a:lnRef>
+          <a:fillRef idx="1">
+            <a:schemeClr val="accent1"/>
+          </a:fillRef>
+          <a:effectRef idx="0">
+            <a:schemeClr val="accent1"/>
+          </a:effectRef>
+          <a:fontRef idx="minor">
+            <a:schemeClr val="lt1"/>
+          </a:fontRef>
+        </p:style>
+        <p:txBody>
+          <a:bodyPr rtlCol="0" anchor="ctr"/>
+          <a:lstStyle/>
+          <a:p>
+            <a:pPr algn="ctr"/>
+            <a:r>
+              <a:rPr lang="en-US" altLang="zh-CN" b="1" dirty="0">
+                <a:solidFill>
+                  <a:schemeClr val="tx1"/>
+                </a:solidFill>
+              </a:rPr>
+              <a:t>Account</a:t>
+            </a:r>
+            <a:endParaRPr lang="en-CN" b="1" dirty="0">
+              <a:solidFill>
+                <a:schemeClr val="tx1"/>
+              </a:solidFill>
+            </a:endParaRPr>
+          </a:p>
+        </p:txBody>
+      </p:sp>
+      <p:sp>
+        <p:nvSpPr>
+          <p:cNvPr id="9" name="Rectangle 8">
+            <a:extLst>
+              <a:ext uri="{FF2B5EF4-FFF2-40B4-BE49-F238E27FC236}">
+                <a16:creationId xmlns:a16="http://schemas.microsoft.com/office/drawing/2014/main" id="{5F68F319-B446-C876-5ECA-738B6558B6E1}"/>
+              </a:ext>
+            </a:extLst>
+          </p:cNvPr>
+          <p:cNvSpPr/>
+          <p:nvPr/>
+        </p:nvSpPr>
+        <p:spPr>
+          <a:xfrm>
+            <a:off x="8567168" y="2861420"/>
+            <a:ext cx="1215845" cy="387178"/>
+          </a:xfrm>
+          <a:prstGeom prst="rect">
+            <a:avLst/>
+          </a:prstGeom>
+          <a:solidFill>
+            <a:schemeClr val="accent4">
+              <a:lumMod val="60000"/>
+              <a:lumOff val="40000"/>
+            </a:schemeClr>
+          </a:solidFill>
+          <a:ln w="22225">
+            <a:solidFill>
+              <a:schemeClr val="tx1"/>
+            </a:solidFill>
+          </a:ln>
+        </p:spPr>
+        <p:style>
+          <a:lnRef idx="2">
+            <a:schemeClr val="accent1">
+              <a:shade val="50000"/>
+            </a:schemeClr>
+          </a:lnRef>
+          <a:fillRef idx="1">
+            <a:schemeClr val="accent1"/>
+          </a:fillRef>
+          <a:effectRef idx="0">
+            <a:schemeClr val="accent1"/>
+          </a:effectRef>
+          <a:fontRef idx="minor">
+            <a:schemeClr val="lt1"/>
+          </a:fontRef>
+        </p:style>
+        <p:txBody>
+          <a:bodyPr rtlCol="0" anchor="ctr"/>
+          <a:lstStyle/>
+          <a:p>
+            <a:pPr algn="ctr"/>
+            <a:r>
+              <a:rPr lang="en-US" altLang="zh-CN" b="1" dirty="0">
+                <a:solidFill>
+                  <a:schemeClr val="tx1"/>
+                </a:solidFill>
+              </a:rPr>
+              <a:t>Medium</a:t>
+            </a:r>
+            <a:endParaRPr lang="en-CN" b="1" dirty="0">
+              <a:solidFill>
+                <a:schemeClr val="tx1"/>
+              </a:solidFill>
+            </a:endParaRPr>
+          </a:p>
+        </p:txBody>
+      </p:sp>
+      <p:sp>
+        <p:nvSpPr>
+          <p:cNvPr id="12" name="Rectangle 11">
+            <a:extLst>
+              <a:ext uri="{FF2B5EF4-FFF2-40B4-BE49-F238E27FC236}">
+                <a16:creationId xmlns:a16="http://schemas.microsoft.com/office/drawing/2014/main" id="{74363A22-BDF1-F1C7-E411-2E379C3A7160}"/>
+              </a:ext>
+            </a:extLst>
+          </p:cNvPr>
+          <p:cNvSpPr/>
+          <p:nvPr/>
+        </p:nvSpPr>
+        <p:spPr>
+          <a:xfrm>
+            <a:off x="5506920" y="2861420"/>
+            <a:ext cx="1226977" cy="387178"/>
+          </a:xfrm>
+          <a:prstGeom prst="rect">
+            <a:avLst/>
+          </a:prstGeom>
+          <a:solidFill>
+            <a:schemeClr val="accent2">
+              <a:lumMod val="60000"/>
+              <a:lumOff val="40000"/>
+            </a:schemeClr>
+          </a:solidFill>
+          <a:ln w="22225">
+            <a:solidFill>
+              <a:schemeClr val="tx1"/>
+            </a:solidFill>
+          </a:ln>
+        </p:spPr>
+        <p:style>
+          <a:lnRef idx="2">
+            <a:schemeClr val="accent1">
+              <a:shade val="50000"/>
+            </a:schemeClr>
+          </a:lnRef>
+          <a:fillRef idx="1">
+            <a:schemeClr val="accent1"/>
+          </a:fillRef>
+          <a:effectRef idx="0">
+            <a:schemeClr val="accent1"/>
+          </a:effectRef>
+          <a:fontRef idx="minor">
+            <a:schemeClr val="lt1"/>
+          </a:fontRef>
+        </p:style>
+        <p:txBody>
+          <a:bodyPr rtlCol="0" anchor="ctr"/>
+          <a:lstStyle/>
+          <a:p>
+            <a:pPr algn="ctr"/>
+            <a:r>
+              <a:rPr lang="en-US" altLang="zh-CN" b="1" dirty="0">
+                <a:solidFill>
+                  <a:schemeClr val="tx1"/>
+                </a:solidFill>
+              </a:rPr>
+              <a:t>Loan</a:t>
+            </a:r>
+            <a:endParaRPr lang="en-CN" b="1" dirty="0">
+              <a:solidFill>
+                <a:schemeClr val="tx1"/>
+              </a:solidFill>
+            </a:endParaRPr>
+          </a:p>
+        </p:txBody>
+      </p:sp>
+      <p:sp>
+        <p:nvSpPr>
+          <p:cNvPr id="2" name="文本框 12">
+            <a:extLst>
+              <a:ext uri="{FF2B5EF4-FFF2-40B4-BE49-F238E27FC236}">
+                <a16:creationId xmlns:a16="http://schemas.microsoft.com/office/drawing/2014/main" id="{F15BB429-1D1A-0E43-F714-5B25121059E2}"/>
+              </a:ext>
+            </a:extLst>
+          </p:cNvPr>
+          <p:cNvSpPr txBox="1"/>
+          <p:nvPr/>
+        </p:nvSpPr>
+        <p:spPr>
+          <a:xfrm>
+            <a:off x="2468880" y="3867488"/>
+            <a:ext cx="2583766" cy="1015663"/>
+          </a:xfrm>
+          <a:prstGeom prst="rect">
+            <a:avLst/>
+          </a:prstGeom>
+          <a:noFill/>
+        </p:spPr>
+        <p:txBody>
+          <a:bodyPr wrap="square" rtlCol="0">
+            <a:spAutoFit/>
+          </a:bodyPr>
+          <a:lstStyle/>
+          <a:p>
+            <a:r>
+              <a:rPr kumimoji="1" lang="en-US" altLang="zh-CN" sz="1200" b="1" dirty="0">
+                <a:latin typeface="DengXian" panose="02010600030101010101" pitchFamily="2" charset="-122"/>
+                <a:ea typeface="DengXian" panose="02010600030101010101" pitchFamily="2" charset="-122"/>
+              </a:rPr>
+              <a:t>Color:</a:t>
+            </a:r>
+            <a:r>
+              <a:rPr kumimoji="1" lang="zh-CN" altLang="en-US" sz="1200" b="1" dirty="0">
+                <a:latin typeface="DengXian" panose="02010600030101010101" pitchFamily="2" charset="-122"/>
+                <a:ea typeface="DengXian" panose="02010600030101010101" pitchFamily="2" charset="-122"/>
+              </a:rPr>
+              <a:t> </a:t>
+            </a:r>
+            <a:r>
+              <a:rPr kumimoji="1" lang="en-US" altLang="zh-CN" sz="1200" b="1" dirty="0">
+                <a:latin typeface="DengXian" panose="02010600030101010101" pitchFamily="2" charset="-122"/>
+                <a:ea typeface="DengXian" panose="02010600030101010101" pitchFamily="2" charset="-122"/>
+              </a:rPr>
+              <a:t>as</a:t>
+            </a:r>
+            <a:r>
+              <a:rPr kumimoji="1" lang="zh-CN" altLang="en-US" sz="1200" b="1" dirty="0">
+                <a:latin typeface="DengXian" panose="02010600030101010101" pitchFamily="2" charset="-122"/>
+                <a:ea typeface="DengXian" panose="02010600030101010101" pitchFamily="2" charset="-122"/>
+              </a:rPr>
+              <a:t> </a:t>
+            </a:r>
+            <a:r>
+              <a:rPr kumimoji="1" lang="en-US" altLang="zh-CN" sz="1200" b="1" dirty="0">
+                <a:latin typeface="DengXian" panose="02010600030101010101" pitchFamily="2" charset="-122"/>
+                <a:ea typeface="DengXian" panose="02010600030101010101" pitchFamily="2" charset="-122"/>
+              </a:rPr>
+              <a:t>above</a:t>
+            </a:r>
+          </a:p>
+          <a:p>
+            <a:r>
+              <a:rPr kumimoji="1" lang="en-US" altLang="zh-CN" sz="1200" b="1" dirty="0">
+                <a:latin typeface="DengXian" panose="02010600030101010101" pitchFamily="2" charset="-122"/>
+                <a:ea typeface="DengXian" panose="02010600030101010101" pitchFamily="2" charset="-122"/>
+              </a:rPr>
+              <a:t>Font</a:t>
+            </a:r>
+            <a:r>
+              <a:rPr kumimoji="1" lang="zh-CN" altLang="en-US" sz="1200" b="1" dirty="0">
+                <a:latin typeface="DengXian" panose="02010600030101010101" pitchFamily="2" charset="-122"/>
+                <a:ea typeface="DengXian" panose="02010600030101010101" pitchFamily="2" charset="-122"/>
+              </a:rPr>
+              <a:t> </a:t>
+            </a:r>
+            <a:r>
+              <a:rPr kumimoji="1" lang="en-US" altLang="zh-CN" sz="1200" b="1" dirty="0">
+                <a:latin typeface="DengXian" panose="02010600030101010101" pitchFamily="2" charset="-122"/>
+                <a:ea typeface="DengXian" panose="02010600030101010101" pitchFamily="2" charset="-122"/>
+              </a:rPr>
+              <a:t>size:</a:t>
+            </a:r>
+            <a:r>
+              <a:rPr kumimoji="1" lang="zh-CN" altLang="en-US" sz="1200" b="1" dirty="0">
+                <a:latin typeface="DengXian" panose="02010600030101010101" pitchFamily="2" charset="-122"/>
+                <a:ea typeface="DengXian" panose="02010600030101010101" pitchFamily="2" charset="-122"/>
+              </a:rPr>
+              <a:t> </a:t>
+            </a:r>
+            <a:r>
+              <a:rPr kumimoji="1" lang="en-US" altLang="zh-CN" sz="1200" b="1" dirty="0">
+                <a:latin typeface="DengXian" panose="02010600030101010101" pitchFamily="2" charset="-122"/>
+                <a:ea typeface="DengXian" panose="02010600030101010101" pitchFamily="2" charset="-122"/>
+              </a:rPr>
+              <a:t>12</a:t>
+            </a:r>
+          </a:p>
+          <a:p>
+            <a:r>
+              <a:rPr kumimoji="1" lang="en-US" altLang="zh-CN" sz="1200" b="1" dirty="0">
+                <a:latin typeface="DengXian" panose="02010600030101010101" pitchFamily="2" charset="-122"/>
+                <a:ea typeface="DengXian" panose="02010600030101010101" pitchFamily="2" charset="-122"/>
+              </a:rPr>
+              <a:t>Border</a:t>
+            </a:r>
+            <a:r>
+              <a:rPr kumimoji="1" lang="zh-CN" altLang="en-US" sz="1200" b="1" dirty="0">
+                <a:latin typeface="DengXian" panose="02010600030101010101" pitchFamily="2" charset="-122"/>
+                <a:ea typeface="DengXian" panose="02010600030101010101" pitchFamily="2" charset="-122"/>
+              </a:rPr>
+              <a:t> </a:t>
+            </a:r>
+            <a:r>
+              <a:rPr kumimoji="1" lang="en-US" altLang="zh-CN" sz="1200" b="1" dirty="0">
+                <a:latin typeface="DengXian" panose="02010600030101010101" pitchFamily="2" charset="-122"/>
+                <a:ea typeface="DengXian" panose="02010600030101010101" pitchFamily="2" charset="-122"/>
+              </a:rPr>
+              <a:t>width:</a:t>
+            </a:r>
+            <a:r>
+              <a:rPr kumimoji="1" lang="zh-CN" altLang="en-US" sz="1200" b="1" dirty="0">
+                <a:latin typeface="DengXian" panose="02010600030101010101" pitchFamily="2" charset="-122"/>
+                <a:ea typeface="DengXian" panose="02010600030101010101" pitchFamily="2" charset="-122"/>
+              </a:rPr>
+              <a:t> </a:t>
+            </a:r>
+            <a:r>
+              <a:rPr kumimoji="1" lang="en-US" altLang="zh-CN" sz="1200" b="1" dirty="0">
+                <a:latin typeface="DengXian" panose="02010600030101010101" pitchFamily="2" charset="-122"/>
+                <a:ea typeface="DengXian" panose="02010600030101010101" pitchFamily="2" charset="-122"/>
+              </a:rPr>
+              <a:t>2pt</a:t>
+            </a:r>
+          </a:p>
+          <a:p>
+            <a:r>
+              <a:rPr kumimoji="1" lang="en-US" altLang="zh-CN" sz="1200" b="1" dirty="0">
+                <a:latin typeface="DengXian" panose="02010600030101010101" pitchFamily="2" charset="-122"/>
+                <a:ea typeface="DengXian" panose="02010600030101010101" pitchFamily="2" charset="-122"/>
+              </a:rPr>
+              <a:t>Result:</a:t>
+            </a:r>
+            <a:r>
+              <a:rPr kumimoji="1" lang="zh-CN" altLang="en-US" sz="1200" b="1" dirty="0">
+                <a:latin typeface="DengXian" panose="02010600030101010101" pitchFamily="2" charset="-122"/>
+                <a:ea typeface="DengXian" panose="02010600030101010101" pitchFamily="2" charset="-122"/>
+              </a:rPr>
+              <a:t> </a:t>
+            </a:r>
+            <a:r>
+              <a:rPr kumimoji="1" lang="en-US" altLang="zh-CN" sz="1200" b="1" dirty="0">
+                <a:latin typeface="DengXian" panose="02010600030101010101" pitchFamily="2" charset="-122"/>
+                <a:ea typeface="DengXian" panose="02010600030101010101" pitchFamily="2" charset="-122"/>
+              </a:rPr>
+              <a:t>red</a:t>
+            </a:r>
+            <a:r>
+              <a:rPr kumimoji="1" lang="zh-CN" altLang="en-US" sz="1200" b="1" dirty="0">
+                <a:latin typeface="DengXian" panose="02010600030101010101" pitchFamily="2" charset="-122"/>
+                <a:ea typeface="DengXian" panose="02010600030101010101" pitchFamily="2" charset="-122"/>
+              </a:rPr>
+              <a:t> </a:t>
+            </a:r>
+            <a:r>
+              <a:rPr kumimoji="1" lang="en-US" altLang="zh-CN" sz="1200" b="1" dirty="0">
+                <a:latin typeface="DengXian" panose="02010600030101010101" pitchFamily="2" charset="-122"/>
+                <a:ea typeface="DengXian" panose="02010600030101010101" pitchFamily="2" charset="-122"/>
+              </a:rPr>
+              <a:t>color</a:t>
+            </a:r>
+            <a:r>
+              <a:rPr kumimoji="1" lang="zh-CN" altLang="en-US" sz="1200" b="1" dirty="0">
+                <a:latin typeface="DengXian" panose="02010600030101010101" pitchFamily="2" charset="-122"/>
+                <a:ea typeface="DengXian" panose="02010600030101010101" pitchFamily="2" charset="-122"/>
+              </a:rPr>
+              <a:t> </a:t>
+            </a:r>
+            <a:r>
+              <a:rPr kumimoji="1" lang="en-US" altLang="zh-CN" sz="1200" b="1" dirty="0">
+                <a:latin typeface="DengXian" panose="02010600030101010101" pitchFamily="2" charset="-122"/>
+                <a:ea typeface="DengXian" panose="02010600030101010101" pitchFamily="2" charset="-122"/>
+              </a:rPr>
+              <a:t>and</a:t>
+            </a:r>
+            <a:r>
+              <a:rPr kumimoji="1" lang="zh-CN" altLang="en-US" sz="1200" b="1" dirty="0">
+                <a:latin typeface="DengXian" panose="02010600030101010101" pitchFamily="2" charset="-122"/>
+                <a:ea typeface="DengXian" panose="02010600030101010101" pitchFamily="2" charset="-122"/>
+              </a:rPr>
+              <a:t> </a:t>
+            </a:r>
+            <a:r>
+              <a:rPr kumimoji="1" lang="en-US" altLang="zh-CN" sz="1200" b="1" dirty="0">
+                <a:latin typeface="DengXian" panose="02010600030101010101" pitchFamily="2" charset="-122"/>
+                <a:ea typeface="DengXian" panose="02010600030101010101" pitchFamily="2" charset="-122"/>
+              </a:rPr>
+              <a:t>bold</a:t>
+            </a:r>
+          </a:p>
+          <a:p>
+            <a:r>
+              <a:rPr kumimoji="1" lang="en-US" altLang="zh-CN" sz="1200" b="1" dirty="0" err="1">
+                <a:latin typeface="DengXian" panose="02010600030101010101" pitchFamily="2" charset="-122"/>
+                <a:ea typeface="DengXian" panose="02010600030101010101" pitchFamily="2" charset="-122"/>
+              </a:rPr>
+              <a:t>Groupby</a:t>
+            </a:r>
+            <a:r>
+              <a:rPr kumimoji="1" lang="en-US" altLang="zh-CN" sz="1200" b="1" dirty="0">
+                <a:latin typeface="DengXian" panose="02010600030101010101" pitchFamily="2" charset="-122"/>
+                <a:ea typeface="DengXian" panose="02010600030101010101" pitchFamily="2" charset="-122"/>
+              </a:rPr>
+              <a:t>:</a:t>
+            </a:r>
+            <a:r>
+              <a:rPr kumimoji="1" lang="zh-CN" altLang="en-US" sz="1200" b="1" dirty="0">
+                <a:latin typeface="DengXian" panose="02010600030101010101" pitchFamily="2" charset="-122"/>
+                <a:ea typeface="DengXian" panose="02010600030101010101" pitchFamily="2" charset="-122"/>
+              </a:rPr>
+              <a:t> </a:t>
+            </a:r>
+            <a:r>
+              <a:rPr kumimoji="1" lang="en-US" altLang="zh-CN" sz="1200" b="1" dirty="0">
+                <a:latin typeface="DengXian" panose="02010600030101010101" pitchFamily="2" charset="-122"/>
+                <a:ea typeface="DengXian" panose="02010600030101010101" pitchFamily="2" charset="-122"/>
+              </a:rPr>
+              <a:t>red</a:t>
+            </a:r>
+            <a:r>
+              <a:rPr kumimoji="1" lang="zh-CN" altLang="en-US" sz="1200" b="1" dirty="0">
+                <a:latin typeface="DengXian" panose="02010600030101010101" pitchFamily="2" charset="-122"/>
+                <a:ea typeface="DengXian" panose="02010600030101010101" pitchFamily="2" charset="-122"/>
+              </a:rPr>
+              <a:t> </a:t>
+            </a:r>
+            <a:r>
+              <a:rPr kumimoji="1" lang="en-US" altLang="zh-CN" sz="1200" b="1" dirty="0">
+                <a:latin typeface="DengXian" panose="02010600030101010101" pitchFamily="2" charset="-122"/>
+                <a:ea typeface="DengXian" panose="02010600030101010101" pitchFamily="2" charset="-122"/>
+              </a:rPr>
+              <a:t>color</a:t>
+            </a:r>
+            <a:r>
+              <a:rPr kumimoji="1" lang="zh-CN" altLang="en-US" sz="1200" b="1" dirty="0">
+                <a:latin typeface="DengXian" panose="02010600030101010101" pitchFamily="2" charset="-122"/>
+                <a:ea typeface="DengXian" panose="02010600030101010101" pitchFamily="2" charset="-122"/>
+              </a:rPr>
+              <a:t> </a:t>
+            </a:r>
+            <a:r>
+              <a:rPr kumimoji="1" lang="en-US" altLang="zh-CN" sz="1200" b="1" dirty="0">
+                <a:latin typeface="DengXian" panose="02010600030101010101" pitchFamily="2" charset="-122"/>
+                <a:ea typeface="DengXian" panose="02010600030101010101" pitchFamily="2" charset="-122"/>
+              </a:rPr>
+              <a:t>and</a:t>
+            </a:r>
+            <a:r>
+              <a:rPr kumimoji="1" lang="zh-CN" altLang="en-US" sz="1200" b="1" dirty="0">
+                <a:latin typeface="DengXian" panose="02010600030101010101" pitchFamily="2" charset="-122"/>
+                <a:ea typeface="DengXian" panose="02010600030101010101" pitchFamily="2" charset="-122"/>
+              </a:rPr>
+              <a:t> </a:t>
+            </a:r>
+            <a:r>
+              <a:rPr kumimoji="1" lang="en-US" altLang="zh-CN" sz="1200" b="1" dirty="0">
+                <a:latin typeface="DengXian" panose="02010600030101010101" pitchFamily="2" charset="-122"/>
+                <a:ea typeface="DengXian" panose="02010600030101010101" pitchFamily="2" charset="-122"/>
+              </a:rPr>
+              <a:t>bold</a:t>
+            </a:r>
+          </a:p>
+        </p:txBody>
+      </p:sp>
+    </p:spTree>
+    <p:extLst>
+      <p:ext uri="{BB962C8B-B14F-4D97-AF65-F5344CB8AC3E}">
+        <p14:creationId xmlns:p14="http://schemas.microsoft.com/office/powerpoint/2010/main" val="3265552492"/>
+      </p:ext>
+    </p:extLst>
+  </p:cSld>
+  <p:clrMapOvr>
+    <a:masterClrMapping/>
+  </p:clrMapOvr>
+</p:sld>
+</file>
+
+<file path=ppt/slides/slide8.xml><?xml version="1.0" encoding="utf-8"?>
+<p:sld xmlns:a="http://schemas.openxmlformats.org/drawingml/2006/main" xmlns:r="http://schemas.openxmlformats.org/officeDocument/2006/relationships" xmlns:p="http://schemas.openxmlformats.org/presentationml/2006/main" show="0">
+  <p:cSld>
+    <p:spTree>
+      <p:nvGrpSpPr>
+        <p:cNvPr id="1" name=""/>
+        <p:cNvGrpSpPr/>
+        <p:nvPr/>
+      </p:nvGrpSpPr>
+      <p:grpSpPr>
+        <a:xfrm>
+          <a:off x="0" y="0"/>
+          <a:ext cx="0" cy="0"/>
+          <a:chOff x="0" y="0"/>
+          <a:chExt cx="0" cy="0"/>
+        </a:xfrm>
+      </p:grpSpPr>
       <p:grpSp>
         <p:nvGrpSpPr>
           <p:cNvPr id="3" name="Group 2">
@@ -11195,8 +11987,8 @@
 </p:sld>
 </file>
 
-<file path=ppt/slides/slide8.xml><?xml version="1.0" encoding="utf-8"?>
-<p:sld xmlns:a="http://schemas.openxmlformats.org/drawingml/2006/main" xmlns:r="http://schemas.openxmlformats.org/officeDocument/2006/relationships" xmlns:p="http://schemas.openxmlformats.org/presentationml/2006/main">
+<file path=ppt/slides/slide9.xml><?xml version="1.0" encoding="utf-8"?>
+<p:sld xmlns:a="http://schemas.openxmlformats.org/drawingml/2006/main" xmlns:r="http://schemas.openxmlformats.org/officeDocument/2006/relationships" xmlns:p="http://schemas.openxmlformats.org/presentationml/2006/main" show="0">
   <p:cSld>
     <p:spTree>
       <p:nvGrpSpPr>
@@ -12766,798 +13558,6 @@
     <p:extLst>
       <p:ext uri="{BB962C8B-B14F-4D97-AF65-F5344CB8AC3E}">
         <p14:creationId xmlns:p14="http://schemas.microsoft.com/office/powerpoint/2010/main" val="2765736608"/>
-      </p:ext>
-    </p:extLst>
-  </p:cSld>
-  <p:clrMapOvr>
-    <a:masterClrMapping/>
-  </p:clrMapOvr>
-</p:sld>
-</file>
-
-<file path=ppt/slides/slide9.xml><?xml version="1.0" encoding="utf-8"?>
-<p:sld xmlns:a="http://schemas.openxmlformats.org/drawingml/2006/main" xmlns:r="http://schemas.openxmlformats.org/officeDocument/2006/relationships" xmlns:p="http://schemas.openxmlformats.org/presentationml/2006/main" show="0">
-  <p:cSld>
-    <p:spTree>
-      <p:nvGrpSpPr>
-        <p:cNvPr id="1" name=""/>
-        <p:cNvGrpSpPr/>
-        <p:nvPr/>
-      </p:nvGrpSpPr>
-      <p:grpSpPr>
-        <a:xfrm>
-          <a:off x="0" y="0"/>
-          <a:ext cx="0" cy="0"/>
-          <a:chOff x="0" y="0"/>
-          <a:chExt cx="0" cy="0"/>
-        </a:xfrm>
-      </p:grpSpPr>
-      <p:grpSp>
-        <p:nvGrpSpPr>
-          <p:cNvPr id="13" name="Group 12">
-            <a:extLst>
-              <a:ext uri="{FF2B5EF4-FFF2-40B4-BE49-F238E27FC236}">
-                <a16:creationId xmlns:a16="http://schemas.microsoft.com/office/drawing/2014/main" id="{5C8602AD-DA4E-8373-A4A1-319A52DFC519}"/>
-              </a:ext>
-            </a:extLst>
-          </p:cNvPr>
-          <p:cNvGrpSpPr/>
-          <p:nvPr/>
-        </p:nvGrpSpPr>
-        <p:grpSpPr>
-          <a:xfrm>
-            <a:off x="2292625" y="2640495"/>
-            <a:ext cx="7610060" cy="1577009"/>
-            <a:chOff x="2292625" y="2640495"/>
-            <a:chExt cx="7610060" cy="1577009"/>
-          </a:xfrm>
-        </p:grpSpPr>
-        <p:grpSp>
-          <p:nvGrpSpPr>
-            <p:cNvPr id="11" name="Group 10">
-              <a:extLst>
-                <a:ext uri="{FF2B5EF4-FFF2-40B4-BE49-F238E27FC236}">
-                  <a16:creationId xmlns:a16="http://schemas.microsoft.com/office/drawing/2014/main" id="{5168FCA5-A509-D54C-EC9F-42AEB9B2CE83}"/>
-                </a:ext>
-              </a:extLst>
-            </p:cNvPr>
-            <p:cNvGrpSpPr/>
-            <p:nvPr/>
-          </p:nvGrpSpPr>
-          <p:grpSpPr>
-            <a:xfrm>
-              <a:off x="2292625" y="2640495"/>
-              <a:ext cx="2716695" cy="1577009"/>
-              <a:chOff x="1606827" y="2640495"/>
-              <a:chExt cx="2716695" cy="1577009"/>
-            </a:xfrm>
-          </p:grpSpPr>
-          <p:sp>
-            <p:nvSpPr>
-              <p:cNvPr id="3" name="矩形 2">
-                <a:extLst>
-                  <a:ext uri="{FF2B5EF4-FFF2-40B4-BE49-F238E27FC236}">
-                    <a16:creationId xmlns:a16="http://schemas.microsoft.com/office/drawing/2014/main" id="{22DC280B-9C65-A140-A46D-687EE8B9A3F0}"/>
-                  </a:ext>
-                </a:extLst>
-              </p:cNvPr>
-              <p:cNvSpPr/>
-              <p:nvPr/>
-            </p:nvSpPr>
-            <p:spPr>
-              <a:xfrm>
-                <a:off x="1606827" y="2640495"/>
-                <a:ext cx="2716695" cy="1577009"/>
-              </a:xfrm>
-              <a:prstGeom prst="rect">
-                <a:avLst/>
-              </a:prstGeom>
-              <a:noFill/>
-              <a:ln w="25400">
-                <a:solidFill>
-                  <a:schemeClr val="tx1"/>
-                </a:solidFill>
-                <a:prstDash val="dash"/>
-              </a:ln>
-            </p:spPr>
-            <p:style>
-              <a:lnRef idx="2">
-                <a:schemeClr val="accent2">
-                  <a:shade val="50000"/>
-                </a:schemeClr>
-              </a:lnRef>
-              <a:fillRef idx="1">
-                <a:schemeClr val="accent2"/>
-              </a:fillRef>
-              <a:effectRef idx="0">
-                <a:schemeClr val="accent2"/>
-              </a:effectRef>
-              <a:fontRef idx="minor">
-                <a:schemeClr val="lt1"/>
-              </a:fontRef>
-            </p:style>
-            <p:txBody>
-              <a:bodyPr rtlCol="0" anchor="b"/>
-              <a:lstStyle/>
-              <a:p>
-                <a:pPr algn="ctr"/>
-                <a:r>
-                  <a:rPr kumimoji="1" lang="en-US" altLang="zh-CN" sz="1200" b="1" dirty="0">
-                    <a:solidFill>
-                      <a:srgbClr val="FF0000"/>
-                    </a:solidFill>
-                    <a:latin typeface="DengXian" panose="02010600030101010101" pitchFamily="2" charset="-122"/>
-                    <a:ea typeface="DengXian" panose="02010600030101010101" pitchFamily="2" charset="-122"/>
-                  </a:rPr>
-                  <a:t>RESULT</a:t>
-                </a:r>
-                <a:r>
-                  <a:rPr kumimoji="1" lang="zh-CN" altLang="en-US" sz="1200" b="1" dirty="0">
-                    <a:solidFill>
-                      <a:srgbClr val="FF0000"/>
-                    </a:solidFill>
-                    <a:latin typeface="DengXian" panose="02010600030101010101" pitchFamily="2" charset="-122"/>
-                    <a:ea typeface="DengXian" panose="02010600030101010101" pitchFamily="2" charset="-122"/>
-                  </a:rPr>
-                  <a:t> </a:t>
-                </a:r>
-                <a:r>
-                  <a:rPr kumimoji="1" lang="en-US" altLang="zh-CN" sz="1200" dirty="0">
-                    <a:solidFill>
-                      <a:sysClr val="windowText" lastClr="000000"/>
-                    </a:solidFill>
-                    <a:latin typeface="DengXian" panose="02010600030101010101" pitchFamily="2" charset="-122"/>
-                    <a:ea typeface="DengXian" panose="02010600030101010101" pitchFamily="2" charset="-122"/>
-                  </a:rPr>
-                  <a:t>properties(</a:t>
-                </a:r>
-                <a:r>
-                  <a:rPr kumimoji="1" lang="en-US" altLang="zh-CN" sz="1200" b="1" dirty="0">
-                    <a:solidFill>
-                      <a:sysClr val="windowText" lastClr="000000"/>
-                    </a:solidFill>
-                    <a:latin typeface="DengXian" panose="02010600030101010101" pitchFamily="2" charset="-122"/>
-                    <a:ea typeface="DengXian" panose="02010600030101010101" pitchFamily="2" charset="-122"/>
-                  </a:rPr>
-                  <a:t>account</a:t>
-                </a:r>
-                <a:r>
-                  <a:rPr kumimoji="1" lang="en-US" altLang="zh-CN" sz="1200" dirty="0">
-                    <a:solidFill>
-                      <a:sysClr val="windowText" lastClr="000000"/>
-                    </a:solidFill>
-                    <a:latin typeface="DengXian" panose="02010600030101010101" pitchFamily="2" charset="-122"/>
-                    <a:ea typeface="DengXian" panose="02010600030101010101" pitchFamily="2" charset="-122"/>
-                  </a:rPr>
-                  <a:t>)</a:t>
-                </a:r>
-              </a:p>
-            </p:txBody>
-          </p:sp>
-          <p:grpSp>
-            <p:nvGrpSpPr>
-              <p:cNvPr id="9" name="Group 8">
-                <a:extLst>
-                  <a:ext uri="{FF2B5EF4-FFF2-40B4-BE49-F238E27FC236}">
-                    <a16:creationId xmlns:a16="http://schemas.microsoft.com/office/drawing/2014/main" id="{52A08965-7938-02E8-7A5E-CD3A10264DA7}"/>
-                  </a:ext>
-                </a:extLst>
-              </p:cNvPr>
-              <p:cNvGrpSpPr/>
-              <p:nvPr/>
-            </p:nvGrpSpPr>
-            <p:grpSpPr>
-              <a:xfrm>
-                <a:off x="1906774" y="2815878"/>
-                <a:ext cx="2116800" cy="1010292"/>
-                <a:chOff x="1814274" y="2815878"/>
-                <a:chExt cx="2116800" cy="1010292"/>
-              </a:xfrm>
-            </p:grpSpPr>
-            <p:sp>
-              <p:nvSpPr>
-                <p:cNvPr id="2" name="矩形 1">
-                  <a:extLst>
-                    <a:ext uri="{FF2B5EF4-FFF2-40B4-BE49-F238E27FC236}">
-                      <a16:creationId xmlns:a16="http://schemas.microsoft.com/office/drawing/2014/main" id="{B72C642D-A526-CE45-ADFB-CA4FB6B38A11}"/>
-                    </a:ext>
-                  </a:extLst>
-                </p:cNvPr>
-                <p:cNvSpPr/>
-                <p:nvPr/>
-              </p:nvSpPr>
-              <p:spPr>
-                <a:xfrm>
-                  <a:off x="1814274" y="2815878"/>
-                  <a:ext cx="2116800" cy="505147"/>
-                </a:xfrm>
-                <a:prstGeom prst="rect">
-                  <a:avLst/>
-                </a:prstGeom>
-                <a:solidFill>
-                  <a:schemeClr val="accent5">
-                    <a:lumMod val="60000"/>
-                    <a:lumOff val="40000"/>
-                  </a:schemeClr>
-                </a:solidFill>
-                <a:ln w="25400">
-                  <a:solidFill>
-                    <a:schemeClr val="tx1"/>
-                  </a:solidFill>
-                </a:ln>
-              </p:spPr>
-              <p:style>
-                <a:lnRef idx="2">
-                  <a:schemeClr val="accent2">
-                    <a:shade val="50000"/>
-                  </a:schemeClr>
-                </a:lnRef>
-                <a:fillRef idx="1">
-                  <a:schemeClr val="accent2"/>
-                </a:fillRef>
-                <a:effectRef idx="0">
-                  <a:schemeClr val="accent2"/>
-                </a:effectRef>
-                <a:fontRef idx="minor">
-                  <a:schemeClr val="lt1"/>
-                </a:fontRef>
-              </p:style>
-              <p:txBody>
-                <a:bodyPr rtlCol="0" anchor="ctr"/>
-                <a:lstStyle/>
-                <a:p>
-                  <a:pPr algn="ctr"/>
-                  <a:r>
-                    <a:rPr kumimoji="1" lang="en-US" altLang="zh-CN" sz="1200" b="1" dirty="0">
-                      <a:solidFill>
-                        <a:sysClr val="windowText" lastClr="000000"/>
-                      </a:solidFill>
-                    </a:rPr>
-                    <a:t>account</a:t>
-                  </a:r>
-                  <a:r>
-                    <a:rPr kumimoji="1" lang="en-US" altLang="zh-CN" sz="1200" dirty="0">
-                      <a:solidFill>
-                        <a:sysClr val="windowText" lastClr="000000"/>
-                      </a:solidFill>
-                    </a:rPr>
-                    <a:t>:</a:t>
-                  </a:r>
-                  <a:r>
-                    <a:rPr kumimoji="1" lang="zh-CN" altLang="en-US" sz="1200" dirty="0">
-                      <a:solidFill>
-                        <a:sysClr val="windowText" lastClr="000000"/>
-                      </a:solidFill>
-                    </a:rPr>
-                    <a:t> </a:t>
-                  </a:r>
-                  <a:r>
-                    <a:rPr kumimoji="1" lang="en-US" altLang="zh-CN" sz="1200" dirty="0">
-                      <a:solidFill>
-                        <a:sysClr val="windowText" lastClr="000000"/>
-                      </a:solidFill>
-                    </a:rPr>
-                    <a:t>Account</a:t>
-                  </a:r>
-                  <a:endParaRPr kumimoji="1" lang="zh-CN" altLang="en-US" sz="1200" dirty="0">
-                    <a:solidFill>
-                      <a:sysClr val="windowText" lastClr="000000"/>
-                    </a:solidFill>
-                  </a:endParaRPr>
-                </a:p>
-              </p:txBody>
-            </p:sp>
-            <p:sp>
-              <p:nvSpPr>
-                <p:cNvPr id="6" name="矩形 3">
-                  <a:extLst>
-                    <a:ext uri="{FF2B5EF4-FFF2-40B4-BE49-F238E27FC236}">
-                      <a16:creationId xmlns:a16="http://schemas.microsoft.com/office/drawing/2014/main" id="{BD3A2398-8C0D-7E74-5100-BA996C38E61A}"/>
-                    </a:ext>
-                  </a:extLst>
-                </p:cNvPr>
-                <p:cNvSpPr/>
-                <p:nvPr/>
-              </p:nvSpPr>
-              <p:spPr>
-                <a:xfrm>
-                  <a:off x="1814274" y="3321023"/>
-                  <a:ext cx="2116800" cy="505147"/>
-                </a:xfrm>
-                <a:prstGeom prst="rect">
-                  <a:avLst/>
-                </a:prstGeom>
-                <a:noFill/>
-                <a:ln w="25400">
-                  <a:solidFill>
-                    <a:schemeClr val="tx1"/>
-                  </a:solidFill>
-                </a:ln>
-              </p:spPr>
-              <p:style>
-                <a:lnRef idx="2">
-                  <a:schemeClr val="accent2">
-                    <a:shade val="50000"/>
-                  </a:schemeClr>
-                </a:lnRef>
-                <a:fillRef idx="1">
-                  <a:schemeClr val="accent2"/>
-                </a:fillRef>
-                <a:effectRef idx="0">
-                  <a:schemeClr val="accent2"/>
-                </a:effectRef>
-                <a:fontRef idx="minor">
-                  <a:schemeClr val="lt1"/>
-                </a:fontRef>
-              </p:style>
-              <p:txBody>
-                <a:bodyPr rtlCol="0" anchor="ctr"/>
-                <a:lstStyle/>
-                <a:p>
-                  <a:pPr algn="ctr"/>
-                  <a:r>
-                    <a:rPr kumimoji="1" lang="en-US" altLang="zh-CN" sz="1200" b="1" dirty="0" err="1">
-                      <a:solidFill>
-                        <a:sysClr val="windowText" lastClr="000000"/>
-                      </a:solidFill>
-                      <a:latin typeface="DengXian" panose="02010600030101010101" pitchFamily="2" charset="-122"/>
-                      <a:ea typeface="DengXian" panose="02010600030101010101" pitchFamily="2" charset="-122"/>
-                    </a:rPr>
-                    <a:t>account</a:t>
-                  </a:r>
-                  <a:r>
-                    <a:rPr kumimoji="1" lang="en-US" altLang="zh-CN" sz="1200" dirty="0" err="1">
-                      <a:solidFill>
-                        <a:sysClr val="windowText" lastClr="000000"/>
-                      </a:solidFill>
-                      <a:latin typeface="DengXian" panose="02010600030101010101" pitchFamily="2" charset="-122"/>
-                      <a:ea typeface="DengXian" panose="02010600030101010101" pitchFamily="2" charset="-122"/>
-                    </a:rPr>
-                    <a:t>.id</a:t>
-                  </a:r>
-                  <a:r>
-                    <a:rPr kumimoji="1" lang="en-US" altLang="zh-CN" sz="1200" dirty="0">
-                      <a:solidFill>
-                        <a:sysClr val="windowText" lastClr="000000"/>
-                      </a:solidFill>
-                      <a:latin typeface="DengXian" panose="02010600030101010101" pitchFamily="2" charset="-122"/>
-                      <a:ea typeface="DengXian" panose="02010600030101010101" pitchFamily="2" charset="-122"/>
-                    </a:rPr>
-                    <a:t>:</a:t>
-                  </a:r>
-                  <a:r>
-                    <a:rPr kumimoji="1" lang="zh-CN" altLang="en-US" sz="1200" dirty="0">
-                      <a:solidFill>
-                        <a:sysClr val="windowText" lastClr="000000"/>
-                      </a:solidFill>
-                      <a:latin typeface="DengXian" panose="02010600030101010101" pitchFamily="2" charset="-122"/>
-                      <a:ea typeface="DengXian" panose="02010600030101010101" pitchFamily="2" charset="-122"/>
-                    </a:rPr>
-                    <a:t> </a:t>
-                  </a:r>
-                  <a:r>
-                    <a:rPr kumimoji="1" lang="en-US" altLang="zh-CN" sz="1200" dirty="0">
-                      <a:solidFill>
-                        <a:sysClr val="windowText" lastClr="000000"/>
-                      </a:solidFill>
-                      <a:latin typeface="DengXian" panose="02010600030101010101" pitchFamily="2" charset="-122"/>
-                      <a:ea typeface="DengXian" panose="02010600030101010101" pitchFamily="2" charset="-122"/>
-                    </a:rPr>
-                    <a:t>${id}</a:t>
-                  </a:r>
-                  <a:endParaRPr kumimoji="1" lang="zh-CN" altLang="en-US" sz="1200" dirty="0">
-                    <a:solidFill>
-                      <a:sysClr val="windowText" lastClr="000000"/>
-                    </a:solidFill>
-                    <a:latin typeface="DengXian" panose="02010600030101010101" pitchFamily="2" charset="-122"/>
-                    <a:ea typeface="DengXian" panose="02010600030101010101" pitchFamily="2" charset="-122"/>
-                  </a:endParaRPr>
-                </a:p>
-              </p:txBody>
-            </p:sp>
-          </p:grpSp>
-        </p:grpSp>
-        <p:grpSp>
-          <p:nvGrpSpPr>
-            <p:cNvPr id="10" name="Group 9">
-              <a:extLst>
-                <a:ext uri="{FF2B5EF4-FFF2-40B4-BE49-F238E27FC236}">
-                  <a16:creationId xmlns:a16="http://schemas.microsoft.com/office/drawing/2014/main" id="{A43BD305-30B1-E286-02CD-0C8134774423}"/>
-                </a:ext>
-              </a:extLst>
-            </p:cNvPr>
-            <p:cNvGrpSpPr/>
-            <p:nvPr/>
-          </p:nvGrpSpPr>
-          <p:grpSpPr>
-            <a:xfrm>
-              <a:off x="7185990" y="2640495"/>
-              <a:ext cx="2716695" cy="1577009"/>
-              <a:chOff x="6500192" y="2640495"/>
-              <a:chExt cx="2716695" cy="1577009"/>
-            </a:xfrm>
-          </p:grpSpPr>
-          <p:grpSp>
-            <p:nvGrpSpPr>
-              <p:cNvPr id="8" name="Group 7">
-                <a:extLst>
-                  <a:ext uri="{FF2B5EF4-FFF2-40B4-BE49-F238E27FC236}">
-                    <a16:creationId xmlns:a16="http://schemas.microsoft.com/office/drawing/2014/main" id="{7CE25A49-AE87-2B55-03D7-B1DC81E8A317}"/>
-                  </a:ext>
-                </a:extLst>
-              </p:cNvPr>
-              <p:cNvGrpSpPr/>
-              <p:nvPr/>
-            </p:nvGrpSpPr>
-            <p:grpSpPr>
-              <a:xfrm>
-                <a:off x="6800300" y="2815877"/>
-                <a:ext cx="2116478" cy="1010294"/>
-                <a:chOff x="6743980" y="2815877"/>
-                <a:chExt cx="2116478" cy="1010294"/>
-              </a:xfrm>
-            </p:grpSpPr>
-            <p:sp>
-              <p:nvSpPr>
-                <p:cNvPr id="4" name="矩形 3">
-                  <a:extLst>
-                    <a:ext uri="{FF2B5EF4-FFF2-40B4-BE49-F238E27FC236}">
-                      <a16:creationId xmlns:a16="http://schemas.microsoft.com/office/drawing/2014/main" id="{68924B86-E5E9-2247-A385-17C2F6B27826}"/>
-                    </a:ext>
-                  </a:extLst>
-                </p:cNvPr>
-                <p:cNvSpPr/>
-                <p:nvPr/>
-              </p:nvSpPr>
-              <p:spPr>
-                <a:xfrm>
-                  <a:off x="6743980" y="3321024"/>
-                  <a:ext cx="2116478" cy="505147"/>
-                </a:xfrm>
-                <a:prstGeom prst="rect">
-                  <a:avLst/>
-                </a:prstGeom>
-                <a:noFill/>
-                <a:ln w="25400">
-                  <a:solidFill>
-                    <a:schemeClr val="tx1"/>
-                  </a:solidFill>
-                </a:ln>
-              </p:spPr>
-              <p:style>
-                <a:lnRef idx="2">
-                  <a:schemeClr val="accent2">
-                    <a:shade val="50000"/>
-                  </a:schemeClr>
-                </a:lnRef>
-                <a:fillRef idx="1">
-                  <a:schemeClr val="accent2"/>
-                </a:fillRef>
-                <a:effectRef idx="0">
-                  <a:schemeClr val="accent2"/>
-                </a:effectRef>
-                <a:fontRef idx="minor">
-                  <a:schemeClr val="lt1"/>
-                </a:fontRef>
-              </p:style>
-              <p:txBody>
-                <a:bodyPr rtlCol="0" anchor="ctr"/>
-                <a:lstStyle/>
-                <a:p>
-                  <a:pPr algn="ctr"/>
-                  <a:r>
-                    <a:rPr kumimoji="1" lang="en-US" altLang="zh-CN" sz="1200" b="1" dirty="0" err="1">
-                      <a:solidFill>
-                        <a:sysClr val="windowText" lastClr="000000"/>
-                      </a:solidFill>
-                      <a:latin typeface="DengXian" panose="02010600030101010101" pitchFamily="2" charset="-122"/>
-                      <a:ea typeface="DengXian" panose="02010600030101010101" pitchFamily="2" charset="-122"/>
-                    </a:rPr>
-                    <a:t>person</a:t>
-                  </a:r>
-                  <a:r>
-                    <a:rPr kumimoji="1" lang="en-US" altLang="zh-CN" sz="1200" dirty="0" err="1">
-                      <a:solidFill>
-                        <a:sysClr val="windowText" lastClr="000000"/>
-                      </a:solidFill>
-                      <a:latin typeface="DengXian" panose="02010600030101010101" pitchFamily="2" charset="-122"/>
-                      <a:ea typeface="DengXian" panose="02010600030101010101" pitchFamily="2" charset="-122"/>
-                    </a:rPr>
-                    <a:t>.id</a:t>
-                  </a:r>
-                  <a:r>
-                    <a:rPr kumimoji="1" lang="en-US" altLang="zh-CN" sz="1200" dirty="0">
-                      <a:solidFill>
-                        <a:sysClr val="windowText" lastClr="000000"/>
-                      </a:solidFill>
-                      <a:latin typeface="DengXian" panose="02010600030101010101" pitchFamily="2" charset="-122"/>
-                      <a:ea typeface="DengXian" panose="02010600030101010101" pitchFamily="2" charset="-122"/>
-                    </a:rPr>
-                    <a:t>:</a:t>
-                  </a:r>
-                  <a:r>
-                    <a:rPr kumimoji="1" lang="zh-CN" altLang="en-US" sz="1200" dirty="0">
-                      <a:solidFill>
-                        <a:sysClr val="windowText" lastClr="000000"/>
-                      </a:solidFill>
-                      <a:latin typeface="DengXian" panose="02010600030101010101" pitchFamily="2" charset="-122"/>
-                      <a:ea typeface="DengXian" panose="02010600030101010101" pitchFamily="2" charset="-122"/>
-                    </a:rPr>
-                    <a:t> </a:t>
-                  </a:r>
-                  <a:r>
-                    <a:rPr kumimoji="1" lang="en-US" altLang="zh-CN" sz="1200" dirty="0">
-                      <a:solidFill>
-                        <a:sysClr val="windowText" lastClr="000000"/>
-                      </a:solidFill>
-                      <a:latin typeface="DengXian" panose="02010600030101010101" pitchFamily="2" charset="-122"/>
-                      <a:ea typeface="DengXian" panose="02010600030101010101" pitchFamily="2" charset="-122"/>
-                    </a:rPr>
-                    <a:t>${id}</a:t>
-                  </a:r>
-                  <a:endParaRPr kumimoji="1" lang="zh-CN" altLang="en-US" sz="1200" dirty="0">
-                    <a:solidFill>
-                      <a:sysClr val="windowText" lastClr="000000"/>
-                    </a:solidFill>
-                    <a:latin typeface="DengXian" panose="02010600030101010101" pitchFamily="2" charset="-122"/>
-                    <a:ea typeface="DengXian" panose="02010600030101010101" pitchFamily="2" charset="-122"/>
-                  </a:endParaRPr>
-                </a:p>
-              </p:txBody>
-            </p:sp>
-            <p:sp>
-              <p:nvSpPr>
-                <p:cNvPr id="5" name="矩形 9">
-                  <a:extLst>
-                    <a:ext uri="{FF2B5EF4-FFF2-40B4-BE49-F238E27FC236}">
-                      <a16:creationId xmlns:a16="http://schemas.microsoft.com/office/drawing/2014/main" id="{6641C98C-130F-B917-6069-671A355C0494}"/>
-                    </a:ext>
-                  </a:extLst>
-                </p:cNvPr>
-                <p:cNvSpPr/>
-                <p:nvPr/>
-              </p:nvSpPr>
-              <p:spPr>
-                <a:xfrm>
-                  <a:off x="6743980" y="2815877"/>
-                  <a:ext cx="2116478" cy="505147"/>
-                </a:xfrm>
-                <a:prstGeom prst="rect">
-                  <a:avLst/>
-                </a:prstGeom>
-                <a:solidFill>
-                  <a:schemeClr val="accent6">
-                    <a:lumMod val="60000"/>
-                    <a:lumOff val="40000"/>
-                  </a:schemeClr>
-                </a:solidFill>
-                <a:ln w="25400">
-                  <a:solidFill>
-                    <a:schemeClr val="tx1"/>
-                  </a:solidFill>
-                </a:ln>
-              </p:spPr>
-              <p:style>
-                <a:lnRef idx="2">
-                  <a:schemeClr val="accent2">
-                    <a:shade val="50000"/>
-                  </a:schemeClr>
-                </a:lnRef>
-                <a:fillRef idx="1">
-                  <a:schemeClr val="accent2"/>
-                </a:fillRef>
-                <a:effectRef idx="0">
-                  <a:schemeClr val="accent2"/>
-                </a:effectRef>
-                <a:fontRef idx="minor">
-                  <a:schemeClr val="lt1"/>
-                </a:fontRef>
-              </p:style>
-              <p:txBody>
-                <a:bodyPr rtlCol="0" anchor="ctr"/>
-                <a:lstStyle/>
-                <a:p>
-                  <a:pPr algn="ctr"/>
-                  <a:r>
-                    <a:rPr kumimoji="1" lang="en-US" altLang="zh-CN" sz="1200" b="1" dirty="0">
-                      <a:solidFill>
-                        <a:sysClr val="windowText" lastClr="000000"/>
-                      </a:solidFill>
-                    </a:rPr>
-                    <a:t>person</a:t>
-                  </a:r>
-                  <a:r>
-                    <a:rPr kumimoji="1" lang="zh-CN" altLang="en-US" sz="1200" dirty="0">
-                      <a:solidFill>
-                        <a:sysClr val="windowText" lastClr="000000"/>
-                      </a:solidFill>
-                    </a:rPr>
-                    <a:t> </a:t>
-                  </a:r>
-                  <a:r>
-                    <a:rPr kumimoji="1" lang="en-US" altLang="zh-CN" sz="1200" dirty="0">
-                      <a:solidFill>
-                        <a:sysClr val="windowText" lastClr="000000"/>
-                      </a:solidFill>
-                    </a:rPr>
-                    <a:t>:</a:t>
-                  </a:r>
-                  <a:r>
-                    <a:rPr kumimoji="1" lang="zh-CN" altLang="en-US" sz="1200" dirty="0">
-                      <a:solidFill>
-                        <a:sysClr val="windowText" lastClr="000000"/>
-                      </a:solidFill>
-                    </a:rPr>
-                    <a:t> </a:t>
-                  </a:r>
-                  <a:r>
-                    <a:rPr kumimoji="1" lang="en-US" altLang="zh-CN" sz="1200" dirty="0">
-                      <a:solidFill>
-                        <a:sysClr val="windowText" lastClr="000000"/>
-                      </a:solidFill>
-                    </a:rPr>
-                    <a:t>Person</a:t>
-                  </a:r>
-                  <a:endParaRPr kumimoji="1" lang="zh-CN" altLang="en-US" sz="1200" dirty="0">
-                    <a:solidFill>
-                      <a:sysClr val="windowText" lastClr="000000"/>
-                    </a:solidFill>
-                  </a:endParaRPr>
-                </a:p>
-              </p:txBody>
-            </p:sp>
-          </p:grpSp>
-          <p:sp>
-            <p:nvSpPr>
-              <p:cNvPr id="7" name="矩形 2">
-                <a:extLst>
-                  <a:ext uri="{FF2B5EF4-FFF2-40B4-BE49-F238E27FC236}">
-                    <a16:creationId xmlns:a16="http://schemas.microsoft.com/office/drawing/2014/main" id="{796335C9-7FF2-C371-B888-EBFB3C3FDC46}"/>
-                  </a:ext>
-                </a:extLst>
-              </p:cNvPr>
-              <p:cNvSpPr/>
-              <p:nvPr/>
-            </p:nvSpPr>
-            <p:spPr>
-              <a:xfrm>
-                <a:off x="6500192" y="2640495"/>
-                <a:ext cx="2716695" cy="1577009"/>
-              </a:xfrm>
-              <a:prstGeom prst="rect">
-                <a:avLst/>
-              </a:prstGeom>
-              <a:noFill/>
-              <a:ln w="25400">
-                <a:solidFill>
-                  <a:schemeClr val="tx1"/>
-                </a:solidFill>
-                <a:prstDash val="dash"/>
-              </a:ln>
-            </p:spPr>
-            <p:style>
-              <a:lnRef idx="2">
-                <a:schemeClr val="accent2">
-                  <a:shade val="50000"/>
-                </a:schemeClr>
-              </a:lnRef>
-              <a:fillRef idx="1">
-                <a:schemeClr val="accent2"/>
-              </a:fillRef>
-              <a:effectRef idx="0">
-                <a:schemeClr val="accent2"/>
-              </a:effectRef>
-              <a:fontRef idx="minor">
-                <a:schemeClr val="lt1"/>
-              </a:fontRef>
-            </p:style>
-            <p:txBody>
-              <a:bodyPr rtlCol="0" anchor="b"/>
-              <a:lstStyle/>
-              <a:p>
-                <a:pPr algn="ctr"/>
-                <a:r>
-                  <a:rPr kumimoji="1" lang="en-US" altLang="zh-CN" sz="1200" b="1" dirty="0">
-                    <a:solidFill>
-                      <a:srgbClr val="FF0000"/>
-                    </a:solidFill>
-                    <a:latin typeface="DengXian" panose="02010600030101010101" pitchFamily="2" charset="-122"/>
-                    <a:ea typeface="DengXian" panose="02010600030101010101" pitchFamily="2" charset="-122"/>
-                  </a:rPr>
-                  <a:t>RESULT</a:t>
-                </a:r>
-                <a:r>
-                  <a:rPr kumimoji="1" lang="zh-CN" altLang="en-US" sz="1200" b="1" dirty="0">
-                    <a:solidFill>
-                      <a:srgbClr val="FF0000"/>
-                    </a:solidFill>
-                    <a:latin typeface="DengXian" panose="02010600030101010101" pitchFamily="2" charset="-122"/>
-                    <a:ea typeface="DengXian" panose="02010600030101010101" pitchFamily="2" charset="-122"/>
-                  </a:rPr>
-                  <a:t> </a:t>
-                </a:r>
-                <a:r>
-                  <a:rPr kumimoji="1" lang="en-US" altLang="zh-CN" sz="1200" dirty="0">
-                    <a:solidFill>
-                      <a:sysClr val="windowText" lastClr="000000"/>
-                    </a:solidFill>
-                    <a:latin typeface="DengXian" panose="02010600030101010101" pitchFamily="2" charset="-122"/>
-                    <a:ea typeface="DengXian" panose="02010600030101010101" pitchFamily="2" charset="-122"/>
-                  </a:rPr>
-                  <a:t>properties(</a:t>
-                </a:r>
-                <a:r>
-                  <a:rPr kumimoji="1" lang="en-US" altLang="zh-CN" sz="1200" b="1" dirty="0">
-                    <a:solidFill>
-                      <a:sysClr val="windowText" lastClr="000000"/>
-                    </a:solidFill>
-                    <a:latin typeface="DengXian" panose="02010600030101010101" pitchFamily="2" charset="-122"/>
-                    <a:ea typeface="DengXian" panose="02010600030101010101" pitchFamily="2" charset="-122"/>
-                  </a:rPr>
-                  <a:t>account</a:t>
-                </a:r>
-                <a:r>
-                  <a:rPr kumimoji="1" lang="en-US" altLang="zh-CN" sz="1200" dirty="0">
-                    <a:solidFill>
-                      <a:sysClr val="windowText" lastClr="000000"/>
-                    </a:solidFill>
-                    <a:latin typeface="DengXian" panose="02010600030101010101" pitchFamily="2" charset="-122"/>
-                    <a:ea typeface="DengXian" panose="02010600030101010101" pitchFamily="2" charset="-122"/>
-                  </a:rPr>
-                  <a:t>)</a:t>
-                </a:r>
-              </a:p>
-            </p:txBody>
-          </p:sp>
-        </p:grpSp>
-        <p:sp>
-          <p:nvSpPr>
-            <p:cNvPr id="12" name="文本框 7">
-              <a:extLst>
-                <a:ext uri="{FF2B5EF4-FFF2-40B4-BE49-F238E27FC236}">
-                  <a16:creationId xmlns:a16="http://schemas.microsoft.com/office/drawing/2014/main" id="{AD01137A-7769-D5E3-C126-DE166D6BD9DD}"/>
-                </a:ext>
-              </a:extLst>
-            </p:cNvPr>
-            <p:cNvSpPr txBox="1"/>
-            <p:nvPr/>
-          </p:nvSpPr>
-          <p:spPr>
-            <a:xfrm>
-              <a:off x="5768906" y="3228945"/>
-              <a:ext cx="654188" cy="400110"/>
-            </a:xfrm>
-            <a:prstGeom prst="rect">
-              <a:avLst/>
-            </a:prstGeom>
-            <a:noFill/>
-          </p:spPr>
-          <p:txBody>
-            <a:bodyPr wrap="square" rtlCol="0">
-              <a:spAutoFit/>
-            </a:bodyPr>
-            <a:lstStyle/>
-            <a:p>
-              <a:pPr algn="ctr"/>
-              <a:r>
-                <a:rPr kumimoji="1" lang="en-US" altLang="zh-CN" sz="2000" b="1" dirty="0">
-                  <a:latin typeface="DengXian" panose="02010600030101010101" pitchFamily="2" charset="-122"/>
-                  <a:ea typeface="DengXian" panose="02010600030101010101" pitchFamily="2" charset="-122"/>
-                </a:rPr>
-                <a:t>or</a:t>
-              </a:r>
-              <a:endParaRPr kumimoji="1" lang="en-US" altLang="zh-CN" sz="2000" dirty="0">
-                <a:latin typeface="DengXian" panose="02010600030101010101" pitchFamily="2" charset="-122"/>
-                <a:ea typeface="DengXian" panose="02010600030101010101" pitchFamily="2" charset="-122"/>
-              </a:endParaRPr>
-            </a:p>
-          </p:txBody>
-        </p:sp>
-      </p:grpSp>
-    </p:spTree>
-    <p:extLst>
-      <p:ext uri="{BB962C8B-B14F-4D97-AF65-F5344CB8AC3E}">
-        <p14:creationId xmlns:p14="http://schemas.microsoft.com/office/powerpoint/2010/main" val="3136280630"/>
       </p:ext>
     </p:extLst>
   </p:cSld>

</xml_diff>

<commit_message>
update sr1 pattern and refine desc in 4.1.4
</commit_message>
<xml_diff>
--- a/patterns/transaction-simple-read.pptx
+++ b/patterns/transaction-simple-read.pptx
@@ -2480,16 +2480,16 @@
       </p:grpSpPr>
       <p:grpSp>
         <p:nvGrpSpPr>
-          <p:cNvPr id="11" name="Group 10"/>
+          <p:cNvPr id="4" name="组合 3"/>
           <p:cNvGrpSpPr/>
           <p:nvPr/>
         </p:nvGrpSpPr>
         <p:grpSpPr>
           <a:xfrm>
-            <a:off x="4737652" y="2640495"/>
-            <a:ext cx="2716695" cy="1577009"/>
-            <a:chOff x="1606827" y="2640495"/>
-            <a:chExt cx="2716695" cy="1577009"/>
+            <a:off x="4737735" y="2640330"/>
+            <a:ext cx="2716530" cy="1576070"/>
+            <a:chOff x="7461" y="4158"/>
+            <a:chExt cx="4278" cy="2482"/>
           </a:xfrm>
         </p:grpSpPr>
         <p:sp>
@@ -2500,8 +2500,8 @@
           </p:nvSpPr>
           <p:spPr>
             <a:xfrm>
-              <a:off x="1606827" y="2640495"/>
-              <a:ext cx="2716695" cy="1577009"/>
+              <a:off x="7461" y="4158"/>
+              <a:ext cx="4278" cy="2483"/>
             </a:xfrm>
             <a:prstGeom prst="rect">
               <a:avLst/>
@@ -2602,9 +2602,9 @@
             <p:nvPr/>
           </p:nvGrpSpPr>
           <p:grpSpPr>
-            <a:xfrm>
-              <a:off x="1906774" y="2815878"/>
-              <a:ext cx="2116800" cy="1010292"/>
+            <a:xfrm rot="0">
+              <a:off x="7933" y="4434"/>
+              <a:ext cx="3334" cy="1591"/>
               <a:chOff x="1814274" y="2815878"/>
               <a:chExt cx="2116800" cy="1010292"/>
             </a:xfrm>
@@ -2631,7 +2631,7 @@
               </a:solidFill>
               <a:ln w="25400">
                 <a:solidFill>
-                  <a:schemeClr val="accent3"/>
+                  <a:schemeClr val="tx1"/>
                 </a:solidFill>
               </a:ln>
             </p:spPr>
@@ -2713,7 +2713,7 @@
               <a:noFill/>
               <a:ln w="25400">
                 <a:solidFill>
-                  <a:schemeClr val="accent3"/>
+                  <a:schemeClr val="tx1"/>
                 </a:solidFill>
               </a:ln>
             </p:spPr>

</xml_diff>